<commit_message>
changed stuff in ex 1
</commit_message>
<xml_diff>
--- a/Assignment_4.pptx
+++ b/Assignment_4.pptx
@@ -7,33 +7,36 @@
   <p:sldIdLst>
     <p:sldId id="256" r:id="rId2"/>
     <p:sldId id="270" r:id="rId3"/>
-    <p:sldId id="271" r:id="rId4"/>
-    <p:sldId id="273" r:id="rId5"/>
-    <p:sldId id="285" r:id="rId6"/>
-    <p:sldId id="286" r:id="rId7"/>
-    <p:sldId id="274" r:id="rId8"/>
-    <p:sldId id="275" r:id="rId9"/>
-    <p:sldId id="276" r:id="rId10"/>
-    <p:sldId id="277" r:id="rId11"/>
-    <p:sldId id="278" r:id="rId12"/>
-    <p:sldId id="279" r:id="rId13"/>
-    <p:sldId id="280" r:id="rId14"/>
-    <p:sldId id="282" r:id="rId15"/>
-    <p:sldId id="281" r:id="rId16"/>
-    <p:sldId id="283" r:id="rId17"/>
-    <p:sldId id="257" r:id="rId18"/>
-    <p:sldId id="258" r:id="rId19"/>
-    <p:sldId id="259" r:id="rId20"/>
-    <p:sldId id="260" r:id="rId21"/>
-    <p:sldId id="261" r:id="rId22"/>
-    <p:sldId id="262" r:id="rId23"/>
-    <p:sldId id="263" r:id="rId24"/>
-    <p:sldId id="264" r:id="rId25"/>
-    <p:sldId id="265" r:id="rId26"/>
-    <p:sldId id="266" r:id="rId27"/>
-    <p:sldId id="267" r:id="rId28"/>
-    <p:sldId id="268" r:id="rId29"/>
-    <p:sldId id="269" r:id="rId30"/>
+    <p:sldId id="287" r:id="rId4"/>
+    <p:sldId id="288" r:id="rId5"/>
+    <p:sldId id="289" r:id="rId6"/>
+    <p:sldId id="271" r:id="rId7"/>
+    <p:sldId id="273" r:id="rId8"/>
+    <p:sldId id="285" r:id="rId9"/>
+    <p:sldId id="286" r:id="rId10"/>
+    <p:sldId id="274" r:id="rId11"/>
+    <p:sldId id="275" r:id="rId12"/>
+    <p:sldId id="276" r:id="rId13"/>
+    <p:sldId id="277" r:id="rId14"/>
+    <p:sldId id="278" r:id="rId15"/>
+    <p:sldId id="279" r:id="rId16"/>
+    <p:sldId id="280" r:id="rId17"/>
+    <p:sldId id="282" r:id="rId18"/>
+    <p:sldId id="281" r:id="rId19"/>
+    <p:sldId id="283" r:id="rId20"/>
+    <p:sldId id="257" r:id="rId21"/>
+    <p:sldId id="258" r:id="rId22"/>
+    <p:sldId id="259" r:id="rId23"/>
+    <p:sldId id="260" r:id="rId24"/>
+    <p:sldId id="261" r:id="rId25"/>
+    <p:sldId id="262" r:id="rId26"/>
+    <p:sldId id="263" r:id="rId27"/>
+    <p:sldId id="264" r:id="rId28"/>
+    <p:sldId id="265" r:id="rId29"/>
+    <p:sldId id="266" r:id="rId30"/>
+    <p:sldId id="267" r:id="rId31"/>
+    <p:sldId id="268" r:id="rId32"/>
+    <p:sldId id="269" r:id="rId33"/>
   </p:sldIdLst>
   <p:sldSz cx="9144000" cy="6858000" type="screen4x3"/>
   <p:notesSz cx="6858000" cy="9144000"/>
@@ -3798,6 +3801,828 @@
         </p:nvSpPr>
         <p:spPr/>
         <p:txBody>
+          <a:bodyPr>
+            <a:normAutofit fontScale="90000"/>
+          </a:bodyPr>
+          <a:lstStyle/>
+          <a:p>
+            <a:r>
+              <a:rPr lang="de-AT" dirty="0" err="1" smtClean="0"/>
+              <a:t>Exercise</a:t>
+            </a:r>
+            <a:r>
+              <a:rPr lang="de-AT" dirty="0" smtClean="0"/>
+              <a:t> 2 – </a:t>
+            </a:r>
+            <a:br>
+              <a:rPr lang="de-AT" dirty="0" smtClean="0"/>
+            </a:br>
+            <a:r>
+              <a:rPr lang="de-AT" dirty="0" smtClean="0"/>
+              <a:t>Determination </a:t>
+            </a:r>
+            <a:r>
+              <a:rPr lang="de-AT" dirty="0" err="1" smtClean="0"/>
+              <a:t>of</a:t>
+            </a:r>
+            <a:r>
+              <a:rPr lang="de-AT" dirty="0" smtClean="0"/>
+              <a:t> </a:t>
+            </a:r>
+            <a:r>
+              <a:rPr lang="de-AT" dirty="0" err="1" smtClean="0"/>
+              <a:t>Quantities</a:t>
+            </a:r>
+            <a:endParaRPr lang="de-AT" dirty="0"/>
+          </a:p>
+        </p:txBody>
+      </p:sp>
+      <p:pic>
+        <p:nvPicPr>
+          <p:cNvPr id="4" name="Inhaltsplatzhalter 3"/>
+          <p:cNvPicPr>
+            <a:picLocks noGrp="1" noChangeAspect="1"/>
+          </p:cNvPicPr>
+          <p:nvPr>
+            <p:ph sz="quarter" idx="1"/>
+          </p:nvPr>
+        </p:nvPicPr>
+        <p:blipFill>
+          <a:blip r:embed="rId2">
+            <a:extLst>
+              <a:ext uri="{28A0092B-C50C-407E-A947-70E740481C1C}">
+                <a14:useLocalDpi xmlns:a14="http://schemas.microsoft.com/office/drawing/2010/main" val="0"/>
+              </a:ext>
+            </a:extLst>
+          </a:blip>
+          <a:stretch>
+            <a:fillRect/>
+          </a:stretch>
+        </p:blipFill>
+        <p:spPr>
+          <a:xfrm>
+            <a:off x="781023" y="1556792"/>
+            <a:ext cx="5611008" cy="3391374"/>
+          </a:xfrm>
+        </p:spPr>
+      </p:pic>
+      <p:sp>
+        <p:nvSpPr>
+          <p:cNvPr id="5" name="Textfeld 4"/>
+          <p:cNvSpPr txBox="1"/>
+          <p:nvPr/>
+        </p:nvSpPr>
+        <p:spPr>
+          <a:xfrm>
+            <a:off x="810105" y="4797152"/>
+            <a:ext cx="7920880" cy="1815882"/>
+          </a:xfrm>
+          <a:prstGeom prst="rect">
+            <a:avLst/>
+          </a:prstGeom>
+          <a:noFill/>
+        </p:spPr>
+        <p:txBody>
+          <a:bodyPr wrap="square" rtlCol="0">
+            <a:spAutoFit/>
+          </a:bodyPr>
+          <a:lstStyle/>
+          <a:p>
+            <a:r>
+              <a:rPr lang="en-GB" sz="1400" dirty="0"/>
+              <a:t>N(publisher) x N (publisher, publishes ) = N (publishes)  = N(book</a:t>
+            </a:r>
+            <a:r>
+              <a:rPr lang="en-GB" sz="1400" dirty="0" smtClean="0"/>
+              <a:t>)</a:t>
+            </a:r>
+          </a:p>
+          <a:p>
+            <a:pPr marL="285750" indent="-285750">
+              <a:buFont typeface="Symbol"/>
+              <a:buChar char="Þ"/>
+            </a:pPr>
+            <a:r>
+              <a:rPr lang="en-GB" sz="1400" dirty="0" smtClean="0"/>
+              <a:t>N(book) = N(publishes) = 100 x 1.000 = 100.000</a:t>
+            </a:r>
+          </a:p>
+          <a:p>
+            <a:endParaRPr lang="de-AT" sz="1400" dirty="0" smtClean="0"/>
+          </a:p>
+          <a:p>
+            <a:r>
+              <a:rPr lang="en-GB" sz="1400" dirty="0"/>
+              <a:t>N(author) = N(writes) / N(writes, author)</a:t>
+            </a:r>
+            <a:endParaRPr lang="de-AT" sz="1400" dirty="0"/>
+          </a:p>
+          <a:p>
+            <a:pPr marL="285750" indent="-285750">
+              <a:buFont typeface="Symbol"/>
+              <a:buChar char="Þ"/>
+            </a:pPr>
+            <a:r>
+              <a:rPr lang="en-GB" sz="1400" dirty="0" smtClean="0"/>
+              <a:t>N(author) = 400.000 / 20 = 20.000</a:t>
+            </a:r>
+          </a:p>
+          <a:p>
+            <a:pPr marL="285750" indent="-285750">
+              <a:buFont typeface="Symbol"/>
+              <a:buChar char="Þ"/>
+            </a:pPr>
+            <a:endParaRPr lang="en-GB" sz="1400" dirty="0"/>
+          </a:p>
+          <a:p>
+            <a:r>
+              <a:rPr lang="en-GB" sz="1400" dirty="0"/>
+              <a:t>N(book, writes) = N (writes) / N(books</a:t>
+            </a:r>
+            <a:r>
+              <a:rPr lang="en-GB" sz="1400" dirty="0" smtClean="0"/>
+              <a:t>)</a:t>
+            </a:r>
+            <a:endParaRPr lang="en-GB" dirty="0"/>
+          </a:p>
+          <a:p>
+            <a:pPr marL="285750" indent="-285750">
+              <a:buFont typeface="Symbol"/>
+              <a:buChar char="Þ"/>
+            </a:pPr>
+            <a:r>
+              <a:rPr lang="en-GB" sz="1400" dirty="0" smtClean="0"/>
+              <a:t>N(book, writes) = 400.000 / 100.000 = 4</a:t>
+            </a:r>
+          </a:p>
+        </p:txBody>
+      </p:sp>
+      <p:sp>
+        <p:nvSpPr>
+          <p:cNvPr id="6" name="Textfeld 5"/>
+          <p:cNvSpPr txBox="1"/>
+          <p:nvPr/>
+        </p:nvSpPr>
+        <p:spPr>
+          <a:xfrm>
+            <a:off x="1763688" y="1516783"/>
+            <a:ext cx="1080120" cy="276999"/>
+          </a:xfrm>
+          <a:prstGeom prst="rect">
+            <a:avLst/>
+          </a:prstGeom>
+          <a:noFill/>
+        </p:spPr>
+        <p:txBody>
+          <a:bodyPr wrap="square" rtlCol="0">
+            <a:spAutoFit/>
+          </a:bodyPr>
+          <a:lstStyle/>
+          <a:p>
+            <a:r>
+              <a:rPr lang="de-AT" sz="1200" b="1" dirty="0" smtClean="0">
+                <a:solidFill>
+                  <a:srgbClr val="FF0000"/>
+                </a:solidFill>
+              </a:rPr>
+              <a:t>&lt;100.000&gt;</a:t>
+            </a:r>
+            <a:endParaRPr lang="de-AT" sz="1200" b="1" dirty="0">
+              <a:solidFill>
+                <a:srgbClr val="FF0000"/>
+              </a:solidFill>
+            </a:endParaRPr>
+          </a:p>
+        </p:txBody>
+      </p:sp>
+      <p:sp>
+        <p:nvSpPr>
+          <p:cNvPr id="7" name="Textfeld 6"/>
+          <p:cNvSpPr txBox="1"/>
+          <p:nvPr/>
+        </p:nvSpPr>
+        <p:spPr>
+          <a:xfrm>
+            <a:off x="4427984" y="1514181"/>
+            <a:ext cx="1080120" cy="276999"/>
+          </a:xfrm>
+          <a:prstGeom prst="rect">
+            <a:avLst/>
+          </a:prstGeom>
+          <a:noFill/>
+        </p:spPr>
+        <p:txBody>
+          <a:bodyPr wrap="square" rtlCol="0">
+            <a:spAutoFit/>
+          </a:bodyPr>
+          <a:lstStyle/>
+          <a:p>
+            <a:r>
+              <a:rPr lang="de-AT" sz="1200" b="1" dirty="0" smtClean="0">
+                <a:solidFill>
+                  <a:srgbClr val="FF0000"/>
+                </a:solidFill>
+              </a:rPr>
+              <a:t>&lt;100.000&gt;</a:t>
+            </a:r>
+            <a:endParaRPr lang="de-AT" sz="1200" b="1" dirty="0">
+              <a:solidFill>
+                <a:srgbClr val="FF0000"/>
+              </a:solidFill>
+            </a:endParaRPr>
+          </a:p>
+        </p:txBody>
+      </p:sp>
+      <p:sp>
+        <p:nvSpPr>
+          <p:cNvPr id="8" name="Textfeld 7"/>
+          <p:cNvSpPr txBox="1"/>
+          <p:nvPr/>
+        </p:nvSpPr>
+        <p:spPr>
+          <a:xfrm>
+            <a:off x="5506258" y="2852936"/>
+            <a:ext cx="1080120" cy="276999"/>
+          </a:xfrm>
+          <a:prstGeom prst="rect">
+            <a:avLst/>
+          </a:prstGeom>
+          <a:noFill/>
+        </p:spPr>
+        <p:txBody>
+          <a:bodyPr wrap="square" rtlCol="0">
+            <a:spAutoFit/>
+          </a:bodyPr>
+          <a:lstStyle/>
+          <a:p>
+            <a:r>
+              <a:rPr lang="de-AT" sz="1200" b="1" dirty="0" smtClean="0">
+                <a:solidFill>
+                  <a:srgbClr val="FF0000"/>
+                </a:solidFill>
+              </a:rPr>
+              <a:t>&lt;4&gt;</a:t>
+            </a:r>
+            <a:endParaRPr lang="de-AT" sz="1200" b="1" dirty="0">
+              <a:solidFill>
+                <a:srgbClr val="FF0000"/>
+              </a:solidFill>
+            </a:endParaRPr>
+          </a:p>
+        </p:txBody>
+      </p:sp>
+      <p:sp>
+        <p:nvSpPr>
+          <p:cNvPr id="9" name="Textfeld 8"/>
+          <p:cNvSpPr txBox="1"/>
+          <p:nvPr/>
+        </p:nvSpPr>
+        <p:spPr>
+          <a:xfrm>
+            <a:off x="5483825" y="4187309"/>
+            <a:ext cx="1080120" cy="276999"/>
+          </a:xfrm>
+          <a:prstGeom prst="rect">
+            <a:avLst/>
+          </a:prstGeom>
+          <a:noFill/>
+        </p:spPr>
+        <p:txBody>
+          <a:bodyPr wrap="square" rtlCol="0">
+            <a:spAutoFit/>
+          </a:bodyPr>
+          <a:lstStyle/>
+          <a:p>
+            <a:r>
+              <a:rPr lang="de-AT" sz="1200" b="1" dirty="0" smtClean="0">
+                <a:solidFill>
+                  <a:srgbClr val="FF0000"/>
+                </a:solidFill>
+              </a:rPr>
+              <a:t>&lt;20.000&gt;</a:t>
+            </a:r>
+            <a:endParaRPr lang="de-AT" sz="1200" b="1" dirty="0">
+              <a:solidFill>
+                <a:srgbClr val="FF0000"/>
+              </a:solidFill>
+            </a:endParaRPr>
+          </a:p>
+        </p:txBody>
+      </p:sp>
+    </p:spTree>
+    <p:extLst>
+      <p:ext uri="{BB962C8B-B14F-4D97-AF65-F5344CB8AC3E}">
+        <p14:creationId xmlns:p14="http://schemas.microsoft.com/office/powerpoint/2010/main" val="1343703413"/>
+      </p:ext>
+    </p:extLst>
+  </p:cSld>
+  <p:clrMapOvr>
+    <a:masterClrMapping/>
+  </p:clrMapOvr>
+</p:sld>
+</file>
+
+<file path=ppt/slides/slide11.xml><?xml version="1.0" encoding="utf-8"?>
+<p:sld xmlns:a="http://schemas.openxmlformats.org/drawingml/2006/main" xmlns:r="http://schemas.openxmlformats.org/officeDocument/2006/relationships" xmlns:p="http://schemas.openxmlformats.org/presentationml/2006/main">
+  <p:cSld>
+    <p:spTree>
+      <p:nvGrpSpPr>
+        <p:cNvPr id="1" name=""/>
+        <p:cNvGrpSpPr/>
+        <p:nvPr/>
+      </p:nvGrpSpPr>
+      <p:grpSpPr>
+        <a:xfrm>
+          <a:off x="0" y="0"/>
+          <a:ext cx="0" cy="0"/>
+          <a:chOff x="0" y="0"/>
+          <a:chExt cx="0" cy="0"/>
+        </a:xfrm>
+      </p:grpSpPr>
+      <p:sp>
+        <p:nvSpPr>
+          <p:cNvPr id="2" name="Titel 1"/>
+          <p:cNvSpPr>
+            <a:spLocks noGrp="1"/>
+          </p:cNvSpPr>
+          <p:nvPr>
+            <p:ph type="title"/>
+          </p:nvPr>
+        </p:nvSpPr>
+        <p:spPr/>
+        <p:txBody>
+          <a:bodyPr/>
+          <a:lstStyle/>
+          <a:p>
+            <a:r>
+              <a:rPr lang="de-AT" dirty="0" err="1" smtClean="0"/>
+              <a:t>Exercise</a:t>
+            </a:r>
+            <a:r>
+              <a:rPr lang="de-AT" dirty="0" smtClean="0"/>
+              <a:t> 2 - Navigation</a:t>
+            </a:r>
+            <a:endParaRPr lang="de-AT" dirty="0"/>
+          </a:p>
+        </p:txBody>
+      </p:sp>
+      <p:sp>
+        <p:nvSpPr>
+          <p:cNvPr id="3" name="Inhaltsplatzhalter 2"/>
+          <p:cNvSpPr>
+            <a:spLocks noGrp="1"/>
+          </p:cNvSpPr>
+          <p:nvPr>
+            <p:ph sz="quarter" idx="1"/>
+          </p:nvPr>
+        </p:nvSpPr>
+        <p:spPr/>
+        <p:txBody>
+          <a:bodyPr/>
+          <a:lstStyle/>
+          <a:p>
+            <a:r>
+              <a:rPr lang="en-GB" dirty="0" smtClean="0"/>
+              <a:t>To get the result of a query or to execute an operation, multiple entity types and relations might have to be accessed.</a:t>
+            </a:r>
+          </a:p>
+          <a:p>
+            <a:r>
+              <a:rPr lang="en-GB" dirty="0" smtClean="0"/>
+              <a:t>Navigation path shows, which entity types and relations are accessed and in which order.</a:t>
+            </a:r>
+          </a:p>
+          <a:p>
+            <a:r>
+              <a:rPr lang="en-GB" dirty="0" smtClean="0"/>
+              <a:t>Necessary for evaluating costs of database operations</a:t>
+            </a:r>
+            <a:endParaRPr lang="en-GB" dirty="0"/>
+          </a:p>
+        </p:txBody>
+      </p:sp>
+    </p:spTree>
+    <p:extLst>
+      <p:ext uri="{BB962C8B-B14F-4D97-AF65-F5344CB8AC3E}">
+        <p14:creationId xmlns:p14="http://schemas.microsoft.com/office/powerpoint/2010/main" val="1138079737"/>
+      </p:ext>
+    </p:extLst>
+  </p:cSld>
+  <p:clrMapOvr>
+    <a:masterClrMapping/>
+  </p:clrMapOvr>
+</p:sld>
+</file>
+
+<file path=ppt/slides/slide12.xml><?xml version="1.0" encoding="utf-8"?>
+<p:sld xmlns:a="http://schemas.openxmlformats.org/drawingml/2006/main" xmlns:r="http://schemas.openxmlformats.org/officeDocument/2006/relationships" xmlns:p="http://schemas.openxmlformats.org/presentationml/2006/main">
+  <p:cSld>
+    <p:spTree>
+      <p:nvGrpSpPr>
+        <p:cNvPr id="1" name=""/>
+        <p:cNvGrpSpPr/>
+        <p:nvPr/>
+      </p:nvGrpSpPr>
+      <p:grpSpPr>
+        <a:xfrm>
+          <a:off x="0" y="0"/>
+          <a:ext cx="0" cy="0"/>
+          <a:chOff x="0" y="0"/>
+          <a:chExt cx="0" cy="0"/>
+        </a:xfrm>
+      </p:grpSpPr>
+      <p:sp>
+        <p:nvSpPr>
+          <p:cNvPr id="2" name="Titel 1"/>
+          <p:cNvSpPr>
+            <a:spLocks noGrp="1"/>
+          </p:cNvSpPr>
+          <p:nvPr>
+            <p:ph type="title"/>
+          </p:nvPr>
+        </p:nvSpPr>
+        <p:spPr/>
+        <p:txBody>
+          <a:bodyPr/>
+          <a:lstStyle/>
+          <a:p>
+            <a:r>
+              <a:rPr lang="de-AT" dirty="0" err="1" smtClean="0"/>
+              <a:t>Exercise</a:t>
+            </a:r>
+            <a:r>
+              <a:rPr lang="de-AT" dirty="0" smtClean="0"/>
+              <a:t> 3 – </a:t>
+            </a:r>
+            <a:r>
+              <a:rPr lang="de-AT" dirty="0" err="1" smtClean="0"/>
+              <a:t>Redundancy</a:t>
+            </a:r>
+            <a:endParaRPr lang="de-AT" dirty="0"/>
+          </a:p>
+        </p:txBody>
+      </p:sp>
+      <p:sp>
+        <p:nvSpPr>
+          <p:cNvPr id="3" name="Inhaltsplatzhalter 2"/>
+          <p:cNvSpPr>
+            <a:spLocks noGrp="1"/>
+          </p:cNvSpPr>
+          <p:nvPr>
+            <p:ph sz="quarter" idx="1"/>
+          </p:nvPr>
+        </p:nvSpPr>
+        <p:spPr/>
+        <p:txBody>
+          <a:bodyPr>
+            <a:normAutofit fontScale="92500" lnSpcReduction="20000"/>
+          </a:bodyPr>
+          <a:lstStyle/>
+          <a:p>
+            <a:r>
+              <a:rPr lang="de-AT" dirty="0" err="1" smtClean="0"/>
+              <a:t>Redundancy</a:t>
+            </a:r>
+            <a:r>
+              <a:rPr lang="de-AT" dirty="0" smtClean="0"/>
+              <a:t> </a:t>
+            </a:r>
+            <a:r>
+              <a:rPr lang="de-AT" dirty="0" err="1" smtClean="0"/>
+              <a:t>occurs</a:t>
+            </a:r>
+            <a:r>
+              <a:rPr lang="de-AT" dirty="0" smtClean="0"/>
+              <a:t>, </a:t>
+            </a:r>
+            <a:r>
+              <a:rPr lang="de-AT" dirty="0" err="1" smtClean="0"/>
+              <a:t>if</a:t>
+            </a:r>
+            <a:r>
+              <a:rPr lang="de-AT" dirty="0" smtClean="0"/>
+              <a:t> </a:t>
+            </a:r>
+            <a:r>
+              <a:rPr lang="de-AT" dirty="0" err="1" smtClean="0"/>
+              <a:t>the</a:t>
+            </a:r>
+            <a:r>
+              <a:rPr lang="de-AT" dirty="0" smtClean="0"/>
+              <a:t> same </a:t>
+            </a:r>
+            <a:r>
+              <a:rPr lang="de-AT" dirty="0" err="1" smtClean="0"/>
+              <a:t>information</a:t>
+            </a:r>
+            <a:r>
+              <a:rPr lang="de-AT" dirty="0" smtClean="0"/>
+              <a:t> </a:t>
+            </a:r>
+            <a:r>
+              <a:rPr lang="de-AT" dirty="0" err="1" smtClean="0"/>
+              <a:t>or</a:t>
+            </a:r>
+            <a:r>
+              <a:rPr lang="de-AT" dirty="0" smtClean="0"/>
+              <a:t> </a:t>
+            </a:r>
+            <a:r>
+              <a:rPr lang="de-AT" dirty="0" err="1" smtClean="0"/>
+              <a:t>derivable</a:t>
+            </a:r>
+            <a:r>
+              <a:rPr lang="de-AT" dirty="0" smtClean="0"/>
+              <a:t> </a:t>
+            </a:r>
+            <a:r>
+              <a:rPr lang="de-AT" dirty="0" err="1" smtClean="0"/>
+              <a:t>information</a:t>
+            </a:r>
+            <a:r>
+              <a:rPr lang="de-AT" dirty="0" smtClean="0"/>
+              <a:t> </a:t>
+            </a:r>
+            <a:r>
+              <a:rPr lang="de-AT" dirty="0" err="1" smtClean="0"/>
+              <a:t>is</a:t>
+            </a:r>
+            <a:r>
+              <a:rPr lang="de-AT" dirty="0" smtClean="0"/>
+              <a:t> </a:t>
+            </a:r>
+            <a:r>
+              <a:rPr lang="de-AT" dirty="0" err="1" smtClean="0"/>
+              <a:t>stored</a:t>
+            </a:r>
+            <a:r>
+              <a:rPr lang="de-AT" dirty="0" smtClean="0"/>
+              <a:t> multiple </a:t>
+            </a:r>
+            <a:r>
+              <a:rPr lang="de-AT" dirty="0" err="1" smtClean="0"/>
+              <a:t>times</a:t>
+            </a:r>
+            <a:r>
+              <a:rPr lang="de-AT" dirty="0" smtClean="0"/>
+              <a:t>.</a:t>
+            </a:r>
+          </a:p>
+          <a:p>
+            <a:endParaRPr lang="de-AT" dirty="0"/>
+          </a:p>
+          <a:p>
+            <a:r>
+              <a:rPr lang="de-AT" dirty="0" smtClean="0"/>
+              <a:t>Pros:</a:t>
+            </a:r>
+          </a:p>
+          <a:p>
+            <a:pPr lvl="1"/>
+            <a:r>
+              <a:rPr lang="de-AT" dirty="0" smtClean="0"/>
+              <a:t>Speeds </a:t>
+            </a:r>
+            <a:r>
+              <a:rPr lang="de-AT" dirty="0" err="1" smtClean="0"/>
+              <a:t>up</a:t>
+            </a:r>
+            <a:r>
+              <a:rPr lang="de-AT" dirty="0" smtClean="0"/>
+              <a:t> </a:t>
+            </a:r>
+            <a:r>
+              <a:rPr lang="de-AT" dirty="0" err="1" smtClean="0"/>
+              <a:t>data</a:t>
+            </a:r>
+            <a:r>
+              <a:rPr lang="de-AT" dirty="0" smtClean="0"/>
+              <a:t> </a:t>
+            </a:r>
+            <a:r>
+              <a:rPr lang="de-AT" dirty="0" err="1" smtClean="0"/>
+              <a:t>access</a:t>
+            </a:r>
+            <a:r>
+              <a:rPr lang="de-AT" dirty="0" smtClean="0"/>
+              <a:t> (</a:t>
+            </a:r>
+            <a:r>
+              <a:rPr lang="de-AT" dirty="0" err="1" smtClean="0"/>
+              <a:t>navigation</a:t>
+            </a:r>
+            <a:r>
+              <a:rPr lang="de-AT" dirty="0" smtClean="0"/>
+              <a:t> </a:t>
+            </a:r>
+            <a:r>
+              <a:rPr lang="de-AT" dirty="0" err="1" smtClean="0"/>
+              <a:t>path</a:t>
+            </a:r>
+            <a:r>
+              <a:rPr lang="de-AT" dirty="0" smtClean="0"/>
+              <a:t> </a:t>
+            </a:r>
+            <a:r>
+              <a:rPr lang="de-AT" dirty="0" err="1" smtClean="0"/>
+              <a:t>is</a:t>
+            </a:r>
+            <a:r>
+              <a:rPr lang="de-AT" dirty="0" smtClean="0"/>
+              <a:t> </a:t>
+            </a:r>
+            <a:r>
+              <a:rPr lang="de-AT" dirty="0" err="1" smtClean="0"/>
+              <a:t>shortened</a:t>
+            </a:r>
+            <a:r>
+              <a:rPr lang="de-AT" dirty="0" smtClean="0"/>
+              <a:t> </a:t>
+            </a:r>
+            <a:r>
+              <a:rPr lang="de-AT" dirty="0" err="1" smtClean="0"/>
+              <a:t>for</a:t>
+            </a:r>
+            <a:r>
+              <a:rPr lang="de-AT" dirty="0" smtClean="0"/>
+              <a:t> </a:t>
+            </a:r>
+            <a:r>
+              <a:rPr lang="de-AT" dirty="0" err="1" smtClean="0"/>
+              <a:t>some</a:t>
+            </a:r>
+            <a:r>
+              <a:rPr lang="de-AT" dirty="0" smtClean="0"/>
+              <a:t> </a:t>
+            </a:r>
+            <a:r>
+              <a:rPr lang="de-AT" dirty="0" err="1" smtClean="0"/>
+              <a:t>operations</a:t>
+            </a:r>
+            <a:r>
+              <a:rPr lang="de-AT" dirty="0" smtClean="0"/>
+              <a:t>)</a:t>
+            </a:r>
+          </a:p>
+          <a:p>
+            <a:pPr lvl="1"/>
+            <a:endParaRPr lang="de-AT" dirty="0"/>
+          </a:p>
+          <a:p>
+            <a:r>
+              <a:rPr lang="de-AT" dirty="0" err="1" smtClean="0"/>
+              <a:t>Cons</a:t>
+            </a:r>
+            <a:r>
+              <a:rPr lang="de-AT" dirty="0" smtClean="0"/>
+              <a:t>:</a:t>
+            </a:r>
+          </a:p>
+          <a:p>
+            <a:pPr lvl="1"/>
+            <a:r>
+              <a:rPr lang="de-AT" dirty="0" smtClean="0"/>
+              <a:t>Additional </a:t>
+            </a:r>
+            <a:r>
+              <a:rPr lang="de-AT" dirty="0" err="1" smtClean="0"/>
+              <a:t>updates</a:t>
+            </a:r>
+            <a:endParaRPr lang="de-AT" dirty="0" smtClean="0"/>
+          </a:p>
+          <a:p>
+            <a:pPr lvl="1"/>
+            <a:r>
+              <a:rPr lang="de-AT" dirty="0" err="1" smtClean="0"/>
+              <a:t>Risk</a:t>
+            </a:r>
+            <a:r>
+              <a:rPr lang="de-AT" dirty="0" smtClean="0"/>
+              <a:t> </a:t>
+            </a:r>
+            <a:r>
+              <a:rPr lang="de-AT" dirty="0" err="1" smtClean="0"/>
+              <a:t>of</a:t>
+            </a:r>
+            <a:r>
+              <a:rPr lang="de-AT" dirty="0" smtClean="0"/>
+              <a:t> </a:t>
+            </a:r>
+            <a:r>
+              <a:rPr lang="de-AT" dirty="0" err="1" smtClean="0"/>
+              <a:t>inconsistency</a:t>
+            </a:r>
+            <a:r>
+              <a:rPr lang="de-AT" dirty="0" smtClean="0"/>
+              <a:t> ( =&gt; </a:t>
+            </a:r>
+            <a:r>
+              <a:rPr lang="de-AT" dirty="0" err="1" smtClean="0"/>
+              <a:t>more</a:t>
+            </a:r>
+            <a:r>
+              <a:rPr lang="de-AT" dirty="0" smtClean="0"/>
+              <a:t> </a:t>
+            </a:r>
+            <a:r>
+              <a:rPr lang="de-AT" dirty="0" err="1" smtClean="0"/>
+              <a:t>consistency</a:t>
+            </a:r>
+            <a:r>
+              <a:rPr lang="de-AT" dirty="0" smtClean="0"/>
+              <a:t> </a:t>
+            </a:r>
+            <a:r>
+              <a:rPr lang="de-AT" dirty="0" err="1" smtClean="0"/>
+              <a:t>checks</a:t>
+            </a:r>
+            <a:r>
+              <a:rPr lang="de-AT" dirty="0" smtClean="0"/>
+              <a:t> </a:t>
+            </a:r>
+            <a:r>
+              <a:rPr lang="de-AT" dirty="0" err="1" smtClean="0"/>
+              <a:t>needed</a:t>
+            </a:r>
+            <a:r>
+              <a:rPr lang="de-AT" dirty="0" smtClean="0"/>
+              <a:t>)</a:t>
+            </a:r>
+          </a:p>
+          <a:p>
+            <a:pPr lvl="1"/>
+            <a:r>
+              <a:rPr lang="de-AT" dirty="0" smtClean="0"/>
+              <a:t>Additional </a:t>
+            </a:r>
+            <a:r>
+              <a:rPr lang="de-AT" dirty="0" err="1" smtClean="0"/>
+              <a:t>storage</a:t>
+            </a:r>
+            <a:r>
+              <a:rPr lang="de-AT" dirty="0" smtClean="0"/>
+              <a:t> </a:t>
+            </a:r>
+            <a:r>
+              <a:rPr lang="de-AT" dirty="0" err="1" smtClean="0"/>
+              <a:t>space</a:t>
+            </a:r>
+            <a:endParaRPr lang="de-AT" dirty="0" smtClean="0"/>
+          </a:p>
+          <a:p>
+            <a:pPr lvl="1"/>
+            <a:endParaRPr lang="de-AT" dirty="0"/>
+          </a:p>
+          <a:p>
+            <a:pPr marL="365760" lvl="1" indent="0">
+              <a:buNone/>
+            </a:pPr>
+            <a:endParaRPr lang="de-AT" dirty="0"/>
+          </a:p>
+        </p:txBody>
+      </p:sp>
+    </p:spTree>
+    <p:extLst>
+      <p:ext uri="{BB962C8B-B14F-4D97-AF65-F5344CB8AC3E}">
+        <p14:creationId xmlns:p14="http://schemas.microsoft.com/office/powerpoint/2010/main" val="526241371"/>
+      </p:ext>
+    </p:extLst>
+  </p:cSld>
+  <p:clrMapOvr>
+    <a:masterClrMapping/>
+  </p:clrMapOvr>
+</p:sld>
+</file>
+
+<file path=ppt/slides/slide13.xml><?xml version="1.0" encoding="utf-8"?>
+<p:sld xmlns:a="http://schemas.openxmlformats.org/drawingml/2006/main" xmlns:r="http://schemas.openxmlformats.org/officeDocument/2006/relationships" xmlns:p="http://schemas.openxmlformats.org/presentationml/2006/main">
+  <p:cSld>
+    <p:spTree>
+      <p:nvGrpSpPr>
+        <p:cNvPr id="1" name=""/>
+        <p:cNvGrpSpPr/>
+        <p:nvPr/>
+      </p:nvGrpSpPr>
+      <p:grpSpPr>
+        <a:xfrm>
+          <a:off x="0" y="0"/>
+          <a:ext cx="0" cy="0"/>
+          <a:chOff x="0" y="0"/>
+          <a:chExt cx="0" cy="0"/>
+        </a:xfrm>
+      </p:grpSpPr>
+      <p:sp>
+        <p:nvSpPr>
+          <p:cNvPr id="2" name="Titel 1"/>
+          <p:cNvSpPr>
+            <a:spLocks noGrp="1"/>
+          </p:cNvSpPr>
+          <p:nvPr>
+            <p:ph type="title"/>
+          </p:nvPr>
+        </p:nvSpPr>
+        <p:spPr/>
+        <p:txBody>
           <a:bodyPr/>
           <a:lstStyle/>
           <a:p>
@@ -4156,7 +4981,7 @@
 </p:sld>
 </file>
 
-<file path=ppt/slides/slide11.xml><?xml version="1.0" encoding="utf-8"?>
+<file path=ppt/slides/slide14.xml><?xml version="1.0" encoding="utf-8"?>
 <p:sld xmlns:a="http://schemas.openxmlformats.org/drawingml/2006/main" xmlns:r="http://schemas.openxmlformats.org/officeDocument/2006/relationships" xmlns:p="http://schemas.openxmlformats.org/presentationml/2006/main">
   <p:cSld>
     <p:spTree>
@@ -4461,7 +5286,7 @@
 </p:sld>
 </file>
 
-<file path=ppt/slides/slide12.xml><?xml version="1.0" encoding="utf-8"?>
+<file path=ppt/slides/slide15.xml><?xml version="1.0" encoding="utf-8"?>
 <p:sld xmlns:a="http://schemas.openxmlformats.org/drawingml/2006/main" xmlns:r="http://schemas.openxmlformats.org/officeDocument/2006/relationships" xmlns:p="http://schemas.openxmlformats.org/presentationml/2006/main">
   <p:cSld>
     <p:spTree>
@@ -4772,7 +5597,7 @@
 </p:sld>
 </file>
 
-<file path=ppt/slides/slide13.xml><?xml version="1.0" encoding="utf-8"?>
+<file path=ppt/slides/slide16.xml><?xml version="1.0" encoding="utf-8"?>
 <p:sld xmlns:a="http://schemas.openxmlformats.org/drawingml/2006/main" xmlns:r="http://schemas.openxmlformats.org/officeDocument/2006/relationships" xmlns:p="http://schemas.openxmlformats.org/presentationml/2006/main">
   <p:cSld>
     <p:spTree>
@@ -4954,7 +5779,7 @@
 </p:sld>
 </file>
 
-<file path=ppt/slides/slide14.xml><?xml version="1.0" encoding="utf-8"?>
+<file path=ppt/slides/slide17.xml><?xml version="1.0" encoding="utf-8"?>
 <p:sld xmlns:a="http://schemas.openxmlformats.org/drawingml/2006/main" xmlns:r="http://schemas.openxmlformats.org/officeDocument/2006/relationships" xmlns:p="http://schemas.openxmlformats.org/presentationml/2006/main">
   <p:cSld>
     <p:spTree>
@@ -5703,7 +6528,7 @@
 </p:sld>
 </file>
 
-<file path=ppt/slides/slide15.xml><?xml version="1.0" encoding="utf-8"?>
+<file path=ppt/slides/slide18.xml><?xml version="1.0" encoding="utf-8"?>
 <p:sld xmlns:a="http://schemas.openxmlformats.org/drawingml/2006/main" xmlns:r="http://schemas.openxmlformats.org/officeDocument/2006/relationships" xmlns:p="http://schemas.openxmlformats.org/presentationml/2006/main">
   <p:cSld>
     <p:spTree>
@@ -6404,7 +7229,7 @@
 </p:sld>
 </file>
 
-<file path=ppt/slides/slide16.xml><?xml version="1.0" encoding="utf-8"?>
+<file path=ppt/slides/slide19.xml><?xml version="1.0" encoding="utf-8"?>
 <p:sld xmlns:a="http://schemas.openxmlformats.org/drawingml/2006/main" xmlns:r="http://schemas.openxmlformats.org/officeDocument/2006/relationships" xmlns:p="http://schemas.openxmlformats.org/presentationml/2006/main">
   <p:cSld>
     <p:spTree>
@@ -6611,7 +7436,185 @@
 </p:sld>
 </file>
 
-<file path=ppt/slides/slide17.xml><?xml version="1.0" encoding="utf-8"?>
+<file path=ppt/slides/slide2.xml><?xml version="1.0" encoding="utf-8"?>
+<p:sld xmlns:a="http://schemas.openxmlformats.org/drawingml/2006/main" xmlns:r="http://schemas.openxmlformats.org/officeDocument/2006/relationships" xmlns:p="http://schemas.openxmlformats.org/presentationml/2006/main">
+  <p:cSld>
+    <p:spTree>
+      <p:nvGrpSpPr>
+        <p:cNvPr id="1" name=""/>
+        <p:cNvGrpSpPr/>
+        <p:nvPr/>
+      </p:nvGrpSpPr>
+      <p:grpSpPr>
+        <a:xfrm>
+          <a:off x="0" y="0"/>
+          <a:ext cx="0" cy="0"/>
+          <a:chOff x="0" y="0"/>
+          <a:chExt cx="0" cy="0"/>
+        </a:xfrm>
+      </p:grpSpPr>
+      <p:sp>
+        <p:nvSpPr>
+          <p:cNvPr id="2" name="Titel 1"/>
+          <p:cNvSpPr>
+            <a:spLocks noGrp="1"/>
+          </p:cNvSpPr>
+          <p:nvPr>
+            <p:ph type="title"/>
+          </p:nvPr>
+        </p:nvSpPr>
+        <p:spPr/>
+        <p:txBody>
+          <a:bodyPr/>
+          <a:lstStyle/>
+          <a:p>
+            <a:r>
+              <a:rPr lang="de-AT" dirty="0" err="1" smtClean="0"/>
+              <a:t>Exercise</a:t>
+            </a:r>
+            <a:r>
+              <a:rPr lang="de-AT" dirty="0" smtClean="0"/>
+              <a:t> 1</a:t>
+            </a:r>
+            <a:endParaRPr lang="de-AT" dirty="0"/>
+          </a:p>
+        </p:txBody>
+      </p:sp>
+      <p:sp>
+        <p:nvSpPr>
+          <p:cNvPr id="3" name="Inhaltsplatzhalter 2"/>
+          <p:cNvSpPr>
+            <a:spLocks noGrp="1"/>
+          </p:cNvSpPr>
+          <p:nvPr>
+            <p:ph sz="quarter" idx="1"/>
+          </p:nvPr>
+        </p:nvSpPr>
+        <p:spPr/>
+        <p:txBody>
+          <a:bodyPr/>
+          <a:lstStyle/>
+          <a:p>
+            <a:r>
+              <a:rPr lang="de-AT" dirty="0" smtClean="0"/>
+              <a:t> </a:t>
+            </a:r>
+            <a:r>
+              <a:rPr lang="de-AT" dirty="0" err="1"/>
+              <a:t>Integrate</a:t>
+            </a:r>
+            <a:r>
+              <a:rPr lang="de-AT" dirty="0"/>
+              <a:t> </a:t>
+            </a:r>
+            <a:r>
+              <a:rPr lang="de-AT" dirty="0" err="1"/>
+              <a:t>these</a:t>
+            </a:r>
+            <a:r>
+              <a:rPr lang="de-AT" dirty="0"/>
+              <a:t> </a:t>
+            </a:r>
+            <a:r>
+              <a:rPr lang="de-AT" dirty="0" err="1"/>
+              <a:t>views</a:t>
+            </a:r>
+            <a:r>
+              <a:rPr lang="de-AT" dirty="0"/>
+              <a:t>: </a:t>
+            </a:r>
+          </a:p>
+          <a:p>
+            <a:pPr marL="914400" lvl="1" indent="-514350">
+              <a:buFont typeface="+mj-lt"/>
+              <a:buAutoNum type="alphaLcParenR"/>
+            </a:pPr>
+            <a:r>
+              <a:rPr lang="en-US" dirty="0" smtClean="0"/>
+              <a:t>identify </a:t>
+            </a:r>
+            <a:r>
+              <a:rPr lang="en-US" dirty="0"/>
+              <a:t>conflicts (and their conflict types) </a:t>
+            </a:r>
+          </a:p>
+          <a:p>
+            <a:pPr marL="914400" lvl="1" indent="-514350">
+              <a:buFont typeface="+mj-lt"/>
+              <a:buAutoNum type="alphaLcParenR"/>
+            </a:pPr>
+            <a:r>
+              <a:rPr lang="de-AT" dirty="0" err="1" smtClean="0"/>
+              <a:t>propose</a:t>
+            </a:r>
+            <a:r>
+              <a:rPr lang="de-AT" dirty="0" smtClean="0"/>
+              <a:t> </a:t>
+            </a:r>
+            <a:r>
+              <a:rPr lang="de-AT" dirty="0" err="1"/>
+              <a:t>scenarios</a:t>
+            </a:r>
+            <a:r>
+              <a:rPr lang="de-AT" dirty="0"/>
+              <a:t> </a:t>
+            </a:r>
+            <a:r>
+              <a:rPr lang="de-AT" dirty="0" err="1"/>
+              <a:t>and</a:t>
+            </a:r>
+            <a:r>
+              <a:rPr lang="de-AT" dirty="0"/>
+              <a:t> </a:t>
+            </a:r>
+            <a:r>
+              <a:rPr lang="de-AT" dirty="0" err="1"/>
+              <a:t>interschema</a:t>
+            </a:r>
+            <a:r>
+              <a:rPr lang="de-AT" dirty="0"/>
+              <a:t> </a:t>
+            </a:r>
+            <a:r>
+              <a:rPr lang="de-AT" dirty="0" err="1"/>
+              <a:t>properties</a:t>
+            </a:r>
+            <a:r>
+              <a:rPr lang="de-AT" dirty="0"/>
+              <a:t> </a:t>
+            </a:r>
+          </a:p>
+          <a:p>
+            <a:pPr marL="914400" lvl="1" indent="-514350">
+              <a:buFont typeface="+mj-lt"/>
+              <a:buAutoNum type="alphaLcParenR"/>
+            </a:pPr>
+            <a:r>
+              <a:rPr lang="en-US" dirty="0" smtClean="0"/>
+              <a:t>integrate </a:t>
+            </a:r>
+            <a:r>
+              <a:rPr lang="en-US" dirty="0"/>
+              <a:t>the schemas into one schema. </a:t>
+            </a:r>
+            <a:endParaRPr lang="de-AT" dirty="0"/>
+          </a:p>
+        </p:txBody>
+      </p:sp>
+    </p:spTree>
+    <p:extLst>
+      <p:ext uri="{BB962C8B-B14F-4D97-AF65-F5344CB8AC3E}">
+        <p14:creationId xmlns:p14="http://schemas.microsoft.com/office/powerpoint/2010/main" val="3160386597"/>
+      </p:ext>
+    </p:extLst>
+  </p:cSld>
+  <p:clrMapOvr>
+    <a:masterClrMapping/>
+  </p:clrMapOvr>
+</p:sld>
+</file>
+
+<file path=ppt/slides/slide20.xml><?xml version="1.0" encoding="utf-8"?>
 <p:sld xmlns:a="http://schemas.openxmlformats.org/drawingml/2006/main" xmlns:r="http://schemas.openxmlformats.org/officeDocument/2006/relationships" xmlns:p="http://schemas.openxmlformats.org/presentationml/2006/main">
   <p:cSld>
     <p:spTree>
@@ -6732,7 +7735,7 @@
 </p:sld>
 </file>
 
-<file path=ppt/slides/slide18.xml><?xml version="1.0" encoding="utf-8"?>
+<file path=ppt/slides/slide21.xml><?xml version="1.0" encoding="utf-8"?>
 <p:sld xmlns:a="http://schemas.openxmlformats.org/drawingml/2006/main" xmlns:r="http://schemas.openxmlformats.org/officeDocument/2006/relationships" xmlns:p="http://schemas.openxmlformats.org/presentationml/2006/main">
   <p:cSld>
     <p:spTree>
@@ -7028,7 +8031,7 @@
 </p:sld>
 </file>
 
-<file path=ppt/slides/slide19.xml><?xml version="1.0" encoding="utf-8"?>
+<file path=ppt/slides/slide22.xml><?xml version="1.0" encoding="utf-8"?>
 <p:sld xmlns:a="http://schemas.openxmlformats.org/drawingml/2006/main" xmlns:r="http://schemas.openxmlformats.org/officeDocument/2006/relationships" xmlns:p="http://schemas.openxmlformats.org/presentationml/2006/main">
   <p:cSld>
     <p:spTree>
@@ -7209,7 +8212,6 @@
               <a:rPr lang="de-AT" dirty="0" smtClean="0"/>
               <a:t> </a:t>
             </a:r>
-            <a:endParaRPr lang="de-AT" dirty="0" smtClean="0"/>
           </a:p>
           <a:p>
             <a:pPr lvl="1"/>
@@ -7349,185 +8351,7 @@
 </p:sld>
 </file>
 
-<file path=ppt/slides/slide2.xml><?xml version="1.0" encoding="utf-8"?>
-<p:sld xmlns:a="http://schemas.openxmlformats.org/drawingml/2006/main" xmlns:r="http://schemas.openxmlformats.org/officeDocument/2006/relationships" xmlns:p="http://schemas.openxmlformats.org/presentationml/2006/main">
-  <p:cSld>
-    <p:spTree>
-      <p:nvGrpSpPr>
-        <p:cNvPr id="1" name=""/>
-        <p:cNvGrpSpPr/>
-        <p:nvPr/>
-      </p:nvGrpSpPr>
-      <p:grpSpPr>
-        <a:xfrm>
-          <a:off x="0" y="0"/>
-          <a:ext cx="0" cy="0"/>
-          <a:chOff x="0" y="0"/>
-          <a:chExt cx="0" cy="0"/>
-        </a:xfrm>
-      </p:grpSpPr>
-      <p:sp>
-        <p:nvSpPr>
-          <p:cNvPr id="2" name="Titel 1"/>
-          <p:cNvSpPr>
-            <a:spLocks noGrp="1"/>
-          </p:cNvSpPr>
-          <p:nvPr>
-            <p:ph type="title"/>
-          </p:nvPr>
-        </p:nvSpPr>
-        <p:spPr/>
-        <p:txBody>
-          <a:bodyPr/>
-          <a:lstStyle/>
-          <a:p>
-            <a:r>
-              <a:rPr lang="de-AT" dirty="0" err="1" smtClean="0"/>
-              <a:t>Exercise</a:t>
-            </a:r>
-            <a:r>
-              <a:rPr lang="de-AT" dirty="0" smtClean="0"/>
-              <a:t> 1</a:t>
-            </a:r>
-            <a:endParaRPr lang="de-AT" dirty="0"/>
-          </a:p>
-        </p:txBody>
-      </p:sp>
-      <p:sp>
-        <p:nvSpPr>
-          <p:cNvPr id="3" name="Inhaltsplatzhalter 2"/>
-          <p:cNvSpPr>
-            <a:spLocks noGrp="1"/>
-          </p:cNvSpPr>
-          <p:nvPr>
-            <p:ph sz="quarter" idx="1"/>
-          </p:nvPr>
-        </p:nvSpPr>
-        <p:spPr/>
-        <p:txBody>
-          <a:bodyPr/>
-          <a:lstStyle/>
-          <a:p>
-            <a:r>
-              <a:rPr lang="de-AT" dirty="0" smtClean="0"/>
-              <a:t> </a:t>
-            </a:r>
-            <a:r>
-              <a:rPr lang="de-AT" dirty="0" err="1"/>
-              <a:t>Integrate</a:t>
-            </a:r>
-            <a:r>
-              <a:rPr lang="de-AT" dirty="0"/>
-              <a:t> </a:t>
-            </a:r>
-            <a:r>
-              <a:rPr lang="de-AT" dirty="0" err="1"/>
-              <a:t>these</a:t>
-            </a:r>
-            <a:r>
-              <a:rPr lang="de-AT" dirty="0"/>
-              <a:t> </a:t>
-            </a:r>
-            <a:r>
-              <a:rPr lang="de-AT" dirty="0" err="1"/>
-              <a:t>views</a:t>
-            </a:r>
-            <a:r>
-              <a:rPr lang="de-AT" dirty="0"/>
-              <a:t>: </a:t>
-            </a:r>
-          </a:p>
-          <a:p>
-            <a:pPr marL="914400" lvl="1" indent="-514350">
-              <a:buFont typeface="+mj-lt"/>
-              <a:buAutoNum type="alphaLcParenR"/>
-            </a:pPr>
-            <a:r>
-              <a:rPr lang="en-US" dirty="0" smtClean="0"/>
-              <a:t>identify </a:t>
-            </a:r>
-            <a:r>
-              <a:rPr lang="en-US" dirty="0"/>
-              <a:t>conflicts (and their conflict types) </a:t>
-            </a:r>
-          </a:p>
-          <a:p>
-            <a:pPr marL="914400" lvl="1" indent="-514350">
-              <a:buFont typeface="+mj-lt"/>
-              <a:buAutoNum type="alphaLcParenR"/>
-            </a:pPr>
-            <a:r>
-              <a:rPr lang="de-AT" dirty="0" err="1" smtClean="0"/>
-              <a:t>propose</a:t>
-            </a:r>
-            <a:r>
-              <a:rPr lang="de-AT" dirty="0" smtClean="0"/>
-              <a:t> </a:t>
-            </a:r>
-            <a:r>
-              <a:rPr lang="de-AT" dirty="0" err="1"/>
-              <a:t>scenarios</a:t>
-            </a:r>
-            <a:r>
-              <a:rPr lang="de-AT" dirty="0"/>
-              <a:t> </a:t>
-            </a:r>
-            <a:r>
-              <a:rPr lang="de-AT" dirty="0" err="1"/>
-              <a:t>and</a:t>
-            </a:r>
-            <a:r>
-              <a:rPr lang="de-AT" dirty="0"/>
-              <a:t> </a:t>
-            </a:r>
-            <a:r>
-              <a:rPr lang="de-AT" dirty="0" err="1"/>
-              <a:t>interschema</a:t>
-            </a:r>
-            <a:r>
-              <a:rPr lang="de-AT" dirty="0"/>
-              <a:t> </a:t>
-            </a:r>
-            <a:r>
-              <a:rPr lang="de-AT" dirty="0" err="1"/>
-              <a:t>properties</a:t>
-            </a:r>
-            <a:r>
-              <a:rPr lang="de-AT" dirty="0"/>
-              <a:t> </a:t>
-            </a:r>
-          </a:p>
-          <a:p>
-            <a:pPr marL="914400" lvl="1" indent="-514350">
-              <a:buFont typeface="+mj-lt"/>
-              <a:buAutoNum type="alphaLcParenR"/>
-            </a:pPr>
-            <a:r>
-              <a:rPr lang="en-US" dirty="0" smtClean="0"/>
-              <a:t>integrate </a:t>
-            </a:r>
-            <a:r>
-              <a:rPr lang="en-US" dirty="0"/>
-              <a:t>the schemas into one schema. </a:t>
-            </a:r>
-            <a:endParaRPr lang="de-AT" dirty="0"/>
-          </a:p>
-        </p:txBody>
-      </p:sp>
-    </p:spTree>
-    <p:extLst>
-      <p:ext uri="{BB962C8B-B14F-4D97-AF65-F5344CB8AC3E}">
-        <p14:creationId xmlns:p14="http://schemas.microsoft.com/office/powerpoint/2010/main" val="3160386597"/>
-      </p:ext>
-    </p:extLst>
-  </p:cSld>
-  <p:clrMapOvr>
-    <a:masterClrMapping/>
-  </p:clrMapOvr>
-</p:sld>
-</file>
-
-<file path=ppt/slides/slide20.xml><?xml version="1.0" encoding="utf-8"?>
+<file path=ppt/slides/slide23.xml><?xml version="1.0" encoding="utf-8"?>
 <p:sld xmlns:a="http://schemas.openxmlformats.org/drawingml/2006/main" xmlns:r="http://schemas.openxmlformats.org/officeDocument/2006/relationships" xmlns:p="http://schemas.openxmlformats.org/presentationml/2006/main">
   <p:cSld>
     <p:spTree>
@@ -7777,7 +8601,7 @@
 </p:sld>
 </file>
 
-<file path=ppt/slides/slide21.xml><?xml version="1.0" encoding="utf-8"?>
+<file path=ppt/slides/slide24.xml><?xml version="1.0" encoding="utf-8"?>
 <p:sld xmlns:a="http://schemas.openxmlformats.org/drawingml/2006/main" xmlns:r="http://schemas.openxmlformats.org/officeDocument/2006/relationships" xmlns:p="http://schemas.openxmlformats.org/presentationml/2006/main">
   <p:cSld>
     <p:spTree>
@@ -8021,7 +8845,7 @@
 </p:sld>
 </file>
 
-<file path=ppt/slides/slide22.xml><?xml version="1.0" encoding="utf-8"?>
+<file path=ppt/slides/slide25.xml><?xml version="1.0" encoding="utf-8"?>
 <p:sld xmlns:a="http://schemas.openxmlformats.org/drawingml/2006/main" xmlns:r="http://schemas.openxmlformats.org/officeDocument/2006/relationships" xmlns:p="http://schemas.openxmlformats.org/presentationml/2006/main">
   <p:cSld>
     <p:spTree>
@@ -8282,7 +9106,7 @@
 </p:sld>
 </file>
 
-<file path=ppt/slides/slide23.xml><?xml version="1.0" encoding="utf-8"?>
+<file path=ppt/slides/slide26.xml><?xml version="1.0" encoding="utf-8"?>
 <p:sld xmlns:a="http://schemas.openxmlformats.org/drawingml/2006/main" xmlns:r="http://schemas.openxmlformats.org/officeDocument/2006/relationships" xmlns:p="http://schemas.openxmlformats.org/presentationml/2006/main">
   <p:cSld>
     <p:spTree>
@@ -9003,7 +9827,7 @@
 </p:sld>
 </file>
 
-<file path=ppt/slides/slide24.xml><?xml version="1.0" encoding="utf-8"?>
+<file path=ppt/slides/slide27.xml><?xml version="1.0" encoding="utf-8"?>
 <p:sld xmlns:a="http://schemas.openxmlformats.org/drawingml/2006/main" xmlns:r="http://schemas.openxmlformats.org/officeDocument/2006/relationships" xmlns:p="http://schemas.openxmlformats.org/presentationml/2006/main">
   <p:cSld>
     <p:spTree>
@@ -9116,7 +9940,7 @@
 </p:sld>
 </file>
 
-<file path=ppt/slides/slide25.xml><?xml version="1.0" encoding="utf-8"?>
+<file path=ppt/slides/slide28.xml><?xml version="1.0" encoding="utf-8"?>
 <p:sld xmlns:a="http://schemas.openxmlformats.org/drawingml/2006/main" xmlns:r="http://schemas.openxmlformats.org/officeDocument/2006/relationships" xmlns:p="http://schemas.openxmlformats.org/presentationml/2006/main">
   <p:cSld>
     <p:spTree>
@@ -9231,7 +10055,7 @@
 </p:sld>
 </file>
 
-<file path=ppt/slides/slide26.xml><?xml version="1.0" encoding="utf-8"?>
+<file path=ppt/slides/slide29.xml><?xml version="1.0" encoding="utf-8"?>
 <p:sld xmlns:a="http://schemas.openxmlformats.org/drawingml/2006/main" xmlns:r="http://schemas.openxmlformats.org/officeDocument/2006/relationships" xmlns:p="http://schemas.openxmlformats.org/presentationml/2006/main">
   <p:cSld>
     <p:spTree>
@@ -9349,7 +10173,356 @@
 </p:sld>
 </file>
 
-<file path=ppt/slides/slide27.xml><?xml version="1.0" encoding="utf-8"?>
+<file path=ppt/slides/slide3.xml><?xml version="1.0" encoding="utf-8"?>
+<p:sld xmlns:a="http://schemas.openxmlformats.org/drawingml/2006/main" xmlns:r="http://schemas.openxmlformats.org/officeDocument/2006/relationships" xmlns:p="http://schemas.openxmlformats.org/presentationml/2006/main">
+  <p:cSld>
+    <p:spTree>
+      <p:nvGrpSpPr>
+        <p:cNvPr id="1" name=""/>
+        <p:cNvGrpSpPr/>
+        <p:nvPr/>
+      </p:nvGrpSpPr>
+      <p:grpSpPr>
+        <a:xfrm>
+          <a:off x="0" y="0"/>
+          <a:ext cx="0" cy="0"/>
+          <a:chOff x="0" y="0"/>
+          <a:chExt cx="0" cy="0"/>
+        </a:xfrm>
+      </p:grpSpPr>
+      <p:sp>
+        <p:nvSpPr>
+          <p:cNvPr id="2" name="Titel 1"/>
+          <p:cNvSpPr>
+            <a:spLocks noGrp="1"/>
+          </p:cNvSpPr>
+          <p:nvPr>
+            <p:ph type="title"/>
+          </p:nvPr>
+        </p:nvSpPr>
+        <p:spPr/>
+        <p:txBody>
+          <a:bodyPr/>
+          <a:lstStyle/>
+          <a:p>
+            <a:r>
+              <a:rPr lang="de-AT" dirty="0" err="1" smtClean="0"/>
+              <a:t>Exercise</a:t>
+            </a:r>
+            <a:r>
+              <a:rPr lang="de-AT" dirty="0" smtClean="0"/>
+              <a:t> 1 - </a:t>
+            </a:r>
+            <a:r>
+              <a:rPr lang="de-AT" dirty="0" err="1" smtClean="0"/>
+              <a:t>Conflicts</a:t>
+            </a:r>
+            <a:endParaRPr lang="de-AT" dirty="0"/>
+          </a:p>
+        </p:txBody>
+      </p:sp>
+      <p:sp>
+        <p:nvSpPr>
+          <p:cNvPr id="3" name="Inhaltsplatzhalter 2"/>
+          <p:cNvSpPr>
+            <a:spLocks noGrp="1"/>
+          </p:cNvSpPr>
+          <p:nvPr>
+            <p:ph sz="quarter" idx="1"/>
+          </p:nvPr>
+        </p:nvSpPr>
+        <p:spPr/>
+        <p:txBody>
+          <a:bodyPr>
+            <a:normAutofit lnSpcReduction="10000"/>
+          </a:bodyPr>
+          <a:lstStyle/>
+          <a:p>
+            <a:r>
+              <a:rPr lang="de-AT" dirty="0" err="1" smtClean="0"/>
+              <a:t>Naming</a:t>
+            </a:r>
+            <a:r>
+              <a:rPr lang="de-AT" dirty="0" smtClean="0"/>
+              <a:t> </a:t>
+            </a:r>
+            <a:r>
+              <a:rPr lang="de-AT" dirty="0" err="1" smtClean="0"/>
+              <a:t>conflicts</a:t>
+            </a:r>
+            <a:endParaRPr lang="de-AT" dirty="0" smtClean="0"/>
+          </a:p>
+          <a:p>
+            <a:pPr lvl="1"/>
+            <a:r>
+              <a:rPr lang="de-AT" dirty="0" err="1" smtClean="0"/>
+              <a:t>homonyms</a:t>
+            </a:r>
+            <a:r>
+              <a:rPr lang="de-AT" dirty="0" smtClean="0"/>
+              <a:t>: </a:t>
+            </a:r>
+            <a:r>
+              <a:rPr lang="de-AT" dirty="0" err="1" smtClean="0"/>
+              <a:t>one</a:t>
+            </a:r>
+            <a:r>
+              <a:rPr lang="de-AT" dirty="0" smtClean="0"/>
+              <a:t> </a:t>
+            </a:r>
+            <a:r>
+              <a:rPr lang="de-AT" dirty="0" err="1" smtClean="0"/>
+              <a:t>word</a:t>
+            </a:r>
+            <a:r>
+              <a:rPr lang="de-AT" dirty="0" smtClean="0"/>
+              <a:t>, different </a:t>
+            </a:r>
+            <a:r>
+              <a:rPr lang="de-AT" dirty="0" err="1" smtClean="0"/>
+              <a:t>meaning</a:t>
+            </a:r>
+            <a:endParaRPr lang="de-AT" dirty="0" smtClean="0"/>
+          </a:p>
+          <a:p>
+            <a:pPr lvl="1"/>
+            <a:r>
+              <a:rPr lang="de-AT" dirty="0" err="1" smtClean="0"/>
+              <a:t>synonyms</a:t>
+            </a:r>
+            <a:r>
+              <a:rPr lang="de-AT" dirty="0" smtClean="0"/>
+              <a:t>: different </a:t>
+            </a:r>
+            <a:r>
+              <a:rPr lang="de-AT" dirty="0" err="1" smtClean="0"/>
+              <a:t>words</a:t>
+            </a:r>
+            <a:r>
+              <a:rPr lang="de-AT" dirty="0" smtClean="0"/>
+              <a:t>, same </a:t>
+            </a:r>
+            <a:r>
+              <a:rPr lang="de-AT" dirty="0" err="1" smtClean="0"/>
+              <a:t>meaning</a:t>
+            </a:r>
+            <a:endParaRPr lang="de-AT" dirty="0" smtClean="0"/>
+          </a:p>
+          <a:p>
+            <a:pPr lvl="1"/>
+            <a:r>
+              <a:rPr lang="de-AT" dirty="0" err="1" smtClean="0"/>
+              <a:t>Similarity</a:t>
+            </a:r>
+            <a:r>
+              <a:rPr lang="de-AT" dirty="0" smtClean="0"/>
+              <a:t>: different </a:t>
+            </a:r>
+            <a:r>
+              <a:rPr lang="de-AT" dirty="0" err="1" smtClean="0"/>
+              <a:t>names</a:t>
+            </a:r>
+            <a:r>
+              <a:rPr lang="de-AT" dirty="0" smtClean="0"/>
+              <a:t>, same </a:t>
+            </a:r>
+            <a:r>
+              <a:rPr lang="de-AT" dirty="0" err="1" smtClean="0"/>
+              <a:t>neighbours</a:t>
+            </a:r>
+            <a:r>
+              <a:rPr lang="de-AT" dirty="0"/>
+              <a:t>/</a:t>
+            </a:r>
+            <a:r>
+              <a:rPr lang="de-AT" dirty="0" err="1" smtClean="0"/>
+              <a:t>constraints</a:t>
+            </a:r>
+            <a:endParaRPr lang="de-AT" dirty="0" smtClean="0"/>
+          </a:p>
+          <a:p>
+            <a:pPr lvl="1"/>
+            <a:r>
+              <a:rPr lang="de-AT" dirty="0" err="1" smtClean="0"/>
+              <a:t>Mismatch</a:t>
+            </a:r>
+            <a:r>
+              <a:rPr lang="de-AT" dirty="0" smtClean="0"/>
+              <a:t>: same </a:t>
+            </a:r>
+            <a:r>
+              <a:rPr lang="de-AT" dirty="0" err="1" smtClean="0"/>
+              <a:t>name</a:t>
+            </a:r>
+            <a:r>
+              <a:rPr lang="de-AT" dirty="0" smtClean="0"/>
+              <a:t>, different </a:t>
+            </a:r>
+            <a:r>
+              <a:rPr lang="de-AT" dirty="0" err="1" smtClean="0"/>
+              <a:t>neighbours</a:t>
+            </a:r>
+            <a:r>
+              <a:rPr lang="de-AT" dirty="0" smtClean="0"/>
+              <a:t> /</a:t>
+            </a:r>
+            <a:r>
+              <a:rPr lang="de-AT" dirty="0" err="1" smtClean="0"/>
+              <a:t>constraints</a:t>
+            </a:r>
+            <a:endParaRPr lang="de-AT" dirty="0" smtClean="0"/>
+          </a:p>
+          <a:p>
+            <a:r>
+              <a:rPr lang="de-AT" dirty="0" err="1" smtClean="0"/>
+              <a:t>Structural</a:t>
+            </a:r>
+            <a:r>
+              <a:rPr lang="de-AT" dirty="0" smtClean="0"/>
+              <a:t> </a:t>
+            </a:r>
+            <a:r>
+              <a:rPr lang="de-AT" dirty="0" err="1" smtClean="0"/>
+              <a:t>conflicts</a:t>
+            </a:r>
+            <a:endParaRPr lang="de-AT" dirty="0"/>
+          </a:p>
+          <a:p>
+            <a:pPr lvl="1"/>
+            <a:r>
+              <a:rPr lang="de-AT" dirty="0" err="1" smtClean="0"/>
+              <a:t>Identical</a:t>
+            </a:r>
+            <a:r>
+              <a:rPr lang="de-AT" dirty="0" smtClean="0"/>
+              <a:t> </a:t>
+            </a:r>
+            <a:r>
+              <a:rPr lang="de-AT" dirty="0" err="1" smtClean="0"/>
+              <a:t>concepts</a:t>
+            </a:r>
+            <a:r>
+              <a:rPr lang="de-AT" dirty="0" smtClean="0"/>
+              <a:t>: same </a:t>
+            </a:r>
+            <a:r>
+              <a:rPr lang="de-AT" dirty="0" err="1" smtClean="0"/>
+              <a:t>structure</a:t>
+            </a:r>
+            <a:r>
+              <a:rPr lang="de-AT" dirty="0" smtClean="0"/>
+              <a:t> </a:t>
+            </a:r>
+            <a:r>
+              <a:rPr lang="de-AT" dirty="0" err="1" smtClean="0"/>
+              <a:t>and</a:t>
+            </a:r>
+            <a:r>
+              <a:rPr lang="de-AT" dirty="0" smtClean="0"/>
+              <a:t> </a:t>
+            </a:r>
+            <a:r>
+              <a:rPr lang="de-AT" dirty="0" err="1" smtClean="0"/>
+              <a:t>neighbours</a:t>
+            </a:r>
+            <a:endParaRPr lang="de-AT" dirty="0" smtClean="0"/>
+          </a:p>
+          <a:p>
+            <a:pPr lvl="1"/>
+            <a:r>
+              <a:rPr lang="de-AT" dirty="0" err="1" smtClean="0"/>
+              <a:t>Compatible</a:t>
+            </a:r>
+            <a:r>
+              <a:rPr lang="de-AT" dirty="0" smtClean="0"/>
+              <a:t> </a:t>
+            </a:r>
+            <a:r>
+              <a:rPr lang="de-AT" dirty="0" err="1" smtClean="0"/>
+              <a:t>concepts</a:t>
+            </a:r>
+            <a:r>
+              <a:rPr lang="de-AT" dirty="0" smtClean="0"/>
+              <a:t>: different </a:t>
+            </a:r>
+            <a:r>
+              <a:rPr lang="de-AT" dirty="0" err="1" smtClean="0"/>
+              <a:t>structure</a:t>
+            </a:r>
+            <a:r>
+              <a:rPr lang="de-AT" dirty="0" smtClean="0"/>
+              <a:t> /</a:t>
+            </a:r>
+            <a:r>
+              <a:rPr lang="de-AT" dirty="0" err="1" smtClean="0"/>
+              <a:t>neighbours</a:t>
+            </a:r>
+            <a:r>
+              <a:rPr lang="de-AT" dirty="0" smtClean="0"/>
+              <a:t>, but </a:t>
+            </a:r>
+            <a:r>
+              <a:rPr lang="de-AT" dirty="0" err="1" smtClean="0"/>
+              <a:t>no</a:t>
+            </a:r>
+            <a:r>
+              <a:rPr lang="de-AT" dirty="0" smtClean="0"/>
+              <a:t> </a:t>
+            </a:r>
+            <a:r>
+              <a:rPr lang="de-AT" dirty="0" err="1" smtClean="0"/>
+              <a:t>contradiction</a:t>
+            </a:r>
+            <a:endParaRPr lang="de-AT" dirty="0" smtClean="0"/>
+          </a:p>
+          <a:p>
+            <a:pPr lvl="1"/>
+            <a:r>
+              <a:rPr lang="de-AT" dirty="0" err="1" smtClean="0"/>
+              <a:t>Incompatible</a:t>
+            </a:r>
+            <a:r>
+              <a:rPr lang="de-AT" dirty="0" smtClean="0"/>
+              <a:t> </a:t>
+            </a:r>
+            <a:r>
+              <a:rPr lang="de-AT" dirty="0" err="1" smtClean="0"/>
+              <a:t>concepts</a:t>
+            </a:r>
+            <a:r>
+              <a:rPr lang="de-AT" dirty="0" smtClean="0"/>
+              <a:t>: </a:t>
+            </a:r>
+            <a:r>
+              <a:rPr lang="de-AT" dirty="0" err="1" smtClean="0"/>
+              <a:t>structural</a:t>
+            </a:r>
+            <a:r>
+              <a:rPr lang="de-AT" dirty="0" smtClean="0"/>
+              <a:t> </a:t>
+            </a:r>
+            <a:r>
+              <a:rPr lang="de-AT" dirty="0" err="1" smtClean="0"/>
+              <a:t>contradiction</a:t>
+            </a:r>
+            <a:endParaRPr lang="de-AT" dirty="0"/>
+          </a:p>
+        </p:txBody>
+      </p:sp>
+    </p:spTree>
+    <p:extLst>
+      <p:ext uri="{BB962C8B-B14F-4D97-AF65-F5344CB8AC3E}">
+        <p14:creationId xmlns:p14="http://schemas.microsoft.com/office/powerpoint/2010/main" val="180451916"/>
+      </p:ext>
+    </p:extLst>
+  </p:cSld>
+  <p:clrMapOvr>
+    <a:masterClrMapping/>
+  </p:clrMapOvr>
+</p:sld>
+</file>
+
+<file path=ppt/slides/slide30.xml><?xml version="1.0" encoding="utf-8"?>
 <p:sld xmlns:a="http://schemas.openxmlformats.org/drawingml/2006/main" xmlns:r="http://schemas.openxmlformats.org/officeDocument/2006/relationships" xmlns:p="http://schemas.openxmlformats.org/presentationml/2006/main">
   <p:cSld>
     <p:spTree>
@@ -9476,7 +10649,7 @@
 </p:sld>
 </file>
 
-<file path=ppt/slides/slide28.xml><?xml version="1.0" encoding="utf-8"?>
+<file path=ppt/slides/slide31.xml><?xml version="1.0" encoding="utf-8"?>
 <p:sld xmlns:a="http://schemas.openxmlformats.org/drawingml/2006/main" xmlns:r="http://schemas.openxmlformats.org/officeDocument/2006/relationships" xmlns:p="http://schemas.openxmlformats.org/presentationml/2006/main">
   <p:cSld>
     <p:spTree>
@@ -9641,7 +10814,7 @@
 </p:sld>
 </file>
 
-<file path=ppt/slides/slide29.xml><?xml version="1.0" encoding="utf-8"?>
+<file path=ppt/slides/slide32.xml><?xml version="1.0" encoding="utf-8"?>
 <p:sld xmlns:a="http://schemas.openxmlformats.org/drawingml/2006/main" xmlns:r="http://schemas.openxmlformats.org/officeDocument/2006/relationships" xmlns:p="http://schemas.openxmlformats.org/presentationml/2006/main">
   <p:cSld>
     <p:spTree>
@@ -9890,7 +11063,7 @@
 </p:sld>
 </file>
 
-<file path=ppt/slides/slide3.xml><?xml version="1.0" encoding="utf-8"?>
+<file path=ppt/slides/slide4.xml><?xml version="1.0" encoding="utf-8"?>
 <p:sld xmlns:a="http://schemas.openxmlformats.org/drawingml/2006/main" xmlns:r="http://schemas.openxmlformats.org/officeDocument/2006/relationships" xmlns:p="http://schemas.openxmlformats.org/presentationml/2006/main">
   <p:cSld>
     <p:spTree>
@@ -9923,8 +11096,226 @@
           <a:lstStyle/>
           <a:p>
             <a:r>
-              <a:rPr lang="en-US" dirty="0"/>
-              <a:t>identify conflicts</a:t>
+              <a:rPr lang="de-AT" dirty="0" err="1" smtClean="0"/>
+              <a:t>Exercise</a:t>
+            </a:r>
+            <a:r>
+              <a:rPr lang="de-AT" dirty="0" smtClean="0"/>
+              <a:t> 1 – </a:t>
+            </a:r>
+            <a:r>
+              <a:rPr lang="de-AT" dirty="0" err="1" smtClean="0"/>
+              <a:t>Identify</a:t>
+            </a:r>
+            <a:r>
+              <a:rPr lang="de-AT" dirty="0" smtClean="0"/>
+              <a:t> </a:t>
+            </a:r>
+            <a:r>
+              <a:rPr lang="de-AT" dirty="0" err="1" smtClean="0"/>
+              <a:t>Conflicts</a:t>
+            </a:r>
+            <a:r>
+              <a:rPr lang="de-AT" dirty="0" smtClean="0"/>
+              <a:t> 1</a:t>
+            </a:r>
+            <a:endParaRPr lang="de-AT" dirty="0"/>
+          </a:p>
+        </p:txBody>
+      </p:sp>
+      <p:pic>
+        <p:nvPicPr>
+          <p:cNvPr id="4" name="Inhaltsplatzhalter 3"/>
+          <p:cNvPicPr>
+            <a:picLocks noGrp="1" noChangeAspect="1"/>
+          </p:cNvPicPr>
+          <p:nvPr>
+            <p:ph sz="quarter" idx="1"/>
+          </p:nvPr>
+        </p:nvPicPr>
+        <p:blipFill>
+          <a:blip r:embed="rId2">
+            <a:extLst>
+              <a:ext uri="{28A0092B-C50C-407E-A947-70E740481C1C}">
+                <a14:useLocalDpi xmlns:a14="http://schemas.microsoft.com/office/drawing/2010/main" val="0"/>
+              </a:ext>
+            </a:extLst>
+          </a:blip>
+          <a:stretch>
+            <a:fillRect/>
+          </a:stretch>
+        </p:blipFill>
+        <p:spPr>
+          <a:xfrm>
+            <a:off x="155284" y="1628800"/>
+            <a:ext cx="8737195" cy="5040560"/>
+          </a:xfrm>
+        </p:spPr>
+      </p:pic>
+    </p:spTree>
+    <p:extLst>
+      <p:ext uri="{BB962C8B-B14F-4D97-AF65-F5344CB8AC3E}">
+        <p14:creationId xmlns:p14="http://schemas.microsoft.com/office/powerpoint/2010/main" val="3096610882"/>
+      </p:ext>
+    </p:extLst>
+  </p:cSld>
+  <p:clrMapOvr>
+    <a:masterClrMapping/>
+  </p:clrMapOvr>
+</p:sld>
+</file>
+
+<file path=ppt/slides/slide5.xml><?xml version="1.0" encoding="utf-8"?>
+<p:sld xmlns:a="http://schemas.openxmlformats.org/drawingml/2006/main" xmlns:r="http://schemas.openxmlformats.org/officeDocument/2006/relationships" xmlns:p="http://schemas.openxmlformats.org/presentationml/2006/main">
+  <p:cSld>
+    <p:spTree>
+      <p:nvGrpSpPr>
+        <p:cNvPr id="1" name=""/>
+        <p:cNvGrpSpPr/>
+        <p:nvPr/>
+      </p:nvGrpSpPr>
+      <p:grpSpPr>
+        <a:xfrm>
+          <a:off x="0" y="0"/>
+          <a:ext cx="0" cy="0"/>
+          <a:chOff x="0" y="0"/>
+          <a:chExt cx="0" cy="0"/>
+        </a:xfrm>
+      </p:grpSpPr>
+      <p:sp>
+        <p:nvSpPr>
+          <p:cNvPr id="2" name="Titel 1"/>
+          <p:cNvSpPr>
+            <a:spLocks noGrp="1"/>
+          </p:cNvSpPr>
+          <p:nvPr>
+            <p:ph type="title"/>
+          </p:nvPr>
+        </p:nvSpPr>
+        <p:spPr/>
+        <p:txBody>
+          <a:bodyPr/>
+          <a:lstStyle/>
+          <a:p>
+            <a:r>
+              <a:rPr lang="de-AT" dirty="0" err="1" smtClean="0"/>
+              <a:t>Exercise</a:t>
+            </a:r>
+            <a:r>
+              <a:rPr lang="de-AT" dirty="0" smtClean="0"/>
+              <a:t> 1 – </a:t>
+            </a:r>
+            <a:r>
+              <a:rPr lang="de-AT" dirty="0" err="1" smtClean="0"/>
+              <a:t>Identify</a:t>
+            </a:r>
+            <a:r>
+              <a:rPr lang="de-AT" dirty="0" smtClean="0"/>
+              <a:t> </a:t>
+            </a:r>
+            <a:r>
+              <a:rPr lang="de-AT" dirty="0" err="1" smtClean="0"/>
+              <a:t>Conflicts</a:t>
+            </a:r>
+            <a:r>
+              <a:rPr lang="de-AT" dirty="0" smtClean="0"/>
+              <a:t> 2</a:t>
+            </a:r>
+            <a:endParaRPr lang="de-AT" dirty="0"/>
+          </a:p>
+        </p:txBody>
+      </p:sp>
+      <p:pic>
+        <p:nvPicPr>
+          <p:cNvPr id="1026" name="Picture 2" descr="F:\Daten\Universitaet\6. Semester\Datenbanktechnologie\UE\Assignment_4\Exercise_1_full_picture_painted.png"/>
+          <p:cNvPicPr>
+            <a:picLocks noGrp="1" noChangeAspect="1" noChangeArrowheads="1"/>
+          </p:cNvPicPr>
+          <p:nvPr>
+            <p:ph sz="quarter" idx="1"/>
+          </p:nvPr>
+        </p:nvPicPr>
+        <p:blipFill>
+          <a:blip r:embed="rId2">
+            <a:extLst>
+              <a:ext uri="{28A0092B-C50C-407E-A947-70E740481C1C}">
+                <a14:useLocalDpi xmlns:a14="http://schemas.microsoft.com/office/drawing/2010/main" val="0"/>
+              </a:ext>
+            </a:extLst>
+          </a:blip>
+          <a:srcRect/>
+          <a:stretch>
+            <a:fillRect/>
+          </a:stretch>
+        </p:blipFill>
+        <p:spPr bwMode="auto">
+          <a:xfrm>
+            <a:off x="138466" y="1484784"/>
+            <a:ext cx="8993356" cy="5112568"/>
+          </a:xfrm>
+          <a:prstGeom prst="rect">
+            <a:avLst/>
+          </a:prstGeom>
+          <a:noFill/>
+          <a:extLst>
+            <a:ext uri="{909E8E84-426E-40DD-AFC4-6F175D3DCCD1}">
+              <a14:hiddenFill xmlns:a14="http://schemas.microsoft.com/office/drawing/2010/main">
+                <a:solidFill>
+                  <a:srgbClr val="FFFFFF"/>
+                </a:solidFill>
+              </a14:hiddenFill>
+            </a:ext>
+          </a:extLst>
+        </p:spPr>
+      </p:pic>
+    </p:spTree>
+    <p:extLst>
+      <p:ext uri="{BB962C8B-B14F-4D97-AF65-F5344CB8AC3E}">
+        <p14:creationId xmlns:p14="http://schemas.microsoft.com/office/powerpoint/2010/main" val="4233051216"/>
+      </p:ext>
+    </p:extLst>
+  </p:cSld>
+  <p:clrMapOvr>
+    <a:masterClrMapping/>
+  </p:clrMapOvr>
+</p:sld>
+</file>
+
+<file path=ppt/slides/slide6.xml><?xml version="1.0" encoding="utf-8"?>
+<p:sld xmlns:a="http://schemas.openxmlformats.org/drawingml/2006/main" xmlns:r="http://schemas.openxmlformats.org/officeDocument/2006/relationships" xmlns:p="http://schemas.openxmlformats.org/presentationml/2006/main">
+  <p:cSld>
+    <p:spTree>
+      <p:nvGrpSpPr>
+        <p:cNvPr id="1" name=""/>
+        <p:cNvGrpSpPr/>
+        <p:nvPr/>
+      </p:nvGrpSpPr>
+      <p:grpSpPr>
+        <a:xfrm>
+          <a:off x="0" y="0"/>
+          <a:ext cx="0" cy="0"/>
+          <a:chOff x="0" y="0"/>
+          <a:chExt cx="0" cy="0"/>
+        </a:xfrm>
+      </p:grpSpPr>
+      <p:sp>
+        <p:nvSpPr>
+          <p:cNvPr id="2" name="Titel 1"/>
+          <p:cNvSpPr>
+            <a:spLocks noGrp="1"/>
+          </p:cNvSpPr>
+          <p:nvPr>
+            <p:ph type="title"/>
+          </p:nvPr>
+        </p:nvSpPr>
+        <p:spPr/>
+        <p:txBody>
+          <a:bodyPr/>
+          <a:lstStyle/>
+          <a:p>
+            <a:r>
+              <a:rPr lang="en-US" dirty="0" smtClean="0"/>
+              <a:t>Example 1 – Identify Conflicts 3</a:t>
             </a:r>
             <a:endParaRPr lang="de-AT" dirty="0"/>
           </a:p>
@@ -9942,146 +11333,152 @@
         </p:nvSpPr>
         <p:spPr/>
         <p:txBody>
-          <a:bodyPr/>
+          <a:bodyPr>
+            <a:normAutofit/>
+          </a:bodyPr>
           <a:lstStyle/>
           <a:p>
             <a:r>
-              <a:rPr lang="de-AT" dirty="0" err="1" smtClean="0"/>
-              <a:t>naming</a:t>
-            </a:r>
-            <a:r>
-              <a:rPr lang="de-AT" dirty="0" smtClean="0"/>
-              <a:t> </a:t>
-            </a:r>
-            <a:r>
-              <a:rPr lang="de-AT" dirty="0" err="1" smtClean="0"/>
-              <a:t>conflicts</a:t>
-            </a:r>
-            <a:endParaRPr lang="de-AT" dirty="0"/>
-          </a:p>
-          <a:p>
-            <a:pPr lvl="1"/>
+              <a:rPr lang="de-AT" dirty="0" smtClean="0"/>
+              <a:t>Stadium – Stadium: (</a:t>
+            </a:r>
+            <a:r>
+              <a:rPr lang="de-AT" dirty="0" err="1" smtClean="0"/>
+              <a:t>Mismatch</a:t>
+            </a:r>
+            <a:r>
+              <a:rPr lang="de-AT" dirty="0" smtClean="0"/>
+              <a:t>, </a:t>
+            </a:r>
+            <a:r>
+              <a:rPr lang="de-AT" dirty="0" err="1" smtClean="0"/>
+              <a:t>Compatible</a:t>
+            </a:r>
+            <a:r>
+              <a:rPr lang="de-AT" dirty="0" smtClean="0"/>
+              <a:t> </a:t>
+            </a:r>
+            <a:r>
+              <a:rPr lang="de-AT" dirty="0" err="1" smtClean="0"/>
+              <a:t>Concepts</a:t>
+            </a:r>
+            <a:r>
+              <a:rPr lang="de-AT" dirty="0" smtClean="0"/>
+              <a:t>)</a:t>
+            </a:r>
+          </a:p>
+          <a:p>
             <a:r>
               <a:rPr lang="de-AT" dirty="0" err="1" smtClean="0"/>
               <a:t>Injury</a:t>
             </a:r>
             <a:r>
               <a:rPr lang="de-AT" dirty="0" smtClean="0"/>
-              <a:t> </a:t>
-            </a:r>
-            <a:r>
-              <a:rPr lang="de-AT" dirty="0" smtClean="0">
-                <a:sym typeface="Wingdings" panose="05000000000000000000" pitchFamily="2" charset="2"/>
-              </a:rPr>
-              <a:t> MT : </a:t>
-            </a:r>
-            <a:r>
-              <a:rPr lang="de-AT" dirty="0" err="1" smtClean="0">
-                <a:sym typeface="Wingdings" panose="05000000000000000000" pitchFamily="2" charset="2"/>
-              </a:rPr>
-              <a:t>needs</a:t>
-            </a:r>
-            <a:r>
-              <a:rPr lang="de-AT" dirty="0" smtClean="0">
-                <a:sym typeface="Wingdings" panose="05000000000000000000" pitchFamily="2" charset="2"/>
-              </a:rPr>
-              <a:t> / </a:t>
-            </a:r>
-            <a:r>
-              <a:rPr lang="de-AT" dirty="0" err="1" smtClean="0">
-                <a:sym typeface="Wingdings" panose="05000000000000000000" pitchFamily="2" charset="2"/>
-              </a:rPr>
-              <a:t>has</a:t>
-            </a:r>
-            <a:endParaRPr lang="de-AT" dirty="0" smtClean="0">
-              <a:sym typeface="Wingdings" panose="05000000000000000000" pitchFamily="2" charset="2"/>
-            </a:endParaRPr>
-          </a:p>
-          <a:p>
-            <a:pPr lvl="1"/>
-            <a:r>
-              <a:rPr lang="de-AT" dirty="0" smtClean="0">
-                <a:sym typeface="Wingdings" panose="05000000000000000000" pitchFamily="2" charset="2"/>
-              </a:rPr>
-              <a:t>Game  </a:t>
-            </a:r>
-            <a:r>
-              <a:rPr lang="de-AT" dirty="0" err="1" smtClean="0">
-                <a:sym typeface="Wingdings" panose="05000000000000000000" pitchFamily="2" charset="2"/>
-              </a:rPr>
+              <a:t> &amp; MT – </a:t>
+            </a:r>
+            <a:r>
+              <a:rPr lang="de-AT" dirty="0" err="1" smtClean="0"/>
+              <a:t>Injury</a:t>
+            </a:r>
+            <a:r>
+              <a:rPr lang="de-AT" dirty="0" smtClean="0"/>
+              <a:t> &amp; MT: (Synonym, </a:t>
+            </a:r>
+            <a:r>
+              <a:rPr lang="de-AT" dirty="0" err="1" smtClean="0"/>
+              <a:t>Identical</a:t>
+            </a:r>
+            <a:r>
+              <a:rPr lang="de-AT" dirty="0" smtClean="0"/>
+              <a:t> </a:t>
+            </a:r>
+            <a:r>
+              <a:rPr lang="de-AT" dirty="0" err="1" smtClean="0"/>
+              <a:t>Concepts</a:t>
+            </a:r>
+            <a:r>
+              <a:rPr lang="de-AT" dirty="0" smtClean="0"/>
+              <a:t>)</a:t>
+            </a:r>
+          </a:p>
+          <a:p>
+            <a:r>
+              <a:rPr lang="de-AT" dirty="0" smtClean="0"/>
+              <a:t>Game, Event, </a:t>
+            </a:r>
+            <a:r>
+              <a:rPr lang="de-AT" dirty="0" err="1" smtClean="0"/>
+              <a:t>Injury</a:t>
+            </a:r>
+            <a:r>
+              <a:rPr lang="de-AT" dirty="0" smtClean="0"/>
+              <a:t>, Player – </a:t>
+            </a:r>
+            <a:r>
+              <a:rPr lang="de-AT" dirty="0" err="1" smtClean="0"/>
+              <a:t>Injury</a:t>
+            </a:r>
+            <a:r>
+              <a:rPr lang="de-AT" dirty="0" smtClean="0"/>
+              <a:t>, Player, </a:t>
+            </a:r>
+            <a:r>
+              <a:rPr lang="de-AT" dirty="0" err="1" smtClean="0"/>
               <a:t>Competition</a:t>
             </a:r>
-            <a:endParaRPr lang="de-AT" dirty="0"/>
-          </a:p>
-          <a:p>
-            <a:r>
-              <a:rPr lang="de-AT" dirty="0" err="1" smtClean="0"/>
-              <a:t>stuctural</a:t>
-            </a:r>
-            <a:r>
-              <a:rPr lang="de-AT" dirty="0" smtClean="0"/>
-              <a:t> </a:t>
-            </a:r>
-            <a:r>
-              <a:rPr lang="de-AT" dirty="0" err="1" smtClean="0"/>
-              <a:t>conflicts</a:t>
-            </a:r>
-            <a:endParaRPr lang="de-AT" dirty="0" smtClean="0"/>
-          </a:p>
-          <a:p>
-            <a:pPr lvl="1"/>
-            <a:r>
-              <a:rPr lang="de-AT" dirty="0"/>
-              <a:t>Stadium : </a:t>
-            </a:r>
-            <a:r>
-              <a:rPr lang="de-AT" dirty="0" err="1"/>
-              <a:t>capacity</a:t>
-            </a:r>
-            <a:r>
-              <a:rPr lang="de-AT" dirty="0"/>
-              <a:t> in </a:t>
-            </a:r>
-            <a:r>
-              <a:rPr lang="de-AT" dirty="0" smtClean="0"/>
-              <a:t>EV</a:t>
-            </a:r>
-          </a:p>
-          <a:p>
-            <a:pPr lvl="1"/>
-            <a:r>
-              <a:rPr lang="de-AT" dirty="0" smtClean="0"/>
-              <a:t>Player : </a:t>
-            </a:r>
-            <a:r>
-              <a:rPr lang="de-AT" dirty="0" err="1" smtClean="0"/>
-              <a:t>team</a:t>
-            </a:r>
-            <a:endParaRPr lang="de-AT" dirty="0" smtClean="0"/>
-          </a:p>
-          <a:p>
-            <a:pPr lvl="1"/>
-            <a:r>
-              <a:rPr lang="de-AT" dirty="0" err="1" smtClean="0"/>
-              <a:t>Competition</a:t>
-            </a:r>
-            <a:endParaRPr lang="de-AT" dirty="0" smtClean="0"/>
-          </a:p>
-          <a:p>
-            <a:pPr lvl="1"/>
-            <a:r>
-              <a:rPr lang="de-AT" dirty="0" err="1" smtClean="0"/>
-              <a:t>Injury</a:t>
-            </a:r>
-            <a:r>
-              <a:rPr lang="de-AT" dirty="0" smtClean="0"/>
-              <a:t> </a:t>
-            </a:r>
-            <a:r>
-              <a:rPr lang="de-AT" dirty="0" smtClean="0">
-                <a:sym typeface="Wingdings" panose="05000000000000000000" pitchFamily="2" charset="2"/>
-              </a:rPr>
-              <a:t> Player fehlt</a:t>
+            <a:r>
+              <a:rPr lang="de-AT" dirty="0" smtClean="0"/>
+              <a:t>: </a:t>
+            </a:r>
+            <a:r>
+              <a:rPr lang="de-AT" dirty="0" smtClean="0"/>
+              <a:t>(</a:t>
+            </a:r>
+            <a:r>
+              <a:rPr lang="de-AT" dirty="0" err="1" smtClean="0"/>
+              <a:t>Incompatible</a:t>
+            </a:r>
+            <a:r>
+              <a:rPr lang="de-AT" dirty="0" smtClean="0"/>
+              <a:t> </a:t>
+            </a:r>
+            <a:r>
+              <a:rPr lang="de-AT" dirty="0" err="1" smtClean="0"/>
+              <a:t>Concepts</a:t>
+            </a:r>
+            <a:r>
+              <a:rPr lang="de-AT" dirty="0" smtClean="0"/>
+              <a:t>)</a:t>
+            </a:r>
+          </a:p>
+          <a:p>
+            <a:r>
+              <a:rPr lang="de-AT" dirty="0" smtClean="0"/>
+              <a:t>Player, Soccer Team – Player: (</a:t>
+            </a:r>
+            <a:r>
+              <a:rPr lang="de-AT" dirty="0" err="1" smtClean="0"/>
+              <a:t>Mismatch</a:t>
+            </a:r>
+            <a:r>
+              <a:rPr lang="de-AT" dirty="0" smtClean="0"/>
+              <a:t>, </a:t>
+            </a:r>
+            <a:r>
+              <a:rPr lang="de-AT" dirty="0" err="1" smtClean="0"/>
+              <a:t>Compatible</a:t>
+            </a:r>
+            <a:r>
+              <a:rPr lang="de-AT" dirty="0" smtClean="0"/>
+              <a:t> </a:t>
+            </a:r>
+            <a:r>
+              <a:rPr lang="de-AT" dirty="0" err="1" smtClean="0"/>
+              <a:t>Concepts</a:t>
+            </a:r>
+            <a:r>
+              <a:rPr lang="de-AT" smtClean="0"/>
+              <a:t>)</a:t>
             </a:r>
             <a:endParaRPr lang="de-AT" dirty="0"/>
           </a:p>
@@ -10100,7 +11497,7 @@
 </p:sld>
 </file>
 
-<file path=ppt/slides/slide4.xml><?xml version="1.0" encoding="utf-8"?>
+<file path=ppt/slides/slide7.xml><?xml version="1.0" encoding="utf-8"?>
 <p:sld xmlns:a="http://schemas.openxmlformats.org/drawingml/2006/main" xmlns:r="http://schemas.openxmlformats.org/officeDocument/2006/relationships" xmlns:p="http://schemas.openxmlformats.org/presentationml/2006/main">
   <p:cSld>
     <p:spTree>
@@ -10214,7 +11611,7 @@
 </p:sld>
 </file>
 
-<file path=ppt/slides/slide5.xml><?xml version="1.0" encoding="utf-8"?>
+<file path=ppt/slides/slide8.xml><?xml version="1.0" encoding="utf-8"?>
 <p:sld xmlns:a="http://schemas.openxmlformats.org/drawingml/2006/main" xmlns:r="http://schemas.openxmlformats.org/officeDocument/2006/relationships" xmlns:p="http://schemas.openxmlformats.org/presentationml/2006/main">
   <p:cSld>
     <p:spTree>
@@ -10514,548 +11911,6 @@
     <p:extLst>
       <p:ext uri="{BB962C8B-B14F-4D97-AF65-F5344CB8AC3E}">
         <p14:creationId xmlns:p14="http://schemas.microsoft.com/office/powerpoint/2010/main" val="4027580963"/>
-      </p:ext>
-    </p:extLst>
-  </p:cSld>
-  <p:clrMapOvr>
-    <a:masterClrMapping/>
-  </p:clrMapOvr>
-</p:sld>
-</file>
-
-<file path=ppt/slides/slide6.xml><?xml version="1.0" encoding="utf-8"?>
-<p:sld xmlns:a="http://schemas.openxmlformats.org/drawingml/2006/main" xmlns:r="http://schemas.openxmlformats.org/officeDocument/2006/relationships" xmlns:p="http://schemas.openxmlformats.org/presentationml/2006/main">
-  <p:cSld>
-    <p:spTree>
-      <p:nvGrpSpPr>
-        <p:cNvPr id="1" name=""/>
-        <p:cNvGrpSpPr/>
-        <p:nvPr/>
-      </p:nvGrpSpPr>
-      <p:grpSpPr>
-        <a:xfrm>
-          <a:off x="0" y="0"/>
-          <a:ext cx="0" cy="0"/>
-          <a:chOff x="0" y="0"/>
-          <a:chExt cx="0" cy="0"/>
-        </a:xfrm>
-      </p:grpSpPr>
-      <p:sp>
-        <p:nvSpPr>
-          <p:cNvPr id="2" name="Titel 1"/>
-          <p:cNvSpPr>
-            <a:spLocks noGrp="1"/>
-          </p:cNvSpPr>
-          <p:nvPr>
-            <p:ph type="title"/>
-          </p:nvPr>
-        </p:nvSpPr>
-        <p:spPr/>
-        <p:txBody>
-          <a:bodyPr>
-            <a:normAutofit/>
-          </a:bodyPr>
-          <a:lstStyle/>
-          <a:p>
-            <a:r>
-              <a:rPr lang="de-AT" dirty="0" err="1" smtClean="0"/>
-              <a:t>Exercise</a:t>
-            </a:r>
-            <a:r>
-              <a:rPr lang="de-AT" dirty="0" smtClean="0"/>
-              <a:t> 2 – </a:t>
-            </a:r>
-            <a:r>
-              <a:rPr lang="de-AT" dirty="0" err="1" smtClean="0"/>
-              <a:t>Calculation</a:t>
-            </a:r>
-            <a:r>
-              <a:rPr lang="de-AT" dirty="0" smtClean="0"/>
-              <a:t> </a:t>
-            </a:r>
-            <a:r>
-              <a:rPr lang="de-AT" dirty="0" err="1" smtClean="0"/>
-              <a:t>rules</a:t>
-            </a:r>
-            <a:endParaRPr lang="de-AT" dirty="0"/>
-          </a:p>
-        </p:txBody>
-      </p:sp>
-      <p:pic>
-        <p:nvPicPr>
-          <p:cNvPr id="4" name="Inhaltsplatzhalter 3"/>
-          <p:cNvPicPr>
-            <a:picLocks noGrp="1" noChangeAspect="1"/>
-          </p:cNvPicPr>
-          <p:nvPr>
-            <p:ph sz="quarter" idx="1"/>
-          </p:nvPr>
-        </p:nvPicPr>
-        <p:blipFill>
-          <a:blip r:embed="rId2">
-            <a:extLst>
-              <a:ext uri="{28A0092B-C50C-407E-A947-70E740481C1C}">
-                <a14:useLocalDpi xmlns:a14="http://schemas.microsoft.com/office/drawing/2010/main" val="0"/>
-              </a:ext>
-            </a:extLst>
-          </a:blip>
-          <a:stretch>
-            <a:fillRect/>
-          </a:stretch>
-        </p:blipFill>
-        <p:spPr>
-          <a:xfrm>
-            <a:off x="2213340" y="1600200"/>
-            <a:ext cx="4952270" cy="4495800"/>
-          </a:xfrm>
-        </p:spPr>
-      </p:pic>
-    </p:spTree>
-    <p:extLst>
-      <p:ext uri="{BB962C8B-B14F-4D97-AF65-F5344CB8AC3E}">
-        <p14:creationId xmlns:p14="http://schemas.microsoft.com/office/powerpoint/2010/main" val="3460682268"/>
-      </p:ext>
-    </p:extLst>
-  </p:cSld>
-  <p:clrMapOvr>
-    <a:masterClrMapping/>
-  </p:clrMapOvr>
-</p:sld>
-</file>
-
-<file path=ppt/slides/slide7.xml><?xml version="1.0" encoding="utf-8"?>
-<p:sld xmlns:a="http://schemas.openxmlformats.org/drawingml/2006/main" xmlns:r="http://schemas.openxmlformats.org/officeDocument/2006/relationships" xmlns:p="http://schemas.openxmlformats.org/presentationml/2006/main">
-  <p:cSld>
-    <p:spTree>
-      <p:nvGrpSpPr>
-        <p:cNvPr id="1" name=""/>
-        <p:cNvGrpSpPr/>
-        <p:nvPr/>
-      </p:nvGrpSpPr>
-      <p:grpSpPr>
-        <a:xfrm>
-          <a:off x="0" y="0"/>
-          <a:ext cx="0" cy="0"/>
-          <a:chOff x="0" y="0"/>
-          <a:chExt cx="0" cy="0"/>
-        </a:xfrm>
-      </p:grpSpPr>
-      <p:sp>
-        <p:nvSpPr>
-          <p:cNvPr id="2" name="Titel 1"/>
-          <p:cNvSpPr>
-            <a:spLocks noGrp="1"/>
-          </p:cNvSpPr>
-          <p:nvPr>
-            <p:ph type="title"/>
-          </p:nvPr>
-        </p:nvSpPr>
-        <p:spPr/>
-        <p:txBody>
-          <a:bodyPr>
-            <a:normAutofit fontScale="90000"/>
-          </a:bodyPr>
-          <a:lstStyle/>
-          <a:p>
-            <a:r>
-              <a:rPr lang="de-AT" dirty="0" err="1" smtClean="0"/>
-              <a:t>Exercise</a:t>
-            </a:r>
-            <a:r>
-              <a:rPr lang="de-AT" dirty="0" smtClean="0"/>
-              <a:t> 2 – </a:t>
-            </a:r>
-            <a:br>
-              <a:rPr lang="de-AT" dirty="0" smtClean="0"/>
-            </a:br>
-            <a:r>
-              <a:rPr lang="de-AT" dirty="0" smtClean="0"/>
-              <a:t>Determination </a:t>
-            </a:r>
-            <a:r>
-              <a:rPr lang="de-AT" dirty="0" err="1" smtClean="0"/>
-              <a:t>of</a:t>
-            </a:r>
-            <a:r>
-              <a:rPr lang="de-AT" dirty="0" smtClean="0"/>
-              <a:t> </a:t>
-            </a:r>
-            <a:r>
-              <a:rPr lang="de-AT" dirty="0" err="1" smtClean="0"/>
-              <a:t>Quantities</a:t>
-            </a:r>
-            <a:endParaRPr lang="de-AT" dirty="0"/>
-          </a:p>
-        </p:txBody>
-      </p:sp>
-      <p:pic>
-        <p:nvPicPr>
-          <p:cNvPr id="4" name="Inhaltsplatzhalter 3"/>
-          <p:cNvPicPr>
-            <a:picLocks noGrp="1" noChangeAspect="1"/>
-          </p:cNvPicPr>
-          <p:nvPr>
-            <p:ph sz="quarter" idx="1"/>
-          </p:nvPr>
-        </p:nvPicPr>
-        <p:blipFill>
-          <a:blip r:embed="rId2">
-            <a:extLst>
-              <a:ext uri="{28A0092B-C50C-407E-A947-70E740481C1C}">
-                <a14:useLocalDpi xmlns:a14="http://schemas.microsoft.com/office/drawing/2010/main" val="0"/>
-              </a:ext>
-            </a:extLst>
-          </a:blip>
-          <a:stretch>
-            <a:fillRect/>
-          </a:stretch>
-        </p:blipFill>
-        <p:spPr>
-          <a:xfrm>
-            <a:off x="781023" y="1556792"/>
-            <a:ext cx="5611008" cy="3391374"/>
-          </a:xfrm>
-        </p:spPr>
-      </p:pic>
-      <p:sp>
-        <p:nvSpPr>
-          <p:cNvPr id="5" name="Textfeld 4"/>
-          <p:cNvSpPr txBox="1"/>
-          <p:nvPr/>
-        </p:nvSpPr>
-        <p:spPr>
-          <a:xfrm>
-            <a:off x="810105" y="4797152"/>
-            <a:ext cx="7920880" cy="1815882"/>
-          </a:xfrm>
-          <a:prstGeom prst="rect">
-            <a:avLst/>
-          </a:prstGeom>
-          <a:noFill/>
-        </p:spPr>
-        <p:txBody>
-          <a:bodyPr wrap="square" rtlCol="0">
-            <a:spAutoFit/>
-          </a:bodyPr>
-          <a:lstStyle/>
-          <a:p>
-            <a:r>
-              <a:rPr lang="en-GB" sz="1400" dirty="0"/>
-              <a:t>N(publisher) x N (publisher, publishes ) = N (publishes)  = N(book</a:t>
-            </a:r>
-            <a:r>
-              <a:rPr lang="en-GB" sz="1400" dirty="0" smtClean="0"/>
-              <a:t>)</a:t>
-            </a:r>
-          </a:p>
-          <a:p>
-            <a:pPr marL="285750" indent="-285750">
-              <a:buFont typeface="Symbol"/>
-              <a:buChar char="Þ"/>
-            </a:pPr>
-            <a:r>
-              <a:rPr lang="en-GB" sz="1400" dirty="0" smtClean="0"/>
-              <a:t>N(book) = N(publishes) = 100 x 1.000 = 100.000</a:t>
-            </a:r>
-          </a:p>
-          <a:p>
-            <a:endParaRPr lang="de-AT" sz="1400" dirty="0" smtClean="0"/>
-          </a:p>
-          <a:p>
-            <a:r>
-              <a:rPr lang="en-GB" sz="1400" dirty="0"/>
-              <a:t>N(author) = N(writes) / N(writes, author)</a:t>
-            </a:r>
-            <a:endParaRPr lang="de-AT" sz="1400" dirty="0"/>
-          </a:p>
-          <a:p>
-            <a:pPr marL="285750" indent="-285750">
-              <a:buFont typeface="Symbol"/>
-              <a:buChar char="Þ"/>
-            </a:pPr>
-            <a:r>
-              <a:rPr lang="en-GB" sz="1400" dirty="0" smtClean="0"/>
-              <a:t>N(author) = 400.000 / 20 = 20.000</a:t>
-            </a:r>
-          </a:p>
-          <a:p>
-            <a:pPr marL="285750" indent="-285750">
-              <a:buFont typeface="Symbol"/>
-              <a:buChar char="Þ"/>
-            </a:pPr>
-            <a:endParaRPr lang="en-GB" sz="1400" dirty="0"/>
-          </a:p>
-          <a:p>
-            <a:r>
-              <a:rPr lang="en-GB" sz="1400" dirty="0"/>
-              <a:t>N(book, writes) = N (writes) / N(books</a:t>
-            </a:r>
-            <a:r>
-              <a:rPr lang="en-GB" sz="1400" dirty="0" smtClean="0"/>
-              <a:t>)</a:t>
-            </a:r>
-            <a:endParaRPr lang="en-GB" dirty="0"/>
-          </a:p>
-          <a:p>
-            <a:pPr marL="285750" indent="-285750">
-              <a:buFont typeface="Symbol"/>
-              <a:buChar char="Þ"/>
-            </a:pPr>
-            <a:r>
-              <a:rPr lang="en-GB" sz="1400" dirty="0" smtClean="0"/>
-              <a:t>N(book, writes) = 400.000 / 100.000 = 4</a:t>
-            </a:r>
-          </a:p>
-        </p:txBody>
-      </p:sp>
-      <p:sp>
-        <p:nvSpPr>
-          <p:cNvPr id="6" name="Textfeld 5"/>
-          <p:cNvSpPr txBox="1"/>
-          <p:nvPr/>
-        </p:nvSpPr>
-        <p:spPr>
-          <a:xfrm>
-            <a:off x="1763688" y="1516783"/>
-            <a:ext cx="1080120" cy="276999"/>
-          </a:xfrm>
-          <a:prstGeom prst="rect">
-            <a:avLst/>
-          </a:prstGeom>
-          <a:noFill/>
-        </p:spPr>
-        <p:txBody>
-          <a:bodyPr wrap="square" rtlCol="0">
-            <a:spAutoFit/>
-          </a:bodyPr>
-          <a:lstStyle/>
-          <a:p>
-            <a:r>
-              <a:rPr lang="de-AT" sz="1200" b="1" dirty="0" smtClean="0">
-                <a:solidFill>
-                  <a:srgbClr val="FF0000"/>
-                </a:solidFill>
-              </a:rPr>
-              <a:t>&lt;100.000&gt;</a:t>
-            </a:r>
-            <a:endParaRPr lang="de-AT" sz="1200" b="1" dirty="0">
-              <a:solidFill>
-                <a:srgbClr val="FF0000"/>
-              </a:solidFill>
-            </a:endParaRPr>
-          </a:p>
-        </p:txBody>
-      </p:sp>
-      <p:sp>
-        <p:nvSpPr>
-          <p:cNvPr id="7" name="Textfeld 6"/>
-          <p:cNvSpPr txBox="1"/>
-          <p:nvPr/>
-        </p:nvSpPr>
-        <p:spPr>
-          <a:xfrm>
-            <a:off x="4427984" y="1514181"/>
-            <a:ext cx="1080120" cy="276999"/>
-          </a:xfrm>
-          <a:prstGeom prst="rect">
-            <a:avLst/>
-          </a:prstGeom>
-          <a:noFill/>
-        </p:spPr>
-        <p:txBody>
-          <a:bodyPr wrap="square" rtlCol="0">
-            <a:spAutoFit/>
-          </a:bodyPr>
-          <a:lstStyle/>
-          <a:p>
-            <a:r>
-              <a:rPr lang="de-AT" sz="1200" b="1" dirty="0" smtClean="0">
-                <a:solidFill>
-                  <a:srgbClr val="FF0000"/>
-                </a:solidFill>
-              </a:rPr>
-              <a:t>&lt;100.000&gt;</a:t>
-            </a:r>
-            <a:endParaRPr lang="de-AT" sz="1200" b="1" dirty="0">
-              <a:solidFill>
-                <a:srgbClr val="FF0000"/>
-              </a:solidFill>
-            </a:endParaRPr>
-          </a:p>
-        </p:txBody>
-      </p:sp>
-      <p:sp>
-        <p:nvSpPr>
-          <p:cNvPr id="8" name="Textfeld 7"/>
-          <p:cNvSpPr txBox="1"/>
-          <p:nvPr/>
-        </p:nvSpPr>
-        <p:spPr>
-          <a:xfrm>
-            <a:off x="5506258" y="2852936"/>
-            <a:ext cx="1080120" cy="276999"/>
-          </a:xfrm>
-          <a:prstGeom prst="rect">
-            <a:avLst/>
-          </a:prstGeom>
-          <a:noFill/>
-        </p:spPr>
-        <p:txBody>
-          <a:bodyPr wrap="square" rtlCol="0">
-            <a:spAutoFit/>
-          </a:bodyPr>
-          <a:lstStyle/>
-          <a:p>
-            <a:r>
-              <a:rPr lang="de-AT" sz="1200" b="1" dirty="0" smtClean="0">
-                <a:solidFill>
-                  <a:srgbClr val="FF0000"/>
-                </a:solidFill>
-              </a:rPr>
-              <a:t>&lt;4&gt;</a:t>
-            </a:r>
-            <a:endParaRPr lang="de-AT" sz="1200" b="1" dirty="0">
-              <a:solidFill>
-                <a:srgbClr val="FF0000"/>
-              </a:solidFill>
-            </a:endParaRPr>
-          </a:p>
-        </p:txBody>
-      </p:sp>
-      <p:sp>
-        <p:nvSpPr>
-          <p:cNvPr id="9" name="Textfeld 8"/>
-          <p:cNvSpPr txBox="1"/>
-          <p:nvPr/>
-        </p:nvSpPr>
-        <p:spPr>
-          <a:xfrm>
-            <a:off x="5483825" y="4187309"/>
-            <a:ext cx="1080120" cy="276999"/>
-          </a:xfrm>
-          <a:prstGeom prst="rect">
-            <a:avLst/>
-          </a:prstGeom>
-          <a:noFill/>
-        </p:spPr>
-        <p:txBody>
-          <a:bodyPr wrap="square" rtlCol="0">
-            <a:spAutoFit/>
-          </a:bodyPr>
-          <a:lstStyle/>
-          <a:p>
-            <a:r>
-              <a:rPr lang="de-AT" sz="1200" b="1" dirty="0" smtClean="0">
-                <a:solidFill>
-                  <a:srgbClr val="FF0000"/>
-                </a:solidFill>
-              </a:rPr>
-              <a:t>&lt;20.000&gt;</a:t>
-            </a:r>
-            <a:endParaRPr lang="de-AT" sz="1200" b="1" dirty="0">
-              <a:solidFill>
-                <a:srgbClr val="FF0000"/>
-              </a:solidFill>
-            </a:endParaRPr>
-          </a:p>
-        </p:txBody>
-      </p:sp>
-    </p:spTree>
-    <p:extLst>
-      <p:ext uri="{BB962C8B-B14F-4D97-AF65-F5344CB8AC3E}">
-        <p14:creationId xmlns:p14="http://schemas.microsoft.com/office/powerpoint/2010/main" val="1343703413"/>
-      </p:ext>
-    </p:extLst>
-  </p:cSld>
-  <p:clrMapOvr>
-    <a:masterClrMapping/>
-  </p:clrMapOvr>
-</p:sld>
-</file>
-
-<file path=ppt/slides/slide8.xml><?xml version="1.0" encoding="utf-8"?>
-<p:sld xmlns:a="http://schemas.openxmlformats.org/drawingml/2006/main" xmlns:r="http://schemas.openxmlformats.org/officeDocument/2006/relationships" xmlns:p="http://schemas.openxmlformats.org/presentationml/2006/main">
-  <p:cSld>
-    <p:spTree>
-      <p:nvGrpSpPr>
-        <p:cNvPr id="1" name=""/>
-        <p:cNvGrpSpPr/>
-        <p:nvPr/>
-      </p:nvGrpSpPr>
-      <p:grpSpPr>
-        <a:xfrm>
-          <a:off x="0" y="0"/>
-          <a:ext cx="0" cy="0"/>
-          <a:chOff x="0" y="0"/>
-          <a:chExt cx="0" cy="0"/>
-        </a:xfrm>
-      </p:grpSpPr>
-      <p:sp>
-        <p:nvSpPr>
-          <p:cNvPr id="2" name="Titel 1"/>
-          <p:cNvSpPr>
-            <a:spLocks noGrp="1"/>
-          </p:cNvSpPr>
-          <p:nvPr>
-            <p:ph type="title"/>
-          </p:nvPr>
-        </p:nvSpPr>
-        <p:spPr/>
-        <p:txBody>
-          <a:bodyPr/>
-          <a:lstStyle/>
-          <a:p>
-            <a:r>
-              <a:rPr lang="de-AT" dirty="0" err="1" smtClean="0"/>
-              <a:t>Exercise</a:t>
-            </a:r>
-            <a:r>
-              <a:rPr lang="de-AT" dirty="0" smtClean="0"/>
-              <a:t> 2 - Navigation</a:t>
-            </a:r>
-            <a:endParaRPr lang="de-AT" dirty="0"/>
-          </a:p>
-        </p:txBody>
-      </p:sp>
-      <p:sp>
-        <p:nvSpPr>
-          <p:cNvPr id="3" name="Inhaltsplatzhalter 2"/>
-          <p:cNvSpPr>
-            <a:spLocks noGrp="1"/>
-          </p:cNvSpPr>
-          <p:nvPr>
-            <p:ph sz="quarter" idx="1"/>
-          </p:nvPr>
-        </p:nvSpPr>
-        <p:spPr/>
-        <p:txBody>
-          <a:bodyPr/>
-          <a:lstStyle/>
-          <a:p>
-            <a:r>
-              <a:rPr lang="en-GB" dirty="0" smtClean="0"/>
-              <a:t>To get the result of a query or to execute an operation, multiple entity types and relations might have to be accessed.</a:t>
-            </a:r>
-          </a:p>
-          <a:p>
-            <a:r>
-              <a:rPr lang="en-GB" dirty="0" smtClean="0"/>
-              <a:t>Navigation path shows, which entity types and relations are accessed and in which order.</a:t>
-            </a:r>
-          </a:p>
-          <a:p>
-            <a:r>
-              <a:rPr lang="en-GB" dirty="0" smtClean="0"/>
-              <a:t>Necessary for evaluating costs of database operations</a:t>
-            </a:r>
-            <a:endParaRPr lang="en-GB" dirty="0"/>
-          </a:p>
-        </p:txBody>
-      </p:sp>
-    </p:spTree>
-    <p:extLst>
-      <p:ext uri="{BB962C8B-B14F-4D97-AF65-F5344CB8AC3E}">
-        <p14:creationId xmlns:p14="http://schemas.microsoft.com/office/powerpoint/2010/main" val="1138079737"/>
       </p:ext>
     </p:extLst>
   </p:cSld>
@@ -11094,348 +11949,68 @@
         </p:nvSpPr>
         <p:spPr/>
         <p:txBody>
-          <a:bodyPr/>
-          <a:lstStyle/>
-          <a:p>
-            <a:r>
-              <a:rPr lang="de-AT" dirty="0" err="1" smtClean="0"/>
-              <a:t>Exercise</a:t>
-            </a:r>
-            <a:r>
-              <a:rPr lang="de-AT" dirty="0" smtClean="0"/>
-              <a:t> 3 – </a:t>
-            </a:r>
-            <a:r>
-              <a:rPr lang="de-AT" dirty="0" err="1" smtClean="0"/>
-              <a:t>Redundancy</a:t>
-            </a:r>
-            <a:endParaRPr lang="de-AT" dirty="0"/>
-          </a:p>
-        </p:txBody>
-      </p:sp>
-      <p:sp>
-        <p:nvSpPr>
-          <p:cNvPr id="3" name="Inhaltsplatzhalter 2"/>
-          <p:cNvSpPr>
-            <a:spLocks noGrp="1"/>
-          </p:cNvSpPr>
-          <p:nvPr>
-            <p:ph sz="quarter" idx="1"/>
-          </p:nvPr>
-        </p:nvSpPr>
-        <p:spPr/>
-        <p:txBody>
           <a:bodyPr>
-            <a:normAutofit fontScale="92500" lnSpcReduction="20000"/>
+            <a:normAutofit/>
           </a:bodyPr>
           <a:lstStyle/>
           <a:p>
             <a:r>
               <a:rPr lang="de-AT" dirty="0" err="1" smtClean="0"/>
-              <a:t>Redundancy</a:t>
-            </a:r>
-            <a:r>
-              <a:rPr lang="de-AT" dirty="0" smtClean="0"/>
-              <a:t> </a:t>
-            </a:r>
-            <a:r>
-              <a:rPr lang="de-AT" dirty="0" err="1" smtClean="0"/>
-              <a:t>occurs</a:t>
-            </a:r>
-            <a:r>
-              <a:rPr lang="de-AT" dirty="0" smtClean="0"/>
-              <a:t>, </a:t>
-            </a:r>
-            <a:r>
-              <a:rPr lang="de-AT" dirty="0" err="1" smtClean="0"/>
-              <a:t>if</a:t>
-            </a:r>
-            <a:r>
-              <a:rPr lang="de-AT" dirty="0" smtClean="0"/>
-              <a:t> </a:t>
-            </a:r>
-            <a:r>
-              <a:rPr lang="de-AT" dirty="0" err="1" smtClean="0"/>
-              <a:t>the</a:t>
-            </a:r>
-            <a:r>
-              <a:rPr lang="de-AT" dirty="0" smtClean="0"/>
-              <a:t> same </a:t>
-            </a:r>
-            <a:r>
-              <a:rPr lang="de-AT" dirty="0" err="1" smtClean="0"/>
-              <a:t>information</a:t>
-            </a:r>
-            <a:r>
-              <a:rPr lang="de-AT" dirty="0" smtClean="0"/>
-              <a:t> </a:t>
-            </a:r>
-            <a:r>
-              <a:rPr lang="de-AT" dirty="0" err="1" smtClean="0"/>
-              <a:t>or</a:t>
-            </a:r>
-            <a:r>
-              <a:rPr lang="de-AT" dirty="0" smtClean="0"/>
-              <a:t> </a:t>
-            </a:r>
-            <a:r>
-              <a:rPr lang="de-AT" dirty="0" err="1" smtClean="0"/>
-              <a:t>derivable</a:t>
-            </a:r>
-            <a:r>
-              <a:rPr lang="de-AT" dirty="0" smtClean="0"/>
-              <a:t> </a:t>
-            </a:r>
-            <a:r>
-              <a:rPr lang="de-AT" dirty="0" err="1" smtClean="0"/>
-              <a:t>information</a:t>
-            </a:r>
-            <a:r>
-              <a:rPr lang="de-AT" dirty="0" smtClean="0"/>
-              <a:t> </a:t>
-            </a:r>
-            <a:r>
-              <a:rPr lang="de-AT" dirty="0" err="1" smtClean="0"/>
-              <a:t>is</a:t>
-            </a:r>
-            <a:r>
-              <a:rPr lang="de-AT" dirty="0" smtClean="0"/>
-              <a:t> </a:t>
-            </a:r>
-            <a:r>
-              <a:rPr lang="de-AT" dirty="0" err="1" smtClean="0"/>
-              <a:t>stored</a:t>
-            </a:r>
-            <a:r>
-              <a:rPr lang="de-AT" dirty="0" smtClean="0"/>
-              <a:t> multiple </a:t>
-            </a:r>
-            <a:r>
-              <a:rPr lang="de-AT" dirty="0" err="1" smtClean="0"/>
-              <a:t>times</a:t>
-            </a:r>
-            <a:r>
-              <a:rPr lang="de-AT" dirty="0" smtClean="0"/>
-              <a:t>.</a:t>
-            </a:r>
-          </a:p>
-          <a:p>
+              <a:t>Exercise</a:t>
+            </a:r>
+            <a:r>
+              <a:rPr lang="de-AT" dirty="0" smtClean="0"/>
+              <a:t> 2 – </a:t>
+            </a:r>
+            <a:r>
+              <a:rPr lang="de-AT" dirty="0" err="1" smtClean="0"/>
+              <a:t>Calculation</a:t>
+            </a:r>
+            <a:r>
+              <a:rPr lang="de-AT" dirty="0" smtClean="0"/>
+              <a:t> </a:t>
+            </a:r>
+            <a:r>
+              <a:rPr lang="de-AT" dirty="0" err="1" smtClean="0"/>
+              <a:t>rules</a:t>
+            </a:r>
             <a:endParaRPr lang="de-AT" dirty="0"/>
           </a:p>
-          <a:p>
-            <a:r>
-              <a:rPr lang="de-AT" dirty="0" smtClean="0"/>
-              <a:t>Pros:</a:t>
-            </a:r>
-          </a:p>
-          <a:p>
-            <a:pPr lvl="1"/>
-            <a:r>
-              <a:rPr lang="de-AT" dirty="0" smtClean="0"/>
-              <a:t>Speeds </a:t>
-            </a:r>
-            <a:r>
-              <a:rPr lang="de-AT" dirty="0" err="1" smtClean="0"/>
-              <a:t>up</a:t>
-            </a:r>
-            <a:r>
-              <a:rPr lang="de-AT" dirty="0" smtClean="0"/>
-              <a:t> </a:t>
-            </a:r>
-            <a:r>
-              <a:rPr lang="de-AT" dirty="0" err="1" smtClean="0"/>
-              <a:t>data</a:t>
-            </a:r>
-            <a:r>
-              <a:rPr lang="de-AT" dirty="0" smtClean="0"/>
-              <a:t> </a:t>
-            </a:r>
-            <a:r>
-              <a:rPr lang="de-AT" dirty="0" err="1" smtClean="0"/>
-              <a:t>access</a:t>
-            </a:r>
-            <a:r>
-              <a:rPr lang="de-AT" dirty="0" smtClean="0"/>
-              <a:t> (</a:t>
-            </a:r>
-            <a:r>
-              <a:rPr lang="de-AT" dirty="0" err="1" smtClean="0"/>
-              <a:t>navigation</a:t>
-            </a:r>
-            <a:r>
-              <a:rPr lang="de-AT" dirty="0" smtClean="0"/>
-              <a:t> </a:t>
-            </a:r>
-            <a:r>
-              <a:rPr lang="de-AT" dirty="0" err="1" smtClean="0"/>
-              <a:t>path</a:t>
-            </a:r>
-            <a:r>
-              <a:rPr lang="de-AT" dirty="0" smtClean="0"/>
-              <a:t> </a:t>
-            </a:r>
-            <a:r>
-              <a:rPr lang="de-AT" dirty="0" err="1" smtClean="0"/>
-              <a:t>is</a:t>
-            </a:r>
-            <a:r>
-              <a:rPr lang="de-AT" dirty="0" smtClean="0"/>
-              <a:t> </a:t>
-            </a:r>
-            <a:r>
-              <a:rPr lang="de-AT" dirty="0" err="1" smtClean="0"/>
-              <a:t>shortened</a:t>
-            </a:r>
-            <a:r>
-              <a:rPr lang="de-AT" dirty="0" smtClean="0"/>
-              <a:t> </a:t>
-            </a:r>
-            <a:r>
-              <a:rPr lang="de-AT" dirty="0" err="1" smtClean="0"/>
-              <a:t>for</a:t>
-            </a:r>
-            <a:r>
-              <a:rPr lang="de-AT" dirty="0" smtClean="0"/>
-              <a:t> </a:t>
-            </a:r>
-            <a:r>
-              <a:rPr lang="de-AT" dirty="0" err="1" smtClean="0"/>
-              <a:t>some</a:t>
-            </a:r>
-            <a:r>
-              <a:rPr lang="de-AT" dirty="0" smtClean="0"/>
-              <a:t> </a:t>
-            </a:r>
-            <a:r>
-              <a:rPr lang="de-AT" dirty="0" err="1" smtClean="0"/>
-              <a:t>operations</a:t>
-            </a:r>
-            <a:r>
-              <a:rPr lang="de-AT" dirty="0" smtClean="0"/>
-              <a:t>)</a:t>
-            </a:r>
-          </a:p>
-          <a:p>
-            <a:pPr lvl="1"/>
-            <a:endParaRPr lang="de-AT" dirty="0"/>
-          </a:p>
-          <a:p>
-            <a:r>
-              <a:rPr lang="de-AT" dirty="0" err="1" smtClean="0"/>
-              <a:t>Cons</a:t>
-            </a:r>
-            <a:r>
-              <a:rPr lang="de-AT" dirty="0" smtClean="0"/>
-              <a:t>:</a:t>
-            </a:r>
-          </a:p>
-          <a:p>
-            <a:pPr lvl="1"/>
-            <a:r>
-              <a:rPr lang="de-AT" dirty="0" smtClean="0"/>
-              <a:t>Additional </a:t>
-            </a:r>
-            <a:r>
-              <a:rPr lang="de-AT" dirty="0" err="1" smtClean="0"/>
-              <a:t>updates</a:t>
-            </a:r>
-            <a:endParaRPr lang="de-AT" dirty="0" smtClean="0"/>
-          </a:p>
-          <a:p>
-            <a:pPr lvl="1"/>
-            <a:r>
-              <a:rPr lang="de-AT" dirty="0" err="1" smtClean="0"/>
-              <a:t>Risk</a:t>
-            </a:r>
-            <a:r>
-              <a:rPr lang="de-AT" dirty="0" smtClean="0"/>
-              <a:t> </a:t>
-            </a:r>
-            <a:r>
-              <a:rPr lang="de-AT" dirty="0" err="1" smtClean="0"/>
-              <a:t>of</a:t>
-            </a:r>
-            <a:r>
-              <a:rPr lang="de-AT" dirty="0" smtClean="0"/>
-              <a:t> </a:t>
-            </a:r>
-            <a:r>
-              <a:rPr lang="de-AT" dirty="0" err="1" smtClean="0"/>
-              <a:t>inconsistency</a:t>
-            </a:r>
-            <a:r>
-              <a:rPr lang="de-AT" dirty="0" smtClean="0"/>
-              <a:t> ( =&gt; </a:t>
-            </a:r>
-            <a:r>
-              <a:rPr lang="de-AT" dirty="0" err="1" smtClean="0"/>
-              <a:t>more</a:t>
-            </a:r>
-            <a:r>
-              <a:rPr lang="de-AT" dirty="0" smtClean="0"/>
-              <a:t> </a:t>
-            </a:r>
-            <a:r>
-              <a:rPr lang="de-AT" dirty="0" err="1" smtClean="0"/>
-              <a:t>consistency</a:t>
-            </a:r>
-            <a:r>
-              <a:rPr lang="de-AT" dirty="0" smtClean="0"/>
-              <a:t> </a:t>
-            </a:r>
-            <a:r>
-              <a:rPr lang="de-AT" dirty="0" err="1" smtClean="0"/>
-              <a:t>checks</a:t>
-            </a:r>
-            <a:r>
-              <a:rPr lang="de-AT" dirty="0" smtClean="0"/>
-              <a:t> </a:t>
-            </a:r>
-            <a:r>
-              <a:rPr lang="de-AT" dirty="0" err="1" smtClean="0"/>
-              <a:t>needed</a:t>
-            </a:r>
-            <a:r>
-              <a:rPr lang="de-AT" dirty="0" smtClean="0"/>
-              <a:t>)</a:t>
-            </a:r>
-          </a:p>
-          <a:p>
-            <a:pPr lvl="1"/>
-            <a:r>
-              <a:rPr lang="de-AT" dirty="0" smtClean="0"/>
-              <a:t>Additional </a:t>
-            </a:r>
-            <a:r>
-              <a:rPr lang="de-AT" dirty="0" err="1" smtClean="0"/>
-              <a:t>storage</a:t>
-            </a:r>
-            <a:r>
-              <a:rPr lang="de-AT" dirty="0" smtClean="0"/>
-              <a:t> </a:t>
-            </a:r>
-            <a:r>
-              <a:rPr lang="de-AT" dirty="0" err="1" smtClean="0"/>
-              <a:t>space</a:t>
-            </a:r>
-            <a:endParaRPr lang="de-AT" dirty="0" smtClean="0"/>
-          </a:p>
-          <a:p>
-            <a:pPr lvl="1"/>
-            <a:endParaRPr lang="de-AT" dirty="0"/>
-          </a:p>
-          <a:p>
-            <a:pPr marL="365760" lvl="1" indent="0">
-              <a:buNone/>
-            </a:pPr>
-            <a:endParaRPr lang="de-AT" dirty="0"/>
-          </a:p>
-        </p:txBody>
-      </p:sp>
+        </p:txBody>
+      </p:sp>
+      <p:pic>
+        <p:nvPicPr>
+          <p:cNvPr id="4" name="Inhaltsplatzhalter 3"/>
+          <p:cNvPicPr>
+            <a:picLocks noGrp="1" noChangeAspect="1"/>
+          </p:cNvPicPr>
+          <p:nvPr>
+            <p:ph sz="quarter" idx="1"/>
+          </p:nvPr>
+        </p:nvPicPr>
+        <p:blipFill>
+          <a:blip r:embed="rId2">
+            <a:extLst>
+              <a:ext uri="{28A0092B-C50C-407E-A947-70E740481C1C}">
+                <a14:useLocalDpi xmlns:a14="http://schemas.microsoft.com/office/drawing/2010/main" val="0"/>
+              </a:ext>
+            </a:extLst>
+          </a:blip>
+          <a:stretch>
+            <a:fillRect/>
+          </a:stretch>
+        </p:blipFill>
+        <p:spPr>
+          <a:xfrm>
+            <a:off x="2213340" y="1600200"/>
+            <a:ext cx="4952270" cy="4495800"/>
+          </a:xfrm>
+        </p:spPr>
+      </p:pic>
     </p:spTree>
     <p:extLst>
       <p:ext uri="{BB962C8B-B14F-4D97-AF65-F5344CB8AC3E}">
-        <p14:creationId xmlns:p14="http://schemas.microsoft.com/office/powerpoint/2010/main" val="526241371"/>
+        <p14:creationId xmlns:p14="http://schemas.microsoft.com/office/powerpoint/2010/main" val="3460682268"/>
       </p:ext>
     </p:extLst>
   </p:cSld>

</xml_diff>

<commit_message>
added scenarios and interschema properties
</commit_message>
<xml_diff>
--- a/Assignment_4.pptx
+++ b/Assignment_4.pptx
@@ -11,32 +11,33 @@
     <p:sldId id="288" r:id="rId5"/>
     <p:sldId id="289" r:id="rId6"/>
     <p:sldId id="271" r:id="rId7"/>
-    <p:sldId id="273" r:id="rId8"/>
-    <p:sldId id="285" r:id="rId9"/>
-    <p:sldId id="286" r:id="rId10"/>
-    <p:sldId id="274" r:id="rId11"/>
-    <p:sldId id="275" r:id="rId12"/>
-    <p:sldId id="276" r:id="rId13"/>
-    <p:sldId id="277" r:id="rId14"/>
-    <p:sldId id="278" r:id="rId15"/>
-    <p:sldId id="279" r:id="rId16"/>
-    <p:sldId id="280" r:id="rId17"/>
-    <p:sldId id="282" r:id="rId18"/>
-    <p:sldId id="281" r:id="rId19"/>
-    <p:sldId id="283" r:id="rId20"/>
-    <p:sldId id="257" r:id="rId21"/>
-    <p:sldId id="258" r:id="rId22"/>
-    <p:sldId id="259" r:id="rId23"/>
-    <p:sldId id="260" r:id="rId24"/>
-    <p:sldId id="261" r:id="rId25"/>
-    <p:sldId id="262" r:id="rId26"/>
-    <p:sldId id="263" r:id="rId27"/>
-    <p:sldId id="264" r:id="rId28"/>
-    <p:sldId id="265" r:id="rId29"/>
-    <p:sldId id="266" r:id="rId30"/>
-    <p:sldId id="267" r:id="rId31"/>
-    <p:sldId id="268" r:id="rId32"/>
-    <p:sldId id="269" r:id="rId33"/>
+    <p:sldId id="290" r:id="rId8"/>
+    <p:sldId id="273" r:id="rId9"/>
+    <p:sldId id="285" r:id="rId10"/>
+    <p:sldId id="286" r:id="rId11"/>
+    <p:sldId id="274" r:id="rId12"/>
+    <p:sldId id="275" r:id="rId13"/>
+    <p:sldId id="276" r:id="rId14"/>
+    <p:sldId id="277" r:id="rId15"/>
+    <p:sldId id="278" r:id="rId16"/>
+    <p:sldId id="279" r:id="rId17"/>
+    <p:sldId id="280" r:id="rId18"/>
+    <p:sldId id="282" r:id="rId19"/>
+    <p:sldId id="281" r:id="rId20"/>
+    <p:sldId id="283" r:id="rId21"/>
+    <p:sldId id="257" r:id="rId22"/>
+    <p:sldId id="258" r:id="rId23"/>
+    <p:sldId id="259" r:id="rId24"/>
+    <p:sldId id="260" r:id="rId25"/>
+    <p:sldId id="261" r:id="rId26"/>
+    <p:sldId id="262" r:id="rId27"/>
+    <p:sldId id="263" r:id="rId28"/>
+    <p:sldId id="264" r:id="rId29"/>
+    <p:sldId id="265" r:id="rId30"/>
+    <p:sldId id="266" r:id="rId31"/>
+    <p:sldId id="267" r:id="rId32"/>
+    <p:sldId id="268" r:id="rId33"/>
+    <p:sldId id="269" r:id="rId34"/>
   </p:sldIdLst>
   <p:sldSz cx="9144000" cy="6858000" type="screen4x3"/>
   <p:notesSz cx="6858000" cy="9144000"/>
@@ -3802,7 +3803,7 @@
         <p:spPr/>
         <p:txBody>
           <a:bodyPr>
-            <a:normAutofit fontScale="90000"/>
+            <a:normAutofit/>
           </a:bodyPr>
           <a:lstStyle/>
           <a:p>
@@ -3814,24 +3815,17 @@
               <a:rPr lang="de-AT" dirty="0" smtClean="0"/>
               <a:t> 2 – </a:t>
             </a:r>
-            <a:br>
-              <a:rPr lang="de-AT" dirty="0" smtClean="0"/>
-            </a:br>
-            <a:r>
-              <a:rPr lang="de-AT" dirty="0" smtClean="0"/>
-              <a:t>Determination </a:t>
-            </a:r>
-            <a:r>
-              <a:rPr lang="de-AT" dirty="0" err="1" smtClean="0"/>
-              <a:t>of</a:t>
-            </a:r>
-            <a:r>
-              <a:rPr lang="de-AT" dirty="0" smtClean="0"/>
-              <a:t> </a:t>
-            </a:r>
-            <a:r>
-              <a:rPr lang="de-AT" dirty="0" err="1" smtClean="0"/>
-              <a:t>Quantities</a:t>
+            <a:r>
+              <a:rPr lang="de-AT" dirty="0" err="1" smtClean="0"/>
+              <a:t>Calculation</a:t>
+            </a:r>
+            <a:r>
+              <a:rPr lang="de-AT" dirty="0" smtClean="0"/>
+              <a:t> </a:t>
+            </a:r>
+            <a:r>
+              <a:rPr lang="de-AT" dirty="0" err="1" smtClean="0"/>
+              <a:t>rules</a:t>
             </a:r>
             <a:endParaRPr lang="de-AT" dirty="0"/>
           </a:p>
@@ -3861,258 +3855,15 @@
         </p:blipFill>
         <p:spPr>
           <a:xfrm>
-            <a:off x="781023" y="1556792"/>
-            <a:ext cx="5611008" cy="3391374"/>
+            <a:off x="2213340" y="1600200"/>
+            <a:ext cx="4952270" cy="4495800"/>
           </a:xfrm>
         </p:spPr>
       </p:pic>
-      <p:sp>
-        <p:nvSpPr>
-          <p:cNvPr id="5" name="Textfeld 4"/>
-          <p:cNvSpPr txBox="1"/>
-          <p:nvPr/>
-        </p:nvSpPr>
-        <p:spPr>
-          <a:xfrm>
-            <a:off x="810105" y="4797152"/>
-            <a:ext cx="7920880" cy="1815882"/>
-          </a:xfrm>
-          <a:prstGeom prst="rect">
-            <a:avLst/>
-          </a:prstGeom>
-          <a:noFill/>
-        </p:spPr>
-        <p:txBody>
-          <a:bodyPr wrap="square" rtlCol="0">
-            <a:spAutoFit/>
-          </a:bodyPr>
-          <a:lstStyle/>
-          <a:p>
-            <a:r>
-              <a:rPr lang="en-GB" sz="1400" dirty="0"/>
-              <a:t>N(publisher) x N (publisher, publishes ) = N (publishes)  = N(book</a:t>
-            </a:r>
-            <a:r>
-              <a:rPr lang="en-GB" sz="1400" dirty="0" smtClean="0"/>
-              <a:t>)</a:t>
-            </a:r>
-          </a:p>
-          <a:p>
-            <a:pPr marL="285750" indent="-285750">
-              <a:buFont typeface="Symbol"/>
-              <a:buChar char="Þ"/>
-            </a:pPr>
-            <a:r>
-              <a:rPr lang="en-GB" sz="1400" dirty="0" smtClean="0"/>
-              <a:t>N(book) = N(publishes) = 100 x 1.000 = 100.000</a:t>
-            </a:r>
-          </a:p>
-          <a:p>
-            <a:endParaRPr lang="de-AT" sz="1400" dirty="0" smtClean="0"/>
-          </a:p>
-          <a:p>
-            <a:r>
-              <a:rPr lang="en-GB" sz="1400" dirty="0"/>
-              <a:t>N(author) = N(writes) / N(writes, author)</a:t>
-            </a:r>
-            <a:endParaRPr lang="de-AT" sz="1400" dirty="0"/>
-          </a:p>
-          <a:p>
-            <a:pPr marL="285750" indent="-285750">
-              <a:buFont typeface="Symbol"/>
-              <a:buChar char="Þ"/>
-            </a:pPr>
-            <a:r>
-              <a:rPr lang="en-GB" sz="1400" dirty="0" smtClean="0"/>
-              <a:t>N(author) = 400.000 / 20 = 20.000</a:t>
-            </a:r>
-          </a:p>
-          <a:p>
-            <a:pPr marL="285750" indent="-285750">
-              <a:buFont typeface="Symbol"/>
-              <a:buChar char="Þ"/>
-            </a:pPr>
-            <a:endParaRPr lang="en-GB" sz="1400" dirty="0"/>
-          </a:p>
-          <a:p>
-            <a:r>
-              <a:rPr lang="en-GB" sz="1400" dirty="0"/>
-              <a:t>N(book, writes) = N (writes) / N(books</a:t>
-            </a:r>
-            <a:r>
-              <a:rPr lang="en-GB" sz="1400" dirty="0" smtClean="0"/>
-              <a:t>)</a:t>
-            </a:r>
-            <a:endParaRPr lang="en-GB" dirty="0"/>
-          </a:p>
-          <a:p>
-            <a:pPr marL="285750" indent="-285750">
-              <a:buFont typeface="Symbol"/>
-              <a:buChar char="Þ"/>
-            </a:pPr>
-            <a:r>
-              <a:rPr lang="en-GB" sz="1400" dirty="0" smtClean="0"/>
-              <a:t>N(book, writes) = 400.000 / 100.000 = 4</a:t>
-            </a:r>
-          </a:p>
-        </p:txBody>
-      </p:sp>
-      <p:sp>
-        <p:nvSpPr>
-          <p:cNvPr id="6" name="Textfeld 5"/>
-          <p:cNvSpPr txBox="1"/>
-          <p:nvPr/>
-        </p:nvSpPr>
-        <p:spPr>
-          <a:xfrm>
-            <a:off x="1763688" y="1516783"/>
-            <a:ext cx="1080120" cy="276999"/>
-          </a:xfrm>
-          <a:prstGeom prst="rect">
-            <a:avLst/>
-          </a:prstGeom>
-          <a:noFill/>
-        </p:spPr>
-        <p:txBody>
-          <a:bodyPr wrap="square" rtlCol="0">
-            <a:spAutoFit/>
-          </a:bodyPr>
-          <a:lstStyle/>
-          <a:p>
-            <a:r>
-              <a:rPr lang="de-AT" sz="1200" b="1" dirty="0" smtClean="0">
-                <a:solidFill>
-                  <a:srgbClr val="FF0000"/>
-                </a:solidFill>
-              </a:rPr>
-              <a:t>&lt;100.000&gt;</a:t>
-            </a:r>
-            <a:endParaRPr lang="de-AT" sz="1200" b="1" dirty="0">
-              <a:solidFill>
-                <a:srgbClr val="FF0000"/>
-              </a:solidFill>
-            </a:endParaRPr>
-          </a:p>
-        </p:txBody>
-      </p:sp>
-      <p:sp>
-        <p:nvSpPr>
-          <p:cNvPr id="7" name="Textfeld 6"/>
-          <p:cNvSpPr txBox="1"/>
-          <p:nvPr/>
-        </p:nvSpPr>
-        <p:spPr>
-          <a:xfrm>
-            <a:off x="4427984" y="1514181"/>
-            <a:ext cx="1080120" cy="276999"/>
-          </a:xfrm>
-          <a:prstGeom prst="rect">
-            <a:avLst/>
-          </a:prstGeom>
-          <a:noFill/>
-        </p:spPr>
-        <p:txBody>
-          <a:bodyPr wrap="square" rtlCol="0">
-            <a:spAutoFit/>
-          </a:bodyPr>
-          <a:lstStyle/>
-          <a:p>
-            <a:r>
-              <a:rPr lang="de-AT" sz="1200" b="1" dirty="0" smtClean="0">
-                <a:solidFill>
-                  <a:srgbClr val="FF0000"/>
-                </a:solidFill>
-              </a:rPr>
-              <a:t>&lt;100.000&gt;</a:t>
-            </a:r>
-            <a:endParaRPr lang="de-AT" sz="1200" b="1" dirty="0">
-              <a:solidFill>
-                <a:srgbClr val="FF0000"/>
-              </a:solidFill>
-            </a:endParaRPr>
-          </a:p>
-        </p:txBody>
-      </p:sp>
-      <p:sp>
-        <p:nvSpPr>
-          <p:cNvPr id="8" name="Textfeld 7"/>
-          <p:cNvSpPr txBox="1"/>
-          <p:nvPr/>
-        </p:nvSpPr>
-        <p:spPr>
-          <a:xfrm>
-            <a:off x="5506258" y="2852936"/>
-            <a:ext cx="1080120" cy="276999"/>
-          </a:xfrm>
-          <a:prstGeom prst="rect">
-            <a:avLst/>
-          </a:prstGeom>
-          <a:noFill/>
-        </p:spPr>
-        <p:txBody>
-          <a:bodyPr wrap="square" rtlCol="0">
-            <a:spAutoFit/>
-          </a:bodyPr>
-          <a:lstStyle/>
-          <a:p>
-            <a:r>
-              <a:rPr lang="de-AT" sz="1200" b="1" dirty="0" smtClean="0">
-                <a:solidFill>
-                  <a:srgbClr val="FF0000"/>
-                </a:solidFill>
-              </a:rPr>
-              <a:t>&lt;4&gt;</a:t>
-            </a:r>
-            <a:endParaRPr lang="de-AT" sz="1200" b="1" dirty="0">
-              <a:solidFill>
-                <a:srgbClr val="FF0000"/>
-              </a:solidFill>
-            </a:endParaRPr>
-          </a:p>
-        </p:txBody>
-      </p:sp>
-      <p:sp>
-        <p:nvSpPr>
-          <p:cNvPr id="9" name="Textfeld 8"/>
-          <p:cNvSpPr txBox="1"/>
-          <p:nvPr/>
-        </p:nvSpPr>
-        <p:spPr>
-          <a:xfrm>
-            <a:off x="5483825" y="4187309"/>
-            <a:ext cx="1080120" cy="276999"/>
-          </a:xfrm>
-          <a:prstGeom prst="rect">
-            <a:avLst/>
-          </a:prstGeom>
-          <a:noFill/>
-        </p:spPr>
-        <p:txBody>
-          <a:bodyPr wrap="square" rtlCol="0">
-            <a:spAutoFit/>
-          </a:bodyPr>
-          <a:lstStyle/>
-          <a:p>
-            <a:r>
-              <a:rPr lang="de-AT" sz="1200" b="1" dirty="0" smtClean="0">
-                <a:solidFill>
-                  <a:srgbClr val="FF0000"/>
-                </a:solidFill>
-              </a:rPr>
-              <a:t>&lt;20.000&gt;</a:t>
-            </a:r>
-            <a:endParaRPr lang="de-AT" sz="1200" b="1" dirty="0">
-              <a:solidFill>
-                <a:srgbClr val="FF0000"/>
-              </a:solidFill>
-            </a:endParaRPr>
-          </a:p>
-        </p:txBody>
-      </p:sp>
     </p:spTree>
     <p:extLst>
       <p:ext uri="{BB962C8B-B14F-4D97-AF65-F5344CB8AC3E}">
-        <p14:creationId xmlns:p14="http://schemas.microsoft.com/office/powerpoint/2010/main" val="1343703413"/>
+        <p14:creationId xmlns:p14="http://schemas.microsoft.com/office/powerpoint/2010/main" val="3460682268"/>
       </p:ext>
     </p:extLst>
   </p:cSld>
@@ -4151,7 +3902,9 @@
         </p:nvSpPr>
         <p:spPr/>
         <p:txBody>
-          <a:bodyPr/>
+          <a:bodyPr>
+            <a:normAutofit fontScale="90000"/>
+          </a:bodyPr>
           <a:lstStyle/>
           <a:p>
             <a:r>
@@ -4160,51 +3913,307 @@
             </a:r>
             <a:r>
               <a:rPr lang="de-AT" dirty="0" smtClean="0"/>
-              <a:t> 2 - Navigation</a:t>
+              <a:t> 2 – </a:t>
+            </a:r>
+            <a:br>
+              <a:rPr lang="de-AT" dirty="0" smtClean="0"/>
+            </a:br>
+            <a:r>
+              <a:rPr lang="de-AT" dirty="0" smtClean="0"/>
+              <a:t>Determination </a:t>
+            </a:r>
+            <a:r>
+              <a:rPr lang="de-AT" dirty="0" err="1" smtClean="0"/>
+              <a:t>of</a:t>
+            </a:r>
+            <a:r>
+              <a:rPr lang="de-AT" dirty="0" smtClean="0"/>
+              <a:t> </a:t>
+            </a:r>
+            <a:r>
+              <a:rPr lang="de-AT" dirty="0" err="1" smtClean="0"/>
+              <a:t>Quantities</a:t>
             </a:r>
             <a:endParaRPr lang="de-AT" dirty="0"/>
           </a:p>
         </p:txBody>
       </p:sp>
-      <p:sp>
-        <p:nvSpPr>
-          <p:cNvPr id="3" name="Inhaltsplatzhalter 2"/>
-          <p:cNvSpPr>
-            <a:spLocks noGrp="1"/>
-          </p:cNvSpPr>
+      <p:pic>
+        <p:nvPicPr>
+          <p:cNvPr id="4" name="Inhaltsplatzhalter 3"/>
+          <p:cNvPicPr>
+            <a:picLocks noGrp="1" noChangeAspect="1"/>
+          </p:cNvPicPr>
           <p:nvPr>
             <p:ph sz="quarter" idx="1"/>
           </p:nvPr>
-        </p:nvSpPr>
-        <p:spPr/>
-        <p:txBody>
-          <a:bodyPr/>
+        </p:nvPicPr>
+        <p:blipFill>
+          <a:blip r:embed="rId2">
+            <a:extLst>
+              <a:ext uri="{28A0092B-C50C-407E-A947-70E740481C1C}">
+                <a14:useLocalDpi xmlns:a14="http://schemas.microsoft.com/office/drawing/2010/main" val="0"/>
+              </a:ext>
+            </a:extLst>
+          </a:blip>
+          <a:stretch>
+            <a:fillRect/>
+          </a:stretch>
+        </p:blipFill>
+        <p:spPr>
+          <a:xfrm>
+            <a:off x="781023" y="1556792"/>
+            <a:ext cx="5611008" cy="3391374"/>
+          </a:xfrm>
+        </p:spPr>
+      </p:pic>
+      <p:sp>
+        <p:nvSpPr>
+          <p:cNvPr id="5" name="Textfeld 4"/>
+          <p:cNvSpPr txBox="1"/>
+          <p:nvPr/>
+        </p:nvSpPr>
+        <p:spPr>
+          <a:xfrm>
+            <a:off x="810105" y="4797152"/>
+            <a:ext cx="7920880" cy="1815882"/>
+          </a:xfrm>
+          <a:prstGeom prst="rect">
+            <a:avLst/>
+          </a:prstGeom>
+          <a:noFill/>
+        </p:spPr>
+        <p:txBody>
+          <a:bodyPr wrap="square" rtlCol="0">
+            <a:spAutoFit/>
+          </a:bodyPr>
           <a:lstStyle/>
           <a:p>
             <a:r>
-              <a:rPr lang="en-GB" dirty="0" smtClean="0"/>
-              <a:t>To get the result of a query or to execute an operation, multiple entity types and relations might have to be accessed.</a:t>
-            </a:r>
-          </a:p>
-          <a:p>
-            <a:r>
-              <a:rPr lang="en-GB" dirty="0" smtClean="0"/>
-              <a:t>Navigation path shows, which entity types and relations are accessed and in which order.</a:t>
-            </a:r>
-          </a:p>
-          <a:p>
-            <a:r>
-              <a:rPr lang="en-GB" dirty="0" smtClean="0"/>
-              <a:t>Necessary for evaluating costs of database operations</a:t>
+              <a:rPr lang="en-GB" sz="1400" dirty="0"/>
+              <a:t>N(publisher) x N (publisher, publishes ) = N (publishes)  = N(book</a:t>
+            </a:r>
+            <a:r>
+              <a:rPr lang="en-GB" sz="1400" dirty="0" smtClean="0"/>
+              <a:t>)</a:t>
+            </a:r>
+          </a:p>
+          <a:p>
+            <a:pPr marL="285750" indent="-285750">
+              <a:buFont typeface="Symbol"/>
+              <a:buChar char="Þ"/>
+            </a:pPr>
+            <a:r>
+              <a:rPr lang="en-GB" sz="1400" dirty="0" smtClean="0"/>
+              <a:t>N(book) = N(publishes) = 100 x 1.000 = 100.000</a:t>
+            </a:r>
+          </a:p>
+          <a:p>
+            <a:endParaRPr lang="de-AT" sz="1400" dirty="0" smtClean="0"/>
+          </a:p>
+          <a:p>
+            <a:r>
+              <a:rPr lang="en-GB" sz="1400" dirty="0"/>
+              <a:t>N(author) = N(writes) / N(writes, author)</a:t>
+            </a:r>
+            <a:endParaRPr lang="de-AT" sz="1400" dirty="0"/>
+          </a:p>
+          <a:p>
+            <a:pPr marL="285750" indent="-285750">
+              <a:buFont typeface="Symbol"/>
+              <a:buChar char="Þ"/>
+            </a:pPr>
+            <a:r>
+              <a:rPr lang="en-GB" sz="1400" dirty="0" smtClean="0"/>
+              <a:t>N(author) = 400.000 / 20 = 20.000</a:t>
+            </a:r>
+          </a:p>
+          <a:p>
+            <a:pPr marL="285750" indent="-285750">
+              <a:buFont typeface="Symbol"/>
+              <a:buChar char="Þ"/>
+            </a:pPr>
+            <a:endParaRPr lang="en-GB" sz="1400" dirty="0"/>
+          </a:p>
+          <a:p>
+            <a:r>
+              <a:rPr lang="en-GB" sz="1400" dirty="0"/>
+              <a:t>N(book, writes) = N (writes) / N(books</a:t>
+            </a:r>
+            <a:r>
+              <a:rPr lang="en-GB" sz="1400" dirty="0" smtClean="0"/>
+              <a:t>)</a:t>
             </a:r>
             <a:endParaRPr lang="en-GB" dirty="0"/>
+          </a:p>
+          <a:p>
+            <a:pPr marL="285750" indent="-285750">
+              <a:buFont typeface="Symbol"/>
+              <a:buChar char="Þ"/>
+            </a:pPr>
+            <a:r>
+              <a:rPr lang="en-GB" sz="1400" dirty="0" smtClean="0"/>
+              <a:t>N(book, writes) = 400.000 / 100.000 = 4</a:t>
+            </a:r>
+          </a:p>
+        </p:txBody>
+      </p:sp>
+      <p:sp>
+        <p:nvSpPr>
+          <p:cNvPr id="6" name="Textfeld 5"/>
+          <p:cNvSpPr txBox="1"/>
+          <p:nvPr/>
+        </p:nvSpPr>
+        <p:spPr>
+          <a:xfrm>
+            <a:off x="1763688" y="1516783"/>
+            <a:ext cx="1080120" cy="276999"/>
+          </a:xfrm>
+          <a:prstGeom prst="rect">
+            <a:avLst/>
+          </a:prstGeom>
+          <a:noFill/>
+        </p:spPr>
+        <p:txBody>
+          <a:bodyPr wrap="square" rtlCol="0">
+            <a:spAutoFit/>
+          </a:bodyPr>
+          <a:lstStyle/>
+          <a:p>
+            <a:r>
+              <a:rPr lang="de-AT" sz="1200" b="1" dirty="0" smtClean="0">
+                <a:solidFill>
+                  <a:srgbClr val="FF0000"/>
+                </a:solidFill>
+              </a:rPr>
+              <a:t>&lt;100.000&gt;</a:t>
+            </a:r>
+            <a:endParaRPr lang="de-AT" sz="1200" b="1" dirty="0">
+              <a:solidFill>
+                <a:srgbClr val="FF0000"/>
+              </a:solidFill>
+            </a:endParaRPr>
+          </a:p>
+        </p:txBody>
+      </p:sp>
+      <p:sp>
+        <p:nvSpPr>
+          <p:cNvPr id="7" name="Textfeld 6"/>
+          <p:cNvSpPr txBox="1"/>
+          <p:nvPr/>
+        </p:nvSpPr>
+        <p:spPr>
+          <a:xfrm>
+            <a:off x="4427984" y="1514181"/>
+            <a:ext cx="1080120" cy="276999"/>
+          </a:xfrm>
+          <a:prstGeom prst="rect">
+            <a:avLst/>
+          </a:prstGeom>
+          <a:noFill/>
+        </p:spPr>
+        <p:txBody>
+          <a:bodyPr wrap="square" rtlCol="0">
+            <a:spAutoFit/>
+          </a:bodyPr>
+          <a:lstStyle/>
+          <a:p>
+            <a:r>
+              <a:rPr lang="de-AT" sz="1200" b="1" dirty="0" smtClean="0">
+                <a:solidFill>
+                  <a:srgbClr val="FF0000"/>
+                </a:solidFill>
+              </a:rPr>
+              <a:t>&lt;100.000&gt;</a:t>
+            </a:r>
+            <a:endParaRPr lang="de-AT" sz="1200" b="1" dirty="0">
+              <a:solidFill>
+                <a:srgbClr val="FF0000"/>
+              </a:solidFill>
+            </a:endParaRPr>
+          </a:p>
+        </p:txBody>
+      </p:sp>
+      <p:sp>
+        <p:nvSpPr>
+          <p:cNvPr id="8" name="Textfeld 7"/>
+          <p:cNvSpPr txBox="1"/>
+          <p:nvPr/>
+        </p:nvSpPr>
+        <p:spPr>
+          <a:xfrm>
+            <a:off x="5506258" y="2852936"/>
+            <a:ext cx="1080120" cy="276999"/>
+          </a:xfrm>
+          <a:prstGeom prst="rect">
+            <a:avLst/>
+          </a:prstGeom>
+          <a:noFill/>
+        </p:spPr>
+        <p:txBody>
+          <a:bodyPr wrap="square" rtlCol="0">
+            <a:spAutoFit/>
+          </a:bodyPr>
+          <a:lstStyle/>
+          <a:p>
+            <a:r>
+              <a:rPr lang="de-AT" sz="1200" b="1" dirty="0" smtClean="0">
+                <a:solidFill>
+                  <a:srgbClr val="FF0000"/>
+                </a:solidFill>
+              </a:rPr>
+              <a:t>&lt;4&gt;</a:t>
+            </a:r>
+            <a:endParaRPr lang="de-AT" sz="1200" b="1" dirty="0">
+              <a:solidFill>
+                <a:srgbClr val="FF0000"/>
+              </a:solidFill>
+            </a:endParaRPr>
+          </a:p>
+        </p:txBody>
+      </p:sp>
+      <p:sp>
+        <p:nvSpPr>
+          <p:cNvPr id="9" name="Textfeld 8"/>
+          <p:cNvSpPr txBox="1"/>
+          <p:nvPr/>
+        </p:nvSpPr>
+        <p:spPr>
+          <a:xfrm>
+            <a:off x="5483825" y="4187309"/>
+            <a:ext cx="1080120" cy="276999"/>
+          </a:xfrm>
+          <a:prstGeom prst="rect">
+            <a:avLst/>
+          </a:prstGeom>
+          <a:noFill/>
+        </p:spPr>
+        <p:txBody>
+          <a:bodyPr wrap="square" rtlCol="0">
+            <a:spAutoFit/>
+          </a:bodyPr>
+          <a:lstStyle/>
+          <a:p>
+            <a:r>
+              <a:rPr lang="de-AT" sz="1200" b="1" dirty="0" smtClean="0">
+                <a:solidFill>
+                  <a:srgbClr val="FF0000"/>
+                </a:solidFill>
+              </a:rPr>
+              <a:t>&lt;20.000&gt;</a:t>
+            </a:r>
+            <a:endParaRPr lang="de-AT" sz="1200" b="1" dirty="0">
+              <a:solidFill>
+                <a:srgbClr val="FF0000"/>
+              </a:solidFill>
+            </a:endParaRPr>
           </a:p>
         </p:txBody>
       </p:sp>
     </p:spTree>
     <p:extLst>
       <p:ext uri="{BB962C8B-B14F-4D97-AF65-F5344CB8AC3E}">
-        <p14:creationId xmlns:p14="http://schemas.microsoft.com/office/powerpoint/2010/main" val="1138079737"/>
+        <p14:creationId xmlns:p14="http://schemas.microsoft.com/office/powerpoint/2010/main" val="1343703413"/>
       </p:ext>
     </p:extLst>
   </p:cSld>
@@ -4252,6 +4261,98 @@
             </a:r>
             <a:r>
               <a:rPr lang="de-AT" dirty="0" smtClean="0"/>
+              <a:t> 2 - Navigation</a:t>
+            </a:r>
+            <a:endParaRPr lang="de-AT" dirty="0"/>
+          </a:p>
+        </p:txBody>
+      </p:sp>
+      <p:sp>
+        <p:nvSpPr>
+          <p:cNvPr id="3" name="Inhaltsplatzhalter 2"/>
+          <p:cNvSpPr>
+            <a:spLocks noGrp="1"/>
+          </p:cNvSpPr>
+          <p:nvPr>
+            <p:ph sz="quarter" idx="1"/>
+          </p:nvPr>
+        </p:nvSpPr>
+        <p:spPr/>
+        <p:txBody>
+          <a:bodyPr/>
+          <a:lstStyle/>
+          <a:p>
+            <a:r>
+              <a:rPr lang="en-GB" dirty="0" smtClean="0"/>
+              <a:t>To get the result of a query or to execute an operation, multiple entity types and relations might have to be accessed.</a:t>
+            </a:r>
+          </a:p>
+          <a:p>
+            <a:r>
+              <a:rPr lang="en-GB" dirty="0" smtClean="0"/>
+              <a:t>Navigation path shows, which entity types and relations are accessed and in which order.</a:t>
+            </a:r>
+          </a:p>
+          <a:p>
+            <a:r>
+              <a:rPr lang="en-GB" dirty="0" smtClean="0"/>
+              <a:t>Necessary for evaluating costs of database operations</a:t>
+            </a:r>
+            <a:endParaRPr lang="en-GB" dirty="0"/>
+          </a:p>
+        </p:txBody>
+      </p:sp>
+    </p:spTree>
+    <p:extLst>
+      <p:ext uri="{BB962C8B-B14F-4D97-AF65-F5344CB8AC3E}">
+        <p14:creationId xmlns:p14="http://schemas.microsoft.com/office/powerpoint/2010/main" val="1138079737"/>
+      </p:ext>
+    </p:extLst>
+  </p:cSld>
+  <p:clrMapOvr>
+    <a:masterClrMapping/>
+  </p:clrMapOvr>
+</p:sld>
+</file>
+
+<file path=ppt/slides/slide13.xml><?xml version="1.0" encoding="utf-8"?>
+<p:sld xmlns:a="http://schemas.openxmlformats.org/drawingml/2006/main" xmlns:r="http://schemas.openxmlformats.org/officeDocument/2006/relationships" xmlns:p="http://schemas.openxmlformats.org/presentationml/2006/main">
+  <p:cSld>
+    <p:spTree>
+      <p:nvGrpSpPr>
+        <p:cNvPr id="1" name=""/>
+        <p:cNvGrpSpPr/>
+        <p:nvPr/>
+      </p:nvGrpSpPr>
+      <p:grpSpPr>
+        <a:xfrm>
+          <a:off x="0" y="0"/>
+          <a:ext cx="0" cy="0"/>
+          <a:chOff x="0" y="0"/>
+          <a:chExt cx="0" cy="0"/>
+        </a:xfrm>
+      </p:grpSpPr>
+      <p:sp>
+        <p:nvSpPr>
+          <p:cNvPr id="2" name="Titel 1"/>
+          <p:cNvSpPr>
+            <a:spLocks noGrp="1"/>
+          </p:cNvSpPr>
+          <p:nvPr>
+            <p:ph type="title"/>
+          </p:nvPr>
+        </p:nvSpPr>
+        <p:spPr/>
+        <p:txBody>
+          <a:bodyPr/>
+          <a:lstStyle/>
+          <a:p>
+            <a:r>
+              <a:rPr lang="de-AT" dirty="0" err="1" smtClean="0"/>
+              <a:t>Exercise</a:t>
+            </a:r>
+            <a:r>
+              <a:rPr lang="de-AT" dirty="0" smtClean="0"/>
               <a:t> 3 – </a:t>
             </a:r>
             <a:r>
@@ -4594,7 +4695,7 @@
 </p:sld>
 </file>
 
-<file path=ppt/slides/slide13.xml><?xml version="1.0" encoding="utf-8"?>
+<file path=ppt/slides/slide14.xml><?xml version="1.0" encoding="utf-8"?>
 <p:sld xmlns:a="http://schemas.openxmlformats.org/drawingml/2006/main" xmlns:r="http://schemas.openxmlformats.org/officeDocument/2006/relationships" xmlns:p="http://schemas.openxmlformats.org/presentationml/2006/main">
   <p:cSld>
     <p:spTree>
@@ -4981,7 +5082,7 @@
 </p:sld>
 </file>
 
-<file path=ppt/slides/slide14.xml><?xml version="1.0" encoding="utf-8"?>
+<file path=ppt/slides/slide15.xml><?xml version="1.0" encoding="utf-8"?>
 <p:sld xmlns:a="http://schemas.openxmlformats.org/drawingml/2006/main" xmlns:r="http://schemas.openxmlformats.org/officeDocument/2006/relationships" xmlns:p="http://schemas.openxmlformats.org/presentationml/2006/main">
   <p:cSld>
     <p:spTree>
@@ -5286,7 +5387,7 @@
 </p:sld>
 </file>
 
-<file path=ppt/slides/slide15.xml><?xml version="1.0" encoding="utf-8"?>
+<file path=ppt/slides/slide16.xml><?xml version="1.0" encoding="utf-8"?>
 <p:sld xmlns:a="http://schemas.openxmlformats.org/drawingml/2006/main" xmlns:r="http://schemas.openxmlformats.org/officeDocument/2006/relationships" xmlns:p="http://schemas.openxmlformats.org/presentationml/2006/main">
   <p:cSld>
     <p:spTree>
@@ -5597,7 +5698,7 @@
 </p:sld>
 </file>
 
-<file path=ppt/slides/slide16.xml><?xml version="1.0" encoding="utf-8"?>
+<file path=ppt/slides/slide17.xml><?xml version="1.0" encoding="utf-8"?>
 <p:sld xmlns:a="http://schemas.openxmlformats.org/drawingml/2006/main" xmlns:r="http://schemas.openxmlformats.org/officeDocument/2006/relationships" xmlns:p="http://schemas.openxmlformats.org/presentationml/2006/main">
   <p:cSld>
     <p:spTree>
@@ -5779,7 +5880,7 @@
 </p:sld>
 </file>
 
-<file path=ppt/slides/slide17.xml><?xml version="1.0" encoding="utf-8"?>
+<file path=ppt/slides/slide18.xml><?xml version="1.0" encoding="utf-8"?>
 <p:sld xmlns:a="http://schemas.openxmlformats.org/drawingml/2006/main" xmlns:r="http://schemas.openxmlformats.org/officeDocument/2006/relationships" xmlns:p="http://schemas.openxmlformats.org/presentationml/2006/main">
   <p:cSld>
     <p:spTree>
@@ -6528,7 +6629,7 @@
 </p:sld>
 </file>
 
-<file path=ppt/slides/slide18.xml><?xml version="1.0" encoding="utf-8"?>
+<file path=ppt/slides/slide19.xml><?xml version="1.0" encoding="utf-8"?>
 <p:sld xmlns:a="http://schemas.openxmlformats.org/drawingml/2006/main" xmlns:r="http://schemas.openxmlformats.org/officeDocument/2006/relationships" xmlns:p="http://schemas.openxmlformats.org/presentationml/2006/main">
   <p:cSld>
     <p:spTree>
@@ -7229,213 +7330,6 @@
 </p:sld>
 </file>
 
-<file path=ppt/slides/slide19.xml><?xml version="1.0" encoding="utf-8"?>
-<p:sld xmlns:a="http://schemas.openxmlformats.org/drawingml/2006/main" xmlns:r="http://schemas.openxmlformats.org/officeDocument/2006/relationships" xmlns:p="http://schemas.openxmlformats.org/presentationml/2006/main">
-  <p:cSld>
-    <p:spTree>
-      <p:nvGrpSpPr>
-        <p:cNvPr id="1" name=""/>
-        <p:cNvGrpSpPr/>
-        <p:nvPr/>
-      </p:nvGrpSpPr>
-      <p:grpSpPr>
-        <a:xfrm>
-          <a:off x="0" y="0"/>
-          <a:ext cx="0" cy="0"/>
-          <a:chOff x="0" y="0"/>
-          <a:chExt cx="0" cy="0"/>
-        </a:xfrm>
-      </p:grpSpPr>
-      <p:sp>
-        <p:nvSpPr>
-          <p:cNvPr id="2" name="Titel 1"/>
-          <p:cNvSpPr>
-            <a:spLocks noGrp="1"/>
-          </p:cNvSpPr>
-          <p:nvPr>
-            <p:ph type="title"/>
-          </p:nvPr>
-        </p:nvSpPr>
-        <p:spPr/>
-        <p:txBody>
-          <a:bodyPr/>
-          <a:lstStyle/>
-          <a:p>
-            <a:r>
-              <a:rPr lang="de-AT" dirty="0" err="1" smtClean="0"/>
-              <a:t>Exercise</a:t>
-            </a:r>
-            <a:r>
-              <a:rPr lang="de-AT" dirty="0" smtClean="0"/>
-              <a:t> 3b </a:t>
-            </a:r>
-            <a:r>
-              <a:rPr lang="de-AT" dirty="0"/>
-              <a:t>– </a:t>
-            </a:r>
-            <a:r>
-              <a:rPr lang="de-AT" dirty="0" err="1" smtClean="0"/>
-              <a:t>Conclusion</a:t>
-            </a:r>
-            <a:endParaRPr lang="de-AT" dirty="0"/>
-          </a:p>
-        </p:txBody>
-      </p:sp>
-      <p:sp>
-        <p:nvSpPr>
-          <p:cNvPr id="3" name="Inhaltsplatzhalter 2"/>
-          <p:cNvSpPr>
-            <a:spLocks noGrp="1"/>
-          </p:cNvSpPr>
-          <p:nvPr>
-            <p:ph sz="quarter" idx="1"/>
-          </p:nvPr>
-        </p:nvSpPr>
-        <p:spPr/>
-        <p:txBody>
-          <a:bodyPr/>
-          <a:lstStyle/>
-          <a:p>
-            <a:r>
-              <a:rPr lang="de-AT" dirty="0" err="1" smtClean="0"/>
-              <a:t>Accesses</a:t>
-            </a:r>
-            <a:r>
-              <a:rPr lang="de-AT" dirty="0" smtClean="0"/>
-              <a:t> per </a:t>
-            </a:r>
-            <a:r>
-              <a:rPr lang="de-AT" dirty="0" err="1" smtClean="0"/>
-              <a:t>month</a:t>
-            </a:r>
-            <a:r>
-              <a:rPr lang="de-AT" dirty="0" smtClean="0"/>
-              <a:t> </a:t>
-            </a:r>
-            <a:r>
-              <a:rPr lang="de-AT" dirty="0" err="1" smtClean="0"/>
-              <a:t>without</a:t>
-            </a:r>
-            <a:r>
-              <a:rPr lang="de-AT" dirty="0" smtClean="0"/>
-              <a:t> </a:t>
-            </a:r>
-            <a:r>
-              <a:rPr lang="de-AT" dirty="0" err="1" smtClean="0"/>
-              <a:t>redundancy</a:t>
-            </a:r>
-            <a:r>
-              <a:rPr lang="de-AT" dirty="0" smtClean="0"/>
-              <a:t>:</a:t>
-            </a:r>
-          </a:p>
-          <a:p>
-            <a:pPr marL="365760" lvl="1" indent="0" algn="ctr">
-              <a:buNone/>
-            </a:pPr>
-            <a:r>
-              <a:rPr lang="de-AT" b="1" dirty="0" smtClean="0">
-                <a:solidFill>
-                  <a:srgbClr val="FF0000"/>
-                </a:solidFill>
-              </a:rPr>
-              <a:t>40.402.110</a:t>
-            </a:r>
-            <a:endParaRPr lang="de-AT" b="1" dirty="0">
-              <a:solidFill>
-                <a:srgbClr val="FF0000"/>
-              </a:solidFill>
-            </a:endParaRPr>
-          </a:p>
-          <a:p>
-            <a:r>
-              <a:rPr lang="de-AT" dirty="0" err="1" smtClean="0"/>
-              <a:t>Accesses</a:t>
-            </a:r>
-            <a:r>
-              <a:rPr lang="de-AT" dirty="0" smtClean="0"/>
-              <a:t> per </a:t>
-            </a:r>
-            <a:r>
-              <a:rPr lang="de-AT" dirty="0" err="1" smtClean="0"/>
-              <a:t>month</a:t>
-            </a:r>
-            <a:r>
-              <a:rPr lang="de-AT" dirty="0" smtClean="0"/>
-              <a:t> </a:t>
-            </a:r>
-            <a:r>
-              <a:rPr lang="de-AT" dirty="0" err="1" smtClean="0"/>
-              <a:t>with</a:t>
-            </a:r>
-            <a:r>
-              <a:rPr lang="de-AT" dirty="0" smtClean="0"/>
-              <a:t> </a:t>
-            </a:r>
-            <a:r>
-              <a:rPr lang="de-AT" dirty="0" err="1" smtClean="0"/>
-              <a:t>redundancy</a:t>
-            </a:r>
-            <a:r>
-              <a:rPr lang="de-AT" dirty="0" smtClean="0"/>
-              <a:t>:</a:t>
-            </a:r>
-          </a:p>
-          <a:p>
-            <a:pPr marL="365760" lvl="1" indent="0" algn="ctr">
-              <a:buNone/>
-            </a:pPr>
-            <a:r>
-              <a:rPr lang="de-AT" b="1" u="sng" dirty="0" smtClean="0">
-                <a:solidFill>
-                  <a:srgbClr val="92D050"/>
-                </a:solidFill>
-              </a:rPr>
-              <a:t>405.110</a:t>
-            </a:r>
-            <a:endParaRPr lang="de-AT" b="1" u="sng" dirty="0">
-              <a:solidFill>
-                <a:srgbClr val="92D050"/>
-              </a:solidFill>
-            </a:endParaRPr>
-          </a:p>
-          <a:p>
-            <a:endParaRPr lang="de-AT" dirty="0" smtClean="0"/>
-          </a:p>
-          <a:p>
-            <a:r>
-              <a:rPr lang="de-AT" b="1" dirty="0" err="1" smtClean="0"/>
-              <a:t>Therefore</a:t>
-            </a:r>
-            <a:r>
-              <a:rPr lang="de-AT" b="1" dirty="0" smtClean="0"/>
-              <a:t>: Keep </a:t>
-            </a:r>
-            <a:r>
-              <a:rPr lang="de-AT" b="1" dirty="0" err="1" smtClean="0"/>
-              <a:t>redundancy</a:t>
-            </a:r>
-            <a:r>
-              <a:rPr lang="de-AT" b="1" dirty="0" smtClean="0"/>
-              <a:t>!</a:t>
-            </a:r>
-            <a:endParaRPr lang="de-AT" b="1" dirty="0"/>
-          </a:p>
-        </p:txBody>
-      </p:sp>
-    </p:spTree>
-    <p:extLst>
-      <p:ext uri="{BB962C8B-B14F-4D97-AF65-F5344CB8AC3E}">
-        <p14:creationId xmlns:p14="http://schemas.microsoft.com/office/powerpoint/2010/main" val="1532810805"/>
-      </p:ext>
-    </p:extLst>
-  </p:cSld>
-  <p:clrMapOvr>
-    <a:masterClrMapping/>
-  </p:clrMapOvr>
-</p:sld>
-</file>
-
 <file path=ppt/slides/slide2.xml><?xml version="1.0" encoding="utf-8"?>
 <p:sld xmlns:a="http://schemas.openxmlformats.org/drawingml/2006/main" xmlns:r="http://schemas.openxmlformats.org/officeDocument/2006/relationships" xmlns:p="http://schemas.openxmlformats.org/presentationml/2006/main">
   <p:cSld>
@@ -7652,6 +7546,213 @@
             </a:r>
             <a:r>
               <a:rPr lang="de-AT" dirty="0" smtClean="0"/>
+              <a:t> 3b </a:t>
+            </a:r>
+            <a:r>
+              <a:rPr lang="de-AT" dirty="0"/>
+              <a:t>– </a:t>
+            </a:r>
+            <a:r>
+              <a:rPr lang="de-AT" dirty="0" err="1" smtClean="0"/>
+              <a:t>Conclusion</a:t>
+            </a:r>
+            <a:endParaRPr lang="de-AT" dirty="0"/>
+          </a:p>
+        </p:txBody>
+      </p:sp>
+      <p:sp>
+        <p:nvSpPr>
+          <p:cNvPr id="3" name="Inhaltsplatzhalter 2"/>
+          <p:cNvSpPr>
+            <a:spLocks noGrp="1"/>
+          </p:cNvSpPr>
+          <p:nvPr>
+            <p:ph sz="quarter" idx="1"/>
+          </p:nvPr>
+        </p:nvSpPr>
+        <p:spPr/>
+        <p:txBody>
+          <a:bodyPr/>
+          <a:lstStyle/>
+          <a:p>
+            <a:r>
+              <a:rPr lang="de-AT" dirty="0" err="1" smtClean="0"/>
+              <a:t>Accesses</a:t>
+            </a:r>
+            <a:r>
+              <a:rPr lang="de-AT" dirty="0" smtClean="0"/>
+              <a:t> per </a:t>
+            </a:r>
+            <a:r>
+              <a:rPr lang="de-AT" dirty="0" err="1" smtClean="0"/>
+              <a:t>month</a:t>
+            </a:r>
+            <a:r>
+              <a:rPr lang="de-AT" dirty="0" smtClean="0"/>
+              <a:t> </a:t>
+            </a:r>
+            <a:r>
+              <a:rPr lang="de-AT" dirty="0" err="1" smtClean="0"/>
+              <a:t>without</a:t>
+            </a:r>
+            <a:r>
+              <a:rPr lang="de-AT" dirty="0" smtClean="0"/>
+              <a:t> </a:t>
+            </a:r>
+            <a:r>
+              <a:rPr lang="de-AT" dirty="0" err="1" smtClean="0"/>
+              <a:t>redundancy</a:t>
+            </a:r>
+            <a:r>
+              <a:rPr lang="de-AT" dirty="0" smtClean="0"/>
+              <a:t>:</a:t>
+            </a:r>
+          </a:p>
+          <a:p>
+            <a:pPr marL="365760" lvl="1" indent="0" algn="ctr">
+              <a:buNone/>
+            </a:pPr>
+            <a:r>
+              <a:rPr lang="de-AT" b="1" dirty="0" smtClean="0">
+                <a:solidFill>
+                  <a:srgbClr val="FF0000"/>
+                </a:solidFill>
+              </a:rPr>
+              <a:t>40.402.110</a:t>
+            </a:r>
+            <a:endParaRPr lang="de-AT" b="1" dirty="0">
+              <a:solidFill>
+                <a:srgbClr val="FF0000"/>
+              </a:solidFill>
+            </a:endParaRPr>
+          </a:p>
+          <a:p>
+            <a:r>
+              <a:rPr lang="de-AT" dirty="0" err="1" smtClean="0"/>
+              <a:t>Accesses</a:t>
+            </a:r>
+            <a:r>
+              <a:rPr lang="de-AT" dirty="0" smtClean="0"/>
+              <a:t> per </a:t>
+            </a:r>
+            <a:r>
+              <a:rPr lang="de-AT" dirty="0" err="1" smtClean="0"/>
+              <a:t>month</a:t>
+            </a:r>
+            <a:r>
+              <a:rPr lang="de-AT" dirty="0" smtClean="0"/>
+              <a:t> </a:t>
+            </a:r>
+            <a:r>
+              <a:rPr lang="de-AT" dirty="0" err="1" smtClean="0"/>
+              <a:t>with</a:t>
+            </a:r>
+            <a:r>
+              <a:rPr lang="de-AT" dirty="0" smtClean="0"/>
+              <a:t> </a:t>
+            </a:r>
+            <a:r>
+              <a:rPr lang="de-AT" dirty="0" err="1" smtClean="0"/>
+              <a:t>redundancy</a:t>
+            </a:r>
+            <a:r>
+              <a:rPr lang="de-AT" dirty="0" smtClean="0"/>
+              <a:t>:</a:t>
+            </a:r>
+          </a:p>
+          <a:p>
+            <a:pPr marL="365760" lvl="1" indent="0" algn="ctr">
+              <a:buNone/>
+            </a:pPr>
+            <a:r>
+              <a:rPr lang="de-AT" b="1" u="sng" dirty="0" smtClean="0">
+                <a:solidFill>
+                  <a:srgbClr val="92D050"/>
+                </a:solidFill>
+              </a:rPr>
+              <a:t>405.110</a:t>
+            </a:r>
+            <a:endParaRPr lang="de-AT" b="1" u="sng" dirty="0">
+              <a:solidFill>
+                <a:srgbClr val="92D050"/>
+              </a:solidFill>
+            </a:endParaRPr>
+          </a:p>
+          <a:p>
+            <a:endParaRPr lang="de-AT" dirty="0" smtClean="0"/>
+          </a:p>
+          <a:p>
+            <a:r>
+              <a:rPr lang="de-AT" b="1" dirty="0" err="1" smtClean="0"/>
+              <a:t>Therefore</a:t>
+            </a:r>
+            <a:r>
+              <a:rPr lang="de-AT" b="1" dirty="0" smtClean="0"/>
+              <a:t>: Keep </a:t>
+            </a:r>
+            <a:r>
+              <a:rPr lang="de-AT" b="1" dirty="0" err="1" smtClean="0"/>
+              <a:t>redundancy</a:t>
+            </a:r>
+            <a:r>
+              <a:rPr lang="de-AT" b="1" dirty="0" smtClean="0"/>
+              <a:t>!</a:t>
+            </a:r>
+            <a:endParaRPr lang="de-AT" b="1" dirty="0"/>
+          </a:p>
+        </p:txBody>
+      </p:sp>
+    </p:spTree>
+    <p:extLst>
+      <p:ext uri="{BB962C8B-B14F-4D97-AF65-F5344CB8AC3E}">
+        <p14:creationId xmlns:p14="http://schemas.microsoft.com/office/powerpoint/2010/main" val="1532810805"/>
+      </p:ext>
+    </p:extLst>
+  </p:cSld>
+  <p:clrMapOvr>
+    <a:masterClrMapping/>
+  </p:clrMapOvr>
+</p:sld>
+</file>
+
+<file path=ppt/slides/slide21.xml><?xml version="1.0" encoding="utf-8"?>
+<p:sld xmlns:a="http://schemas.openxmlformats.org/drawingml/2006/main" xmlns:r="http://schemas.openxmlformats.org/officeDocument/2006/relationships" xmlns:p="http://schemas.openxmlformats.org/presentationml/2006/main">
+  <p:cSld>
+    <p:spTree>
+      <p:nvGrpSpPr>
+        <p:cNvPr id="1" name=""/>
+        <p:cNvGrpSpPr/>
+        <p:nvPr/>
+      </p:nvGrpSpPr>
+      <p:grpSpPr>
+        <a:xfrm>
+          <a:off x="0" y="0"/>
+          <a:ext cx="0" cy="0"/>
+          <a:chOff x="0" y="0"/>
+          <a:chExt cx="0" cy="0"/>
+        </a:xfrm>
+      </p:grpSpPr>
+      <p:sp>
+        <p:nvSpPr>
+          <p:cNvPr id="2" name="Titel 1"/>
+          <p:cNvSpPr>
+            <a:spLocks noGrp="1"/>
+          </p:cNvSpPr>
+          <p:nvPr>
+            <p:ph type="title"/>
+          </p:nvPr>
+        </p:nvSpPr>
+        <p:spPr/>
+        <p:txBody>
+          <a:bodyPr/>
+          <a:lstStyle/>
+          <a:p>
+            <a:r>
+              <a:rPr lang="de-AT" dirty="0" err="1" smtClean="0"/>
+              <a:t>Exercise</a:t>
+            </a:r>
+            <a:r>
+              <a:rPr lang="de-AT" dirty="0" smtClean="0"/>
               <a:t> 4</a:t>
             </a:r>
             <a:endParaRPr lang="de-AT" dirty="0"/>
@@ -7735,7 +7836,7 @@
 </p:sld>
 </file>
 
-<file path=ppt/slides/slide21.xml><?xml version="1.0" encoding="utf-8"?>
+<file path=ppt/slides/slide22.xml><?xml version="1.0" encoding="utf-8"?>
 <p:sld xmlns:a="http://schemas.openxmlformats.org/drawingml/2006/main" xmlns:r="http://schemas.openxmlformats.org/officeDocument/2006/relationships" xmlns:p="http://schemas.openxmlformats.org/presentationml/2006/main">
   <p:cSld>
     <p:spTree>
@@ -8031,7 +8132,7 @@
 </p:sld>
 </file>
 
-<file path=ppt/slides/slide22.xml><?xml version="1.0" encoding="utf-8"?>
+<file path=ppt/slides/slide23.xml><?xml version="1.0" encoding="utf-8"?>
 <p:sld xmlns:a="http://schemas.openxmlformats.org/drawingml/2006/main" xmlns:r="http://schemas.openxmlformats.org/officeDocument/2006/relationships" xmlns:p="http://schemas.openxmlformats.org/presentationml/2006/main">
   <p:cSld>
     <p:spTree>
@@ -8351,7 +8452,7 @@
 </p:sld>
 </file>
 
-<file path=ppt/slides/slide23.xml><?xml version="1.0" encoding="utf-8"?>
+<file path=ppt/slides/slide24.xml><?xml version="1.0" encoding="utf-8"?>
 <p:sld xmlns:a="http://schemas.openxmlformats.org/drawingml/2006/main" xmlns:r="http://schemas.openxmlformats.org/officeDocument/2006/relationships" xmlns:p="http://schemas.openxmlformats.org/presentationml/2006/main">
   <p:cSld>
     <p:spTree>
@@ -8601,7 +8702,7 @@
 </p:sld>
 </file>
 
-<file path=ppt/slides/slide24.xml><?xml version="1.0" encoding="utf-8"?>
+<file path=ppt/slides/slide25.xml><?xml version="1.0" encoding="utf-8"?>
 <p:sld xmlns:a="http://schemas.openxmlformats.org/drawingml/2006/main" xmlns:r="http://schemas.openxmlformats.org/officeDocument/2006/relationships" xmlns:p="http://schemas.openxmlformats.org/presentationml/2006/main">
   <p:cSld>
     <p:spTree>
@@ -8845,7 +8946,7 @@
 </p:sld>
 </file>
 
-<file path=ppt/slides/slide25.xml><?xml version="1.0" encoding="utf-8"?>
+<file path=ppt/slides/slide26.xml><?xml version="1.0" encoding="utf-8"?>
 <p:sld xmlns:a="http://schemas.openxmlformats.org/drawingml/2006/main" xmlns:r="http://schemas.openxmlformats.org/officeDocument/2006/relationships" xmlns:p="http://schemas.openxmlformats.org/presentationml/2006/main">
   <p:cSld>
     <p:spTree>
@@ -9106,727 +9207,6 @@
 </p:sld>
 </file>
 
-<file path=ppt/slides/slide26.xml><?xml version="1.0" encoding="utf-8"?>
-<p:sld xmlns:a="http://schemas.openxmlformats.org/drawingml/2006/main" xmlns:r="http://schemas.openxmlformats.org/officeDocument/2006/relationships" xmlns:p="http://schemas.openxmlformats.org/presentationml/2006/main">
-  <p:cSld>
-    <p:spTree>
-      <p:nvGrpSpPr>
-        <p:cNvPr id="1" name=""/>
-        <p:cNvGrpSpPr/>
-        <p:nvPr/>
-      </p:nvGrpSpPr>
-      <p:grpSpPr>
-        <a:xfrm>
-          <a:off x="0" y="0"/>
-          <a:ext cx="0" cy="0"/>
-          <a:chOff x="0" y="0"/>
-          <a:chExt cx="0" cy="0"/>
-        </a:xfrm>
-      </p:grpSpPr>
-      <p:sp>
-        <p:nvSpPr>
-          <p:cNvPr id="2" name="Titel 1"/>
-          <p:cNvSpPr>
-            <a:spLocks noGrp="1"/>
-          </p:cNvSpPr>
-          <p:nvPr>
-            <p:ph type="title"/>
-          </p:nvPr>
-        </p:nvSpPr>
-        <p:spPr/>
-        <p:txBody>
-          <a:bodyPr/>
-          <a:lstStyle/>
-          <a:p>
-            <a:r>
-              <a:rPr lang="de-AT" dirty="0" err="1" smtClean="0"/>
-              <a:t>Which</a:t>
-            </a:r>
-            <a:r>
-              <a:rPr lang="de-AT" dirty="0" smtClean="0"/>
-              <a:t> </a:t>
-            </a:r>
-            <a:r>
-              <a:rPr lang="de-AT" dirty="0" err="1" smtClean="0"/>
-              <a:t>Flattening</a:t>
-            </a:r>
-            <a:r>
-              <a:rPr lang="de-AT" dirty="0" smtClean="0"/>
-              <a:t> </a:t>
-            </a:r>
-            <a:r>
-              <a:rPr lang="de-AT" dirty="0" err="1" smtClean="0"/>
-              <a:t>Strategy</a:t>
-            </a:r>
-            <a:r>
-              <a:rPr lang="de-AT" dirty="0" smtClean="0"/>
-              <a:t>?</a:t>
-            </a:r>
-            <a:endParaRPr lang="de-AT" dirty="0"/>
-          </a:p>
-        </p:txBody>
-      </p:sp>
-      <p:sp>
-        <p:nvSpPr>
-          <p:cNvPr id="3" name="Inhaltsplatzhalter 2"/>
-          <p:cNvSpPr>
-            <a:spLocks noGrp="1"/>
-          </p:cNvSpPr>
-          <p:nvPr>
-            <p:ph sz="quarter" idx="1"/>
-          </p:nvPr>
-        </p:nvSpPr>
-        <p:spPr/>
-        <p:txBody>
-          <a:bodyPr>
-            <a:normAutofit fontScale="92500" lnSpcReduction="20000"/>
-          </a:bodyPr>
-          <a:lstStyle/>
-          <a:p>
-            <a:pPr marL="514350" indent="-514350">
-              <a:buFont typeface="+mj-lt"/>
-              <a:buAutoNum type="arabicPeriod"/>
-            </a:pPr>
-            <a:r>
-              <a:rPr lang="de-AT" dirty="0" err="1" smtClean="0"/>
-              <a:t>Two</a:t>
-            </a:r>
-            <a:r>
-              <a:rPr lang="de-AT" dirty="0" smtClean="0"/>
-              <a:t> </a:t>
-            </a:r>
-            <a:r>
-              <a:rPr lang="de-AT" dirty="0" err="1" smtClean="0"/>
-              <a:t>operation</a:t>
-            </a:r>
-            <a:r>
-              <a:rPr lang="de-AT" dirty="0" smtClean="0"/>
-              <a:t> </a:t>
-            </a:r>
-            <a:r>
-              <a:rPr lang="de-AT" dirty="0" err="1" smtClean="0"/>
-              <a:t>sets</a:t>
-            </a:r>
-            <a:endParaRPr lang="de-AT" dirty="0" smtClean="0"/>
-          </a:p>
-          <a:p>
-            <a:pPr marL="914400" lvl="1" indent="-514350"/>
-            <a:r>
-              <a:rPr lang="de-AT" sz="1900" dirty="0" smtClean="0"/>
-              <a:t>S1 </a:t>
-            </a:r>
-            <a:r>
-              <a:rPr lang="de-AT" sz="1900" dirty="0" err="1" smtClean="0"/>
-              <a:t>set</a:t>
-            </a:r>
-            <a:r>
-              <a:rPr lang="de-AT" sz="1900" dirty="0" smtClean="0"/>
-              <a:t> </a:t>
-            </a:r>
-            <a:r>
-              <a:rPr lang="de-AT" sz="1900" dirty="0" err="1" smtClean="0"/>
-              <a:t>of</a:t>
-            </a:r>
-            <a:r>
-              <a:rPr lang="de-AT" sz="1900" dirty="0" smtClean="0"/>
-              <a:t> </a:t>
-            </a:r>
-            <a:r>
-              <a:rPr lang="de-AT" sz="1900" dirty="0" err="1" smtClean="0"/>
-              <a:t>operations</a:t>
-            </a:r>
-            <a:r>
-              <a:rPr lang="de-AT" sz="1900" dirty="0" smtClean="0"/>
-              <a:t>, </a:t>
-            </a:r>
-            <a:r>
-              <a:rPr lang="de-AT" sz="1900" dirty="0" err="1" smtClean="0"/>
-              <a:t>which</a:t>
-            </a:r>
-            <a:r>
-              <a:rPr lang="de-AT" sz="1900" dirty="0" smtClean="0"/>
-              <a:t> </a:t>
-            </a:r>
-            <a:r>
-              <a:rPr lang="de-AT" sz="1900" dirty="0" err="1" smtClean="0"/>
-              <a:t>access</a:t>
-            </a:r>
-            <a:r>
-              <a:rPr lang="de-AT" sz="1900" dirty="0" smtClean="0"/>
-              <a:t> </a:t>
-            </a:r>
-            <a:r>
-              <a:rPr lang="de-AT" sz="1900" dirty="0" err="1" smtClean="0"/>
-              <a:t>attributes</a:t>
-            </a:r>
-            <a:r>
-              <a:rPr lang="de-AT" sz="1900" dirty="0" smtClean="0"/>
-              <a:t> </a:t>
-            </a:r>
-            <a:r>
-              <a:rPr lang="de-AT" sz="1900" dirty="0" err="1" smtClean="0"/>
-              <a:t>of</a:t>
-            </a:r>
-            <a:r>
-              <a:rPr lang="de-AT" sz="1900" dirty="0" smtClean="0"/>
-              <a:t> </a:t>
-            </a:r>
-            <a:r>
-              <a:rPr lang="de-AT" sz="1900" dirty="0" err="1" smtClean="0"/>
-              <a:t>the</a:t>
-            </a:r>
-            <a:r>
-              <a:rPr lang="de-AT" sz="1900" dirty="0" smtClean="0"/>
-              <a:t> super-</a:t>
-            </a:r>
-            <a:r>
-              <a:rPr lang="de-AT" sz="1900" dirty="0" err="1" smtClean="0"/>
-              <a:t>class</a:t>
-            </a:r>
-            <a:endParaRPr lang="de-AT" sz="1900" dirty="0" smtClean="0"/>
-          </a:p>
-          <a:p>
-            <a:pPr marL="914400" lvl="1" indent="-514350"/>
-            <a:r>
-              <a:rPr lang="de-AT" sz="1900" dirty="0" smtClean="0"/>
-              <a:t>S2 </a:t>
-            </a:r>
-            <a:r>
-              <a:rPr lang="de-AT" sz="1900" dirty="0" err="1" smtClean="0"/>
-              <a:t>set</a:t>
-            </a:r>
-            <a:r>
-              <a:rPr lang="de-AT" sz="1900" dirty="0" smtClean="0"/>
-              <a:t> </a:t>
-            </a:r>
-            <a:r>
-              <a:rPr lang="de-AT" sz="1900" dirty="0" err="1" smtClean="0"/>
-              <a:t>of</a:t>
-            </a:r>
-            <a:r>
-              <a:rPr lang="de-AT" sz="1900" dirty="0" smtClean="0"/>
-              <a:t> </a:t>
-            </a:r>
-            <a:r>
-              <a:rPr lang="de-AT" sz="1900" dirty="0" err="1" smtClean="0"/>
-              <a:t>operations</a:t>
-            </a:r>
-            <a:r>
-              <a:rPr lang="de-AT" sz="1900" dirty="0" smtClean="0"/>
-              <a:t>, </a:t>
-            </a:r>
-            <a:r>
-              <a:rPr lang="de-AT" sz="1900" dirty="0" err="1" smtClean="0"/>
-              <a:t>which</a:t>
-            </a:r>
-            <a:r>
-              <a:rPr lang="de-AT" sz="1900" dirty="0" smtClean="0"/>
-              <a:t> </a:t>
-            </a:r>
-            <a:r>
-              <a:rPr lang="de-AT" sz="1900" dirty="0" err="1" smtClean="0"/>
-              <a:t>access</a:t>
-            </a:r>
-            <a:r>
-              <a:rPr lang="de-AT" sz="1900" dirty="0" smtClean="0"/>
-              <a:t> </a:t>
-            </a:r>
-            <a:r>
-              <a:rPr lang="de-AT" sz="1900" dirty="0" err="1" smtClean="0"/>
-              <a:t>attributes</a:t>
-            </a:r>
-            <a:r>
-              <a:rPr lang="de-AT" sz="1900" dirty="0" smtClean="0"/>
-              <a:t> </a:t>
-            </a:r>
-            <a:r>
-              <a:rPr lang="de-AT" sz="1900" dirty="0" err="1" smtClean="0"/>
-              <a:t>of</a:t>
-            </a:r>
-            <a:r>
-              <a:rPr lang="de-AT" sz="1900" dirty="0" smtClean="0"/>
-              <a:t> super-</a:t>
-            </a:r>
-            <a:r>
-              <a:rPr lang="de-AT" sz="1900" dirty="0" err="1" smtClean="0"/>
-              <a:t>class</a:t>
-            </a:r>
-            <a:r>
-              <a:rPr lang="de-AT" sz="1900" dirty="0" smtClean="0"/>
-              <a:t> </a:t>
-            </a:r>
-            <a:r>
-              <a:rPr lang="de-AT" sz="1900" dirty="0" err="1" smtClean="0"/>
-              <a:t>and</a:t>
-            </a:r>
-            <a:r>
-              <a:rPr lang="de-AT" sz="1900" dirty="0" smtClean="0"/>
-              <a:t> </a:t>
-            </a:r>
-            <a:r>
-              <a:rPr lang="de-AT" sz="1900" dirty="0" err="1" smtClean="0"/>
-              <a:t>one</a:t>
-            </a:r>
-            <a:r>
-              <a:rPr lang="de-AT" sz="1900" dirty="0" smtClean="0"/>
-              <a:t> sub-</a:t>
-            </a:r>
-            <a:r>
-              <a:rPr lang="de-AT" sz="1900" dirty="0" err="1" smtClean="0"/>
-              <a:t>class</a:t>
-            </a:r>
-            <a:endParaRPr lang="de-AT" sz="1900" dirty="0" smtClean="0"/>
-          </a:p>
-          <a:p>
-            <a:pPr marL="514350" indent="-514350">
-              <a:buFont typeface="+mj-lt"/>
-              <a:buAutoNum type="arabicPeriod"/>
-            </a:pPr>
-            <a:r>
-              <a:rPr lang="de-AT" dirty="0" err="1" smtClean="0"/>
-              <a:t>Calculate</a:t>
-            </a:r>
-            <a:r>
-              <a:rPr lang="de-AT" dirty="0" smtClean="0"/>
-              <a:t> </a:t>
-            </a:r>
-            <a:r>
-              <a:rPr lang="de-AT" dirty="0" err="1" smtClean="0"/>
-              <a:t>access</a:t>
-            </a:r>
-            <a:r>
-              <a:rPr lang="de-AT" dirty="0" smtClean="0"/>
-              <a:t> </a:t>
-            </a:r>
-            <a:r>
-              <a:rPr lang="de-AT" dirty="0" err="1" smtClean="0"/>
-              <a:t>counts</a:t>
-            </a:r>
-            <a:r>
-              <a:rPr lang="de-AT" dirty="0" smtClean="0"/>
-              <a:t> </a:t>
-            </a:r>
-            <a:r>
-              <a:rPr lang="de-AT" dirty="0" err="1" smtClean="0"/>
-              <a:t>for</a:t>
-            </a:r>
-            <a:r>
-              <a:rPr lang="de-AT" dirty="0" smtClean="0"/>
-              <a:t> S1 </a:t>
-            </a:r>
-            <a:r>
-              <a:rPr lang="de-AT" dirty="0" err="1" smtClean="0"/>
-              <a:t>and</a:t>
-            </a:r>
-            <a:r>
-              <a:rPr lang="de-AT" dirty="0" smtClean="0"/>
-              <a:t> S2</a:t>
-            </a:r>
-          </a:p>
-          <a:p>
-            <a:pPr marL="514350" indent="-514350">
-              <a:buFont typeface="+mj-lt"/>
-              <a:buAutoNum type="arabicPeriod"/>
-            </a:pPr>
-            <a:r>
-              <a:rPr lang="de-AT" dirty="0" err="1" smtClean="0"/>
-              <a:t>Decide</a:t>
-            </a:r>
-            <a:endParaRPr lang="de-AT" dirty="0" smtClean="0"/>
-          </a:p>
-          <a:p>
-            <a:pPr marL="400050" lvl="1" indent="0">
-              <a:buNone/>
-            </a:pPr>
-            <a:r>
-              <a:rPr lang="de-AT" dirty="0" err="1" smtClean="0"/>
-              <a:t>if</a:t>
-            </a:r>
-            <a:r>
-              <a:rPr lang="de-AT" dirty="0" smtClean="0"/>
-              <a:t> S2 </a:t>
-            </a:r>
-            <a:r>
-              <a:rPr lang="de-AT" dirty="0" err="1" smtClean="0"/>
-              <a:t>dominates</a:t>
-            </a:r>
-            <a:r>
-              <a:rPr lang="de-AT" dirty="0" smtClean="0"/>
-              <a:t> </a:t>
-            </a:r>
-            <a:r>
-              <a:rPr lang="de-AT" dirty="0" smtClean="0">
-                <a:sym typeface="Wingdings" panose="05000000000000000000" pitchFamily="2" charset="2"/>
-              </a:rPr>
-              <a:t> </a:t>
-            </a:r>
-            <a:r>
-              <a:rPr lang="de-AT" dirty="0" err="1" smtClean="0">
-                <a:sym typeface="Wingdings" panose="05000000000000000000" pitchFamily="2" charset="2"/>
-              </a:rPr>
-              <a:t>floor</a:t>
-            </a:r>
-            <a:endParaRPr lang="de-AT" dirty="0" smtClean="0">
-              <a:sym typeface="Wingdings" panose="05000000000000000000" pitchFamily="2" charset="2"/>
-            </a:endParaRPr>
-          </a:p>
-          <a:p>
-            <a:pPr marL="400050" lvl="1" indent="0">
-              <a:buNone/>
-            </a:pPr>
-            <a:r>
-              <a:rPr lang="de-AT" dirty="0" err="1" smtClean="0">
-                <a:sym typeface="Wingdings" panose="05000000000000000000" pitchFamily="2" charset="2"/>
-              </a:rPr>
-              <a:t>else</a:t>
-            </a:r>
-            <a:r>
-              <a:rPr lang="de-AT" dirty="0" smtClean="0">
-                <a:sym typeface="Wingdings" panose="05000000000000000000" pitchFamily="2" charset="2"/>
-              </a:rPr>
-              <a:t> </a:t>
-            </a:r>
-            <a:r>
-              <a:rPr lang="de-AT" dirty="0" err="1" smtClean="0">
-                <a:sym typeface="Wingdings" panose="05000000000000000000" pitchFamily="2" charset="2"/>
-              </a:rPr>
-              <a:t>analyse</a:t>
-            </a:r>
-            <a:r>
-              <a:rPr lang="de-AT" dirty="0" smtClean="0">
-                <a:sym typeface="Wingdings" panose="05000000000000000000" pitchFamily="2" charset="2"/>
-              </a:rPr>
-              <a:t> </a:t>
-            </a:r>
-            <a:r>
-              <a:rPr lang="de-AT" dirty="0" err="1" smtClean="0">
-                <a:sym typeface="Wingdings" panose="05000000000000000000" pitchFamily="2" charset="2"/>
-              </a:rPr>
-              <a:t>data</a:t>
-            </a:r>
-            <a:r>
-              <a:rPr lang="de-AT" dirty="0" smtClean="0">
-                <a:sym typeface="Wingdings" panose="05000000000000000000" pitchFamily="2" charset="2"/>
-              </a:rPr>
-              <a:t> </a:t>
-            </a:r>
-            <a:r>
-              <a:rPr lang="de-AT" dirty="0" err="1" smtClean="0">
-                <a:sym typeface="Wingdings" panose="05000000000000000000" pitchFamily="2" charset="2"/>
-              </a:rPr>
-              <a:t>manipulation</a:t>
-            </a:r>
-            <a:r>
-              <a:rPr lang="de-AT" dirty="0" smtClean="0">
-                <a:sym typeface="Wingdings" panose="05000000000000000000" pitchFamily="2" charset="2"/>
-              </a:rPr>
-              <a:t> </a:t>
-            </a:r>
-            <a:r>
-              <a:rPr lang="de-AT" dirty="0" err="1" smtClean="0">
-                <a:sym typeface="Wingdings" panose="05000000000000000000" pitchFamily="2" charset="2"/>
-              </a:rPr>
-              <a:t>operations</a:t>
-            </a:r>
-            <a:endParaRPr lang="de-AT" dirty="0" smtClean="0">
-              <a:sym typeface="Wingdings" panose="05000000000000000000" pitchFamily="2" charset="2"/>
-            </a:endParaRPr>
-          </a:p>
-          <a:p>
-            <a:pPr marL="400050" lvl="1" indent="0">
-              <a:buNone/>
-            </a:pPr>
-            <a:r>
-              <a:rPr lang="de-AT" dirty="0">
-                <a:sym typeface="Wingdings" panose="05000000000000000000" pitchFamily="2" charset="2"/>
-              </a:rPr>
-              <a:t>	</a:t>
-            </a:r>
-            <a:r>
-              <a:rPr lang="de-AT" dirty="0" err="1" smtClean="0">
-                <a:sym typeface="Wingdings" panose="05000000000000000000" pitchFamily="2" charset="2"/>
-              </a:rPr>
-              <a:t>if</a:t>
-            </a:r>
-            <a:r>
-              <a:rPr lang="de-AT" dirty="0" smtClean="0">
-                <a:sym typeface="Wingdings" panose="05000000000000000000" pitchFamily="2" charset="2"/>
-              </a:rPr>
-              <a:t> </a:t>
-            </a:r>
-            <a:r>
-              <a:rPr lang="de-AT" dirty="0" err="1" smtClean="0">
-                <a:sym typeface="Wingdings" panose="05000000000000000000" pitchFamily="2" charset="2"/>
-              </a:rPr>
-              <a:t>domination</a:t>
-            </a:r>
-            <a:r>
-              <a:rPr lang="de-AT" dirty="0" smtClean="0">
-                <a:sym typeface="Wingdings" panose="05000000000000000000" pitchFamily="2" charset="2"/>
-              </a:rPr>
-              <a:t> </a:t>
-            </a:r>
-            <a:r>
-              <a:rPr lang="de-AT" dirty="0" err="1" smtClean="0">
-                <a:sym typeface="Wingdings" panose="05000000000000000000" pitchFamily="2" charset="2"/>
-              </a:rPr>
-              <a:t>of</a:t>
-            </a:r>
-            <a:r>
-              <a:rPr lang="de-AT" dirty="0" smtClean="0">
-                <a:sym typeface="Wingdings" panose="05000000000000000000" pitchFamily="2" charset="2"/>
-              </a:rPr>
-              <a:t> </a:t>
-            </a:r>
-            <a:r>
-              <a:rPr lang="de-AT" dirty="0" err="1" smtClean="0">
-                <a:sym typeface="Wingdings" panose="05000000000000000000" pitchFamily="2" charset="2"/>
-              </a:rPr>
-              <a:t>operations</a:t>
-            </a:r>
-            <a:r>
-              <a:rPr lang="de-AT" dirty="0" smtClean="0">
-                <a:sym typeface="Wingdings" panose="05000000000000000000" pitchFamily="2" charset="2"/>
-              </a:rPr>
-              <a:t> </a:t>
-            </a:r>
-            <a:r>
-              <a:rPr lang="de-AT" dirty="0" err="1" smtClean="0">
-                <a:sym typeface="Wingdings" panose="05000000000000000000" pitchFamily="2" charset="2"/>
-              </a:rPr>
-              <a:t>that</a:t>
-            </a:r>
-            <a:r>
-              <a:rPr lang="de-AT" dirty="0" smtClean="0">
-                <a:sym typeface="Wingdings" panose="05000000000000000000" pitchFamily="2" charset="2"/>
-              </a:rPr>
-              <a:t> ..</a:t>
-            </a:r>
-          </a:p>
-          <a:p>
-            <a:pPr marL="400050" lvl="1" indent="0">
-              <a:buNone/>
-            </a:pPr>
-            <a:r>
-              <a:rPr lang="de-AT" dirty="0">
-                <a:sym typeface="Wingdings" panose="05000000000000000000" pitchFamily="2" charset="2"/>
-              </a:rPr>
-              <a:t>	</a:t>
-            </a:r>
-            <a:r>
-              <a:rPr lang="de-AT" dirty="0" smtClean="0">
-                <a:sym typeface="Wingdings" panose="05000000000000000000" pitchFamily="2" charset="2"/>
-              </a:rPr>
-              <a:t>    </a:t>
-            </a:r>
-            <a:r>
-              <a:rPr lang="de-AT" sz="2600" dirty="0" smtClean="0">
-                <a:sym typeface="Wingdings" panose="05000000000000000000" pitchFamily="2" charset="2"/>
-              </a:rPr>
-              <a:t>..</a:t>
-            </a:r>
-            <a:r>
-              <a:rPr lang="de-AT" sz="2600" dirty="0" err="1" smtClean="0">
-                <a:sym typeface="Wingdings" panose="05000000000000000000" pitchFamily="2" charset="2"/>
-              </a:rPr>
-              <a:t>access</a:t>
-            </a:r>
-            <a:r>
-              <a:rPr lang="de-AT" sz="2600" dirty="0" smtClean="0">
-                <a:sym typeface="Wingdings" panose="05000000000000000000" pitchFamily="2" charset="2"/>
-              </a:rPr>
-              <a:t> </a:t>
-            </a:r>
-            <a:r>
-              <a:rPr lang="de-AT" sz="2600" dirty="0" err="1" smtClean="0">
-                <a:sym typeface="Wingdings" panose="05000000000000000000" pitchFamily="2" charset="2"/>
-              </a:rPr>
-              <a:t>attributes</a:t>
-            </a:r>
-            <a:r>
-              <a:rPr lang="de-AT" sz="2600" dirty="0" smtClean="0">
-                <a:sym typeface="Wingdings" panose="05000000000000000000" pitchFamily="2" charset="2"/>
-              </a:rPr>
-              <a:t> </a:t>
-            </a:r>
-            <a:r>
-              <a:rPr lang="de-AT" sz="2600" dirty="0" err="1" smtClean="0">
-                <a:sym typeface="Wingdings" panose="05000000000000000000" pitchFamily="2" charset="2"/>
-              </a:rPr>
-              <a:t>of</a:t>
-            </a:r>
-            <a:r>
-              <a:rPr lang="de-AT" sz="2600" dirty="0" smtClean="0">
-                <a:sym typeface="Wingdings" panose="05000000000000000000" pitchFamily="2" charset="2"/>
-              </a:rPr>
-              <a:t> </a:t>
-            </a:r>
-            <a:r>
-              <a:rPr lang="de-AT" sz="2600" dirty="0" err="1" smtClean="0">
-                <a:sym typeface="Wingdings" panose="05000000000000000000" pitchFamily="2" charset="2"/>
-              </a:rPr>
-              <a:t>both</a:t>
-            </a:r>
-            <a:r>
-              <a:rPr lang="de-AT" sz="2600" dirty="0" smtClean="0">
-                <a:sym typeface="Wingdings" panose="05000000000000000000" pitchFamily="2" charset="2"/>
-              </a:rPr>
-              <a:t> super- </a:t>
-            </a:r>
-            <a:r>
-              <a:rPr lang="de-AT" sz="2600" dirty="0" err="1" smtClean="0">
-                <a:sym typeface="Wingdings" panose="05000000000000000000" pitchFamily="2" charset="2"/>
-              </a:rPr>
-              <a:t>and</a:t>
-            </a:r>
-            <a:r>
-              <a:rPr lang="de-AT" sz="2600" dirty="0" smtClean="0">
-                <a:sym typeface="Wingdings" panose="05000000000000000000" pitchFamily="2" charset="2"/>
-              </a:rPr>
-              <a:t> sub-</a:t>
-            </a:r>
-            <a:r>
-              <a:rPr lang="de-AT" sz="2600" dirty="0" err="1" smtClean="0">
-                <a:sym typeface="Wingdings" panose="05000000000000000000" pitchFamily="2" charset="2"/>
-              </a:rPr>
-              <a:t>class</a:t>
-            </a:r>
-            <a:r>
-              <a:rPr lang="de-AT" sz="2600" dirty="0" smtClean="0">
-                <a:sym typeface="Wingdings" panose="05000000000000000000" pitchFamily="2" charset="2"/>
-              </a:rPr>
-              <a:t>  </a:t>
-            </a:r>
-            <a:r>
-              <a:rPr lang="de-AT" sz="2600" dirty="0" err="1" smtClean="0">
-                <a:sym typeface="Wingdings" panose="05000000000000000000" pitchFamily="2" charset="2"/>
-              </a:rPr>
-              <a:t>ceiling</a:t>
-            </a:r>
-            <a:endParaRPr lang="de-AT" sz="2600" dirty="0" smtClean="0">
-              <a:sym typeface="Wingdings" panose="05000000000000000000" pitchFamily="2" charset="2"/>
-            </a:endParaRPr>
-          </a:p>
-          <a:p>
-            <a:pPr marL="400050" lvl="1" indent="0">
-              <a:buNone/>
-            </a:pPr>
-            <a:r>
-              <a:rPr lang="de-AT" sz="2600" dirty="0">
-                <a:sym typeface="Wingdings" panose="05000000000000000000" pitchFamily="2" charset="2"/>
-              </a:rPr>
-              <a:t>	 </a:t>
-            </a:r>
-            <a:r>
-              <a:rPr lang="de-AT" sz="2600" dirty="0" smtClean="0">
-                <a:sym typeface="Wingdings" panose="05000000000000000000" pitchFamily="2" charset="2"/>
-              </a:rPr>
-              <a:t>   ..</a:t>
-            </a:r>
-            <a:r>
-              <a:rPr lang="de-AT" sz="2600" dirty="0" err="1" smtClean="0">
-                <a:sym typeface="Wingdings" panose="05000000000000000000" pitchFamily="2" charset="2"/>
-              </a:rPr>
-              <a:t>access</a:t>
-            </a:r>
-            <a:r>
-              <a:rPr lang="de-AT" sz="2600" dirty="0" smtClean="0">
-                <a:sym typeface="Wingdings" panose="05000000000000000000" pitchFamily="2" charset="2"/>
-              </a:rPr>
-              <a:t> </a:t>
-            </a:r>
-            <a:r>
-              <a:rPr lang="de-AT" sz="2600" dirty="0" err="1" smtClean="0">
-                <a:sym typeface="Wingdings" panose="05000000000000000000" pitchFamily="2" charset="2"/>
-              </a:rPr>
-              <a:t>attributes</a:t>
-            </a:r>
-            <a:r>
-              <a:rPr lang="de-AT" sz="2600" dirty="0" smtClean="0">
-                <a:sym typeface="Wingdings" panose="05000000000000000000" pitchFamily="2" charset="2"/>
-              </a:rPr>
-              <a:t> </a:t>
-            </a:r>
-            <a:r>
-              <a:rPr lang="de-AT" sz="2600" dirty="0" err="1" smtClean="0">
-                <a:sym typeface="Wingdings" panose="05000000000000000000" pitchFamily="2" charset="2"/>
-              </a:rPr>
-              <a:t>of</a:t>
-            </a:r>
-            <a:r>
-              <a:rPr lang="de-AT" sz="2600" dirty="0" smtClean="0">
-                <a:sym typeface="Wingdings" panose="05000000000000000000" pitchFamily="2" charset="2"/>
-              </a:rPr>
-              <a:t> </a:t>
-            </a:r>
-            <a:r>
-              <a:rPr lang="de-AT" sz="2600" dirty="0" err="1" smtClean="0">
-                <a:sym typeface="Wingdings" panose="05000000000000000000" pitchFamily="2" charset="2"/>
-              </a:rPr>
-              <a:t>either</a:t>
-            </a:r>
-            <a:r>
-              <a:rPr lang="de-AT" sz="2600" dirty="0" smtClean="0">
-                <a:sym typeface="Wingdings" panose="05000000000000000000" pitchFamily="2" charset="2"/>
-              </a:rPr>
-              <a:t> super- </a:t>
-            </a:r>
-            <a:r>
-              <a:rPr lang="de-AT" sz="2600" dirty="0" err="1" smtClean="0">
-                <a:sym typeface="Wingdings" panose="05000000000000000000" pitchFamily="2" charset="2"/>
-              </a:rPr>
-              <a:t>or</a:t>
-            </a:r>
-            <a:r>
-              <a:rPr lang="de-AT" sz="2600" dirty="0" smtClean="0">
-                <a:sym typeface="Wingdings" panose="05000000000000000000" pitchFamily="2" charset="2"/>
-              </a:rPr>
-              <a:t> sub-</a:t>
-            </a:r>
-            <a:r>
-              <a:rPr lang="de-AT" sz="2600" dirty="0" err="1" smtClean="0">
-                <a:sym typeface="Wingdings" panose="05000000000000000000" pitchFamily="2" charset="2"/>
-              </a:rPr>
-              <a:t>class</a:t>
-            </a:r>
-            <a:r>
-              <a:rPr lang="de-AT" sz="2600" dirty="0" smtClean="0">
-                <a:sym typeface="Wingdings" panose="05000000000000000000" pitchFamily="2" charset="2"/>
-              </a:rPr>
-              <a:t>  </a:t>
-            </a:r>
-            <a:r>
-              <a:rPr lang="de-AT" sz="2600" dirty="0" err="1" smtClean="0">
-                <a:sym typeface="Wingdings" panose="05000000000000000000" pitchFamily="2" charset="2"/>
-              </a:rPr>
-              <a:t>cohesion</a:t>
-            </a:r>
-            <a:endParaRPr lang="de-AT" sz="2600" dirty="0" smtClean="0">
-              <a:sym typeface="Wingdings" panose="05000000000000000000" pitchFamily="2" charset="2"/>
-            </a:endParaRPr>
-          </a:p>
-        </p:txBody>
-      </p:sp>
-    </p:spTree>
-    <p:extLst>
-      <p:ext uri="{BB962C8B-B14F-4D97-AF65-F5344CB8AC3E}">
-        <p14:creationId xmlns:p14="http://schemas.microsoft.com/office/powerpoint/2010/main" val="1393091644"/>
-      </p:ext>
-    </p:extLst>
-  </p:cSld>
-  <p:clrMapOvr>
-    <a:masterClrMapping/>
-  </p:clrMapOvr>
-  <p:timing>
-    <p:tnLst>
-      <p:par>
-        <p:cTn id="1" dur="indefinite" restart="never" nodeType="tmRoot"/>
-      </p:par>
-    </p:tnLst>
-  </p:timing>
-</p:sld>
-</file>
-
 <file path=ppt/slides/slide27.xml><?xml version="1.0" encoding="utf-8"?>
 <p:sld xmlns:a="http://schemas.openxmlformats.org/drawingml/2006/main" xmlns:r="http://schemas.openxmlformats.org/officeDocument/2006/relationships" xmlns:p="http://schemas.openxmlformats.org/presentationml/2006/main">
   <p:cSld>
@@ -9861,11 +9241,27 @@
           <a:p>
             <a:r>
               <a:rPr lang="de-AT" dirty="0" err="1" smtClean="0"/>
-              <a:t>Exercise</a:t>
-            </a:r>
-            <a:r>
-              <a:rPr lang="de-AT" dirty="0" smtClean="0"/>
-              <a:t> 5</a:t>
+              <a:t>Which</a:t>
+            </a:r>
+            <a:r>
+              <a:rPr lang="de-AT" dirty="0" smtClean="0"/>
+              <a:t> </a:t>
+            </a:r>
+            <a:r>
+              <a:rPr lang="de-AT" dirty="0" err="1" smtClean="0"/>
+              <a:t>Flattening</a:t>
+            </a:r>
+            <a:r>
+              <a:rPr lang="de-AT" dirty="0" smtClean="0"/>
+              <a:t> </a:t>
+            </a:r>
+            <a:r>
+              <a:rPr lang="de-AT" dirty="0" err="1" smtClean="0"/>
+              <a:t>Strategy</a:t>
+            </a:r>
+            <a:r>
+              <a:rPr lang="de-AT" dirty="0" smtClean="0"/>
+              <a:t>?</a:t>
             </a:r>
             <a:endParaRPr lang="de-AT" dirty="0"/>
           </a:p>
@@ -9883,47 +9279,639 @@
         </p:nvSpPr>
         <p:spPr/>
         <p:txBody>
-          <a:bodyPr/>
+          <a:bodyPr>
+            <a:normAutofit fontScale="92500" lnSpcReduction="20000"/>
+          </a:bodyPr>
           <a:lstStyle/>
           <a:p>
-            <a:r>
-              <a:rPr lang="en-US" dirty="0" smtClean="0"/>
-              <a:t>What </a:t>
-            </a:r>
-            <a:r>
-              <a:rPr lang="en-US" dirty="0"/>
-              <a:t>is vertical partitioning, what is horizontal partitioning? Explain it with an example of your own. </a:t>
-            </a:r>
-          </a:p>
-          <a:p>
-            <a:r>
-              <a:rPr lang="en-US" dirty="0" smtClean="0"/>
-              <a:t>Why </a:t>
-            </a:r>
-            <a:r>
-              <a:rPr lang="en-US" dirty="0"/>
-              <a:t>might partitioning be necessary? </a:t>
-            </a:r>
-          </a:p>
-          <a:p>
-            <a:r>
-              <a:rPr lang="en-US" dirty="0" smtClean="0"/>
-              <a:t>What </a:t>
-            </a:r>
-            <a:r>
-              <a:rPr lang="en-US" dirty="0"/>
-              <a:t>do you have to consider before partitioning – how do you decide? </a:t>
-            </a:r>
-          </a:p>
-          <a:p>
-            <a:endParaRPr lang="de-AT" dirty="0"/>
+            <a:pPr marL="514350" indent="-514350">
+              <a:buFont typeface="+mj-lt"/>
+              <a:buAutoNum type="arabicPeriod"/>
+            </a:pPr>
+            <a:r>
+              <a:rPr lang="de-AT" dirty="0" err="1" smtClean="0"/>
+              <a:t>Two</a:t>
+            </a:r>
+            <a:r>
+              <a:rPr lang="de-AT" dirty="0" smtClean="0"/>
+              <a:t> </a:t>
+            </a:r>
+            <a:r>
+              <a:rPr lang="de-AT" dirty="0" err="1" smtClean="0"/>
+              <a:t>operation</a:t>
+            </a:r>
+            <a:r>
+              <a:rPr lang="de-AT" dirty="0" smtClean="0"/>
+              <a:t> </a:t>
+            </a:r>
+            <a:r>
+              <a:rPr lang="de-AT" dirty="0" err="1" smtClean="0"/>
+              <a:t>sets</a:t>
+            </a:r>
+            <a:endParaRPr lang="de-AT" dirty="0" smtClean="0"/>
+          </a:p>
+          <a:p>
+            <a:pPr marL="914400" lvl="1" indent="-514350"/>
+            <a:r>
+              <a:rPr lang="de-AT" sz="1900" dirty="0" smtClean="0"/>
+              <a:t>S1 </a:t>
+            </a:r>
+            <a:r>
+              <a:rPr lang="de-AT" sz="1900" dirty="0" err="1" smtClean="0"/>
+              <a:t>set</a:t>
+            </a:r>
+            <a:r>
+              <a:rPr lang="de-AT" sz="1900" dirty="0" smtClean="0"/>
+              <a:t> </a:t>
+            </a:r>
+            <a:r>
+              <a:rPr lang="de-AT" sz="1900" dirty="0" err="1" smtClean="0"/>
+              <a:t>of</a:t>
+            </a:r>
+            <a:r>
+              <a:rPr lang="de-AT" sz="1900" dirty="0" smtClean="0"/>
+              <a:t> </a:t>
+            </a:r>
+            <a:r>
+              <a:rPr lang="de-AT" sz="1900" dirty="0" err="1" smtClean="0"/>
+              <a:t>operations</a:t>
+            </a:r>
+            <a:r>
+              <a:rPr lang="de-AT" sz="1900" dirty="0" smtClean="0"/>
+              <a:t>, </a:t>
+            </a:r>
+            <a:r>
+              <a:rPr lang="de-AT" sz="1900" dirty="0" err="1" smtClean="0"/>
+              <a:t>which</a:t>
+            </a:r>
+            <a:r>
+              <a:rPr lang="de-AT" sz="1900" dirty="0" smtClean="0"/>
+              <a:t> </a:t>
+            </a:r>
+            <a:r>
+              <a:rPr lang="de-AT" sz="1900" dirty="0" err="1" smtClean="0"/>
+              <a:t>access</a:t>
+            </a:r>
+            <a:r>
+              <a:rPr lang="de-AT" sz="1900" dirty="0" smtClean="0"/>
+              <a:t> </a:t>
+            </a:r>
+            <a:r>
+              <a:rPr lang="de-AT" sz="1900" dirty="0" err="1" smtClean="0"/>
+              <a:t>attributes</a:t>
+            </a:r>
+            <a:r>
+              <a:rPr lang="de-AT" sz="1900" dirty="0" smtClean="0"/>
+              <a:t> </a:t>
+            </a:r>
+            <a:r>
+              <a:rPr lang="de-AT" sz="1900" dirty="0" err="1" smtClean="0"/>
+              <a:t>of</a:t>
+            </a:r>
+            <a:r>
+              <a:rPr lang="de-AT" sz="1900" dirty="0" smtClean="0"/>
+              <a:t> </a:t>
+            </a:r>
+            <a:r>
+              <a:rPr lang="de-AT" sz="1900" dirty="0" err="1" smtClean="0"/>
+              <a:t>the</a:t>
+            </a:r>
+            <a:r>
+              <a:rPr lang="de-AT" sz="1900" dirty="0" smtClean="0"/>
+              <a:t> super-</a:t>
+            </a:r>
+            <a:r>
+              <a:rPr lang="de-AT" sz="1900" dirty="0" err="1" smtClean="0"/>
+              <a:t>class</a:t>
+            </a:r>
+            <a:endParaRPr lang="de-AT" sz="1900" dirty="0" smtClean="0"/>
+          </a:p>
+          <a:p>
+            <a:pPr marL="914400" lvl="1" indent="-514350"/>
+            <a:r>
+              <a:rPr lang="de-AT" sz="1900" dirty="0" smtClean="0"/>
+              <a:t>S2 </a:t>
+            </a:r>
+            <a:r>
+              <a:rPr lang="de-AT" sz="1900" dirty="0" err="1" smtClean="0"/>
+              <a:t>set</a:t>
+            </a:r>
+            <a:r>
+              <a:rPr lang="de-AT" sz="1900" dirty="0" smtClean="0"/>
+              <a:t> </a:t>
+            </a:r>
+            <a:r>
+              <a:rPr lang="de-AT" sz="1900" dirty="0" err="1" smtClean="0"/>
+              <a:t>of</a:t>
+            </a:r>
+            <a:r>
+              <a:rPr lang="de-AT" sz="1900" dirty="0" smtClean="0"/>
+              <a:t> </a:t>
+            </a:r>
+            <a:r>
+              <a:rPr lang="de-AT" sz="1900" dirty="0" err="1" smtClean="0"/>
+              <a:t>operations</a:t>
+            </a:r>
+            <a:r>
+              <a:rPr lang="de-AT" sz="1900" dirty="0" smtClean="0"/>
+              <a:t>, </a:t>
+            </a:r>
+            <a:r>
+              <a:rPr lang="de-AT" sz="1900" dirty="0" err="1" smtClean="0"/>
+              <a:t>which</a:t>
+            </a:r>
+            <a:r>
+              <a:rPr lang="de-AT" sz="1900" dirty="0" smtClean="0"/>
+              <a:t> </a:t>
+            </a:r>
+            <a:r>
+              <a:rPr lang="de-AT" sz="1900" dirty="0" err="1" smtClean="0"/>
+              <a:t>access</a:t>
+            </a:r>
+            <a:r>
+              <a:rPr lang="de-AT" sz="1900" dirty="0" smtClean="0"/>
+              <a:t> </a:t>
+            </a:r>
+            <a:r>
+              <a:rPr lang="de-AT" sz="1900" dirty="0" err="1" smtClean="0"/>
+              <a:t>attributes</a:t>
+            </a:r>
+            <a:r>
+              <a:rPr lang="de-AT" sz="1900" dirty="0" smtClean="0"/>
+              <a:t> </a:t>
+            </a:r>
+            <a:r>
+              <a:rPr lang="de-AT" sz="1900" dirty="0" err="1" smtClean="0"/>
+              <a:t>of</a:t>
+            </a:r>
+            <a:r>
+              <a:rPr lang="de-AT" sz="1900" dirty="0" smtClean="0"/>
+              <a:t> super-</a:t>
+            </a:r>
+            <a:r>
+              <a:rPr lang="de-AT" sz="1900" dirty="0" err="1" smtClean="0"/>
+              <a:t>class</a:t>
+            </a:r>
+            <a:r>
+              <a:rPr lang="de-AT" sz="1900" dirty="0" smtClean="0"/>
+              <a:t> </a:t>
+            </a:r>
+            <a:r>
+              <a:rPr lang="de-AT" sz="1900" dirty="0" err="1" smtClean="0"/>
+              <a:t>and</a:t>
+            </a:r>
+            <a:r>
+              <a:rPr lang="de-AT" sz="1900" dirty="0" smtClean="0"/>
+              <a:t> </a:t>
+            </a:r>
+            <a:r>
+              <a:rPr lang="de-AT" sz="1900" dirty="0" err="1" smtClean="0"/>
+              <a:t>one</a:t>
+            </a:r>
+            <a:r>
+              <a:rPr lang="de-AT" sz="1900" dirty="0" smtClean="0"/>
+              <a:t> sub-</a:t>
+            </a:r>
+            <a:r>
+              <a:rPr lang="de-AT" sz="1900" dirty="0" err="1" smtClean="0"/>
+              <a:t>class</a:t>
+            </a:r>
+            <a:endParaRPr lang="de-AT" sz="1900" dirty="0" smtClean="0"/>
+          </a:p>
+          <a:p>
+            <a:pPr marL="514350" indent="-514350">
+              <a:buFont typeface="+mj-lt"/>
+              <a:buAutoNum type="arabicPeriod"/>
+            </a:pPr>
+            <a:r>
+              <a:rPr lang="de-AT" dirty="0" err="1" smtClean="0"/>
+              <a:t>Calculate</a:t>
+            </a:r>
+            <a:r>
+              <a:rPr lang="de-AT" dirty="0" smtClean="0"/>
+              <a:t> </a:t>
+            </a:r>
+            <a:r>
+              <a:rPr lang="de-AT" dirty="0" err="1" smtClean="0"/>
+              <a:t>access</a:t>
+            </a:r>
+            <a:r>
+              <a:rPr lang="de-AT" dirty="0" smtClean="0"/>
+              <a:t> </a:t>
+            </a:r>
+            <a:r>
+              <a:rPr lang="de-AT" dirty="0" err="1" smtClean="0"/>
+              <a:t>counts</a:t>
+            </a:r>
+            <a:r>
+              <a:rPr lang="de-AT" dirty="0" smtClean="0"/>
+              <a:t> </a:t>
+            </a:r>
+            <a:r>
+              <a:rPr lang="de-AT" dirty="0" err="1" smtClean="0"/>
+              <a:t>for</a:t>
+            </a:r>
+            <a:r>
+              <a:rPr lang="de-AT" dirty="0" smtClean="0"/>
+              <a:t> S1 </a:t>
+            </a:r>
+            <a:r>
+              <a:rPr lang="de-AT" dirty="0" err="1" smtClean="0"/>
+              <a:t>and</a:t>
+            </a:r>
+            <a:r>
+              <a:rPr lang="de-AT" dirty="0" smtClean="0"/>
+              <a:t> S2</a:t>
+            </a:r>
+          </a:p>
+          <a:p>
+            <a:pPr marL="514350" indent="-514350">
+              <a:buFont typeface="+mj-lt"/>
+              <a:buAutoNum type="arabicPeriod"/>
+            </a:pPr>
+            <a:r>
+              <a:rPr lang="de-AT" dirty="0" err="1" smtClean="0"/>
+              <a:t>Decide</a:t>
+            </a:r>
+            <a:endParaRPr lang="de-AT" dirty="0" smtClean="0"/>
+          </a:p>
+          <a:p>
+            <a:pPr marL="400050" lvl="1" indent="0">
+              <a:buNone/>
+            </a:pPr>
+            <a:r>
+              <a:rPr lang="de-AT" dirty="0" err="1" smtClean="0"/>
+              <a:t>if</a:t>
+            </a:r>
+            <a:r>
+              <a:rPr lang="de-AT" dirty="0" smtClean="0"/>
+              <a:t> S2 </a:t>
+            </a:r>
+            <a:r>
+              <a:rPr lang="de-AT" dirty="0" err="1" smtClean="0"/>
+              <a:t>dominates</a:t>
+            </a:r>
+            <a:r>
+              <a:rPr lang="de-AT" dirty="0" smtClean="0"/>
+              <a:t> </a:t>
+            </a:r>
+            <a:r>
+              <a:rPr lang="de-AT" dirty="0" smtClean="0">
+                <a:sym typeface="Wingdings" panose="05000000000000000000" pitchFamily="2" charset="2"/>
+              </a:rPr>
+              <a:t> </a:t>
+            </a:r>
+            <a:r>
+              <a:rPr lang="de-AT" dirty="0" err="1" smtClean="0">
+                <a:sym typeface="Wingdings" panose="05000000000000000000" pitchFamily="2" charset="2"/>
+              </a:rPr>
+              <a:t>floor</a:t>
+            </a:r>
+            <a:endParaRPr lang="de-AT" dirty="0" smtClean="0">
+              <a:sym typeface="Wingdings" panose="05000000000000000000" pitchFamily="2" charset="2"/>
+            </a:endParaRPr>
+          </a:p>
+          <a:p>
+            <a:pPr marL="400050" lvl="1" indent="0">
+              <a:buNone/>
+            </a:pPr>
+            <a:r>
+              <a:rPr lang="de-AT" dirty="0" err="1" smtClean="0">
+                <a:sym typeface="Wingdings" panose="05000000000000000000" pitchFamily="2" charset="2"/>
+              </a:rPr>
+              <a:t>else</a:t>
+            </a:r>
+            <a:r>
+              <a:rPr lang="de-AT" dirty="0" smtClean="0">
+                <a:sym typeface="Wingdings" panose="05000000000000000000" pitchFamily="2" charset="2"/>
+              </a:rPr>
+              <a:t> </a:t>
+            </a:r>
+            <a:r>
+              <a:rPr lang="de-AT" dirty="0" err="1" smtClean="0">
+                <a:sym typeface="Wingdings" panose="05000000000000000000" pitchFamily="2" charset="2"/>
+              </a:rPr>
+              <a:t>analyse</a:t>
+            </a:r>
+            <a:r>
+              <a:rPr lang="de-AT" dirty="0" smtClean="0">
+                <a:sym typeface="Wingdings" panose="05000000000000000000" pitchFamily="2" charset="2"/>
+              </a:rPr>
+              <a:t> </a:t>
+            </a:r>
+            <a:r>
+              <a:rPr lang="de-AT" dirty="0" err="1" smtClean="0">
+                <a:sym typeface="Wingdings" panose="05000000000000000000" pitchFamily="2" charset="2"/>
+              </a:rPr>
+              <a:t>data</a:t>
+            </a:r>
+            <a:r>
+              <a:rPr lang="de-AT" dirty="0" smtClean="0">
+                <a:sym typeface="Wingdings" panose="05000000000000000000" pitchFamily="2" charset="2"/>
+              </a:rPr>
+              <a:t> </a:t>
+            </a:r>
+            <a:r>
+              <a:rPr lang="de-AT" dirty="0" err="1" smtClean="0">
+                <a:sym typeface="Wingdings" panose="05000000000000000000" pitchFamily="2" charset="2"/>
+              </a:rPr>
+              <a:t>manipulation</a:t>
+            </a:r>
+            <a:r>
+              <a:rPr lang="de-AT" dirty="0" smtClean="0">
+                <a:sym typeface="Wingdings" panose="05000000000000000000" pitchFamily="2" charset="2"/>
+              </a:rPr>
+              <a:t> </a:t>
+            </a:r>
+            <a:r>
+              <a:rPr lang="de-AT" dirty="0" err="1" smtClean="0">
+                <a:sym typeface="Wingdings" panose="05000000000000000000" pitchFamily="2" charset="2"/>
+              </a:rPr>
+              <a:t>operations</a:t>
+            </a:r>
+            <a:endParaRPr lang="de-AT" dirty="0" smtClean="0">
+              <a:sym typeface="Wingdings" panose="05000000000000000000" pitchFamily="2" charset="2"/>
+            </a:endParaRPr>
+          </a:p>
+          <a:p>
+            <a:pPr marL="400050" lvl="1" indent="0">
+              <a:buNone/>
+            </a:pPr>
+            <a:r>
+              <a:rPr lang="de-AT" dirty="0">
+                <a:sym typeface="Wingdings" panose="05000000000000000000" pitchFamily="2" charset="2"/>
+              </a:rPr>
+              <a:t>	</a:t>
+            </a:r>
+            <a:r>
+              <a:rPr lang="de-AT" dirty="0" err="1" smtClean="0">
+                <a:sym typeface="Wingdings" panose="05000000000000000000" pitchFamily="2" charset="2"/>
+              </a:rPr>
+              <a:t>if</a:t>
+            </a:r>
+            <a:r>
+              <a:rPr lang="de-AT" dirty="0" smtClean="0">
+                <a:sym typeface="Wingdings" panose="05000000000000000000" pitchFamily="2" charset="2"/>
+              </a:rPr>
+              <a:t> </a:t>
+            </a:r>
+            <a:r>
+              <a:rPr lang="de-AT" dirty="0" err="1" smtClean="0">
+                <a:sym typeface="Wingdings" panose="05000000000000000000" pitchFamily="2" charset="2"/>
+              </a:rPr>
+              <a:t>domination</a:t>
+            </a:r>
+            <a:r>
+              <a:rPr lang="de-AT" dirty="0" smtClean="0">
+                <a:sym typeface="Wingdings" panose="05000000000000000000" pitchFamily="2" charset="2"/>
+              </a:rPr>
+              <a:t> </a:t>
+            </a:r>
+            <a:r>
+              <a:rPr lang="de-AT" dirty="0" err="1" smtClean="0">
+                <a:sym typeface="Wingdings" panose="05000000000000000000" pitchFamily="2" charset="2"/>
+              </a:rPr>
+              <a:t>of</a:t>
+            </a:r>
+            <a:r>
+              <a:rPr lang="de-AT" dirty="0" smtClean="0">
+                <a:sym typeface="Wingdings" panose="05000000000000000000" pitchFamily="2" charset="2"/>
+              </a:rPr>
+              <a:t> </a:t>
+            </a:r>
+            <a:r>
+              <a:rPr lang="de-AT" dirty="0" err="1" smtClean="0">
+                <a:sym typeface="Wingdings" panose="05000000000000000000" pitchFamily="2" charset="2"/>
+              </a:rPr>
+              <a:t>operations</a:t>
+            </a:r>
+            <a:r>
+              <a:rPr lang="de-AT" dirty="0" smtClean="0">
+                <a:sym typeface="Wingdings" panose="05000000000000000000" pitchFamily="2" charset="2"/>
+              </a:rPr>
+              <a:t> </a:t>
+            </a:r>
+            <a:r>
+              <a:rPr lang="de-AT" dirty="0" err="1" smtClean="0">
+                <a:sym typeface="Wingdings" panose="05000000000000000000" pitchFamily="2" charset="2"/>
+              </a:rPr>
+              <a:t>that</a:t>
+            </a:r>
+            <a:r>
+              <a:rPr lang="de-AT" dirty="0" smtClean="0">
+                <a:sym typeface="Wingdings" panose="05000000000000000000" pitchFamily="2" charset="2"/>
+              </a:rPr>
+              <a:t> ..</a:t>
+            </a:r>
+          </a:p>
+          <a:p>
+            <a:pPr marL="400050" lvl="1" indent="0">
+              <a:buNone/>
+            </a:pPr>
+            <a:r>
+              <a:rPr lang="de-AT" dirty="0">
+                <a:sym typeface="Wingdings" panose="05000000000000000000" pitchFamily="2" charset="2"/>
+              </a:rPr>
+              <a:t>	</a:t>
+            </a:r>
+            <a:r>
+              <a:rPr lang="de-AT" dirty="0" smtClean="0">
+                <a:sym typeface="Wingdings" panose="05000000000000000000" pitchFamily="2" charset="2"/>
+              </a:rPr>
+              <a:t>    </a:t>
+            </a:r>
+            <a:r>
+              <a:rPr lang="de-AT" sz="2600" dirty="0" smtClean="0">
+                <a:sym typeface="Wingdings" panose="05000000000000000000" pitchFamily="2" charset="2"/>
+              </a:rPr>
+              <a:t>..</a:t>
+            </a:r>
+            <a:r>
+              <a:rPr lang="de-AT" sz="2600" dirty="0" err="1" smtClean="0">
+                <a:sym typeface="Wingdings" panose="05000000000000000000" pitchFamily="2" charset="2"/>
+              </a:rPr>
+              <a:t>access</a:t>
+            </a:r>
+            <a:r>
+              <a:rPr lang="de-AT" sz="2600" dirty="0" smtClean="0">
+                <a:sym typeface="Wingdings" panose="05000000000000000000" pitchFamily="2" charset="2"/>
+              </a:rPr>
+              <a:t> </a:t>
+            </a:r>
+            <a:r>
+              <a:rPr lang="de-AT" sz="2600" dirty="0" err="1" smtClean="0">
+                <a:sym typeface="Wingdings" panose="05000000000000000000" pitchFamily="2" charset="2"/>
+              </a:rPr>
+              <a:t>attributes</a:t>
+            </a:r>
+            <a:r>
+              <a:rPr lang="de-AT" sz="2600" dirty="0" smtClean="0">
+                <a:sym typeface="Wingdings" panose="05000000000000000000" pitchFamily="2" charset="2"/>
+              </a:rPr>
+              <a:t> </a:t>
+            </a:r>
+            <a:r>
+              <a:rPr lang="de-AT" sz="2600" dirty="0" err="1" smtClean="0">
+                <a:sym typeface="Wingdings" panose="05000000000000000000" pitchFamily="2" charset="2"/>
+              </a:rPr>
+              <a:t>of</a:t>
+            </a:r>
+            <a:r>
+              <a:rPr lang="de-AT" sz="2600" dirty="0" smtClean="0">
+                <a:sym typeface="Wingdings" panose="05000000000000000000" pitchFamily="2" charset="2"/>
+              </a:rPr>
+              <a:t> </a:t>
+            </a:r>
+            <a:r>
+              <a:rPr lang="de-AT" sz="2600" dirty="0" err="1" smtClean="0">
+                <a:sym typeface="Wingdings" panose="05000000000000000000" pitchFamily="2" charset="2"/>
+              </a:rPr>
+              <a:t>both</a:t>
+            </a:r>
+            <a:r>
+              <a:rPr lang="de-AT" sz="2600" dirty="0" smtClean="0">
+                <a:sym typeface="Wingdings" panose="05000000000000000000" pitchFamily="2" charset="2"/>
+              </a:rPr>
+              <a:t> super- </a:t>
+            </a:r>
+            <a:r>
+              <a:rPr lang="de-AT" sz="2600" dirty="0" err="1" smtClean="0">
+                <a:sym typeface="Wingdings" panose="05000000000000000000" pitchFamily="2" charset="2"/>
+              </a:rPr>
+              <a:t>and</a:t>
+            </a:r>
+            <a:r>
+              <a:rPr lang="de-AT" sz="2600" dirty="0" smtClean="0">
+                <a:sym typeface="Wingdings" panose="05000000000000000000" pitchFamily="2" charset="2"/>
+              </a:rPr>
+              <a:t> sub-</a:t>
+            </a:r>
+            <a:r>
+              <a:rPr lang="de-AT" sz="2600" dirty="0" err="1" smtClean="0">
+                <a:sym typeface="Wingdings" panose="05000000000000000000" pitchFamily="2" charset="2"/>
+              </a:rPr>
+              <a:t>class</a:t>
+            </a:r>
+            <a:r>
+              <a:rPr lang="de-AT" sz="2600" dirty="0" smtClean="0">
+                <a:sym typeface="Wingdings" panose="05000000000000000000" pitchFamily="2" charset="2"/>
+              </a:rPr>
+              <a:t>  </a:t>
+            </a:r>
+            <a:r>
+              <a:rPr lang="de-AT" sz="2600" dirty="0" err="1" smtClean="0">
+                <a:sym typeface="Wingdings" panose="05000000000000000000" pitchFamily="2" charset="2"/>
+              </a:rPr>
+              <a:t>ceiling</a:t>
+            </a:r>
+            <a:endParaRPr lang="de-AT" sz="2600" dirty="0" smtClean="0">
+              <a:sym typeface="Wingdings" panose="05000000000000000000" pitchFamily="2" charset="2"/>
+            </a:endParaRPr>
+          </a:p>
+          <a:p>
+            <a:pPr marL="400050" lvl="1" indent="0">
+              <a:buNone/>
+            </a:pPr>
+            <a:r>
+              <a:rPr lang="de-AT" sz="2600" dirty="0">
+                <a:sym typeface="Wingdings" panose="05000000000000000000" pitchFamily="2" charset="2"/>
+              </a:rPr>
+              <a:t>	 </a:t>
+            </a:r>
+            <a:r>
+              <a:rPr lang="de-AT" sz="2600" dirty="0" smtClean="0">
+                <a:sym typeface="Wingdings" panose="05000000000000000000" pitchFamily="2" charset="2"/>
+              </a:rPr>
+              <a:t>   ..</a:t>
+            </a:r>
+            <a:r>
+              <a:rPr lang="de-AT" sz="2600" dirty="0" err="1" smtClean="0">
+                <a:sym typeface="Wingdings" panose="05000000000000000000" pitchFamily="2" charset="2"/>
+              </a:rPr>
+              <a:t>access</a:t>
+            </a:r>
+            <a:r>
+              <a:rPr lang="de-AT" sz="2600" dirty="0" smtClean="0">
+                <a:sym typeface="Wingdings" panose="05000000000000000000" pitchFamily="2" charset="2"/>
+              </a:rPr>
+              <a:t> </a:t>
+            </a:r>
+            <a:r>
+              <a:rPr lang="de-AT" sz="2600" dirty="0" err="1" smtClean="0">
+                <a:sym typeface="Wingdings" panose="05000000000000000000" pitchFamily="2" charset="2"/>
+              </a:rPr>
+              <a:t>attributes</a:t>
+            </a:r>
+            <a:r>
+              <a:rPr lang="de-AT" sz="2600" dirty="0" smtClean="0">
+                <a:sym typeface="Wingdings" panose="05000000000000000000" pitchFamily="2" charset="2"/>
+              </a:rPr>
+              <a:t> </a:t>
+            </a:r>
+            <a:r>
+              <a:rPr lang="de-AT" sz="2600" dirty="0" err="1" smtClean="0">
+                <a:sym typeface="Wingdings" panose="05000000000000000000" pitchFamily="2" charset="2"/>
+              </a:rPr>
+              <a:t>of</a:t>
+            </a:r>
+            <a:r>
+              <a:rPr lang="de-AT" sz="2600" dirty="0" smtClean="0">
+                <a:sym typeface="Wingdings" panose="05000000000000000000" pitchFamily="2" charset="2"/>
+              </a:rPr>
+              <a:t> </a:t>
+            </a:r>
+            <a:r>
+              <a:rPr lang="de-AT" sz="2600" dirty="0" err="1" smtClean="0">
+                <a:sym typeface="Wingdings" panose="05000000000000000000" pitchFamily="2" charset="2"/>
+              </a:rPr>
+              <a:t>either</a:t>
+            </a:r>
+            <a:r>
+              <a:rPr lang="de-AT" sz="2600" dirty="0" smtClean="0">
+                <a:sym typeface="Wingdings" panose="05000000000000000000" pitchFamily="2" charset="2"/>
+              </a:rPr>
+              <a:t> super- </a:t>
+            </a:r>
+            <a:r>
+              <a:rPr lang="de-AT" sz="2600" dirty="0" err="1" smtClean="0">
+                <a:sym typeface="Wingdings" panose="05000000000000000000" pitchFamily="2" charset="2"/>
+              </a:rPr>
+              <a:t>or</a:t>
+            </a:r>
+            <a:r>
+              <a:rPr lang="de-AT" sz="2600" dirty="0" smtClean="0">
+                <a:sym typeface="Wingdings" panose="05000000000000000000" pitchFamily="2" charset="2"/>
+              </a:rPr>
+              <a:t> sub-</a:t>
+            </a:r>
+            <a:r>
+              <a:rPr lang="de-AT" sz="2600" dirty="0" err="1" smtClean="0">
+                <a:sym typeface="Wingdings" panose="05000000000000000000" pitchFamily="2" charset="2"/>
+              </a:rPr>
+              <a:t>class</a:t>
+            </a:r>
+            <a:r>
+              <a:rPr lang="de-AT" sz="2600" dirty="0" smtClean="0">
+                <a:sym typeface="Wingdings" panose="05000000000000000000" pitchFamily="2" charset="2"/>
+              </a:rPr>
+              <a:t>  </a:t>
+            </a:r>
+            <a:r>
+              <a:rPr lang="de-AT" sz="2600" dirty="0" err="1" smtClean="0">
+                <a:sym typeface="Wingdings" panose="05000000000000000000" pitchFamily="2" charset="2"/>
+              </a:rPr>
+              <a:t>cohesion</a:t>
+            </a:r>
+            <a:endParaRPr lang="de-AT" sz="2600" dirty="0" smtClean="0">
+              <a:sym typeface="Wingdings" panose="05000000000000000000" pitchFamily="2" charset="2"/>
+            </a:endParaRPr>
           </a:p>
         </p:txBody>
       </p:sp>
     </p:spTree>
     <p:extLst>
       <p:ext uri="{BB962C8B-B14F-4D97-AF65-F5344CB8AC3E}">
-        <p14:creationId xmlns:p14="http://schemas.microsoft.com/office/powerpoint/2010/main" val="4170754018"/>
+        <p14:creationId xmlns:p14="http://schemas.microsoft.com/office/powerpoint/2010/main" val="1393091644"/>
       </p:ext>
     </p:extLst>
   </p:cSld>
@@ -9974,19 +9962,11 @@
           <a:p>
             <a:r>
               <a:rPr lang="de-AT" dirty="0" err="1" smtClean="0"/>
-              <a:t>Vertical</a:t>
-            </a:r>
-            <a:r>
-              <a:rPr lang="de-AT" dirty="0" smtClean="0"/>
-              <a:t> </a:t>
-            </a:r>
-            <a:r>
-              <a:rPr lang="de-AT" dirty="0" err="1" smtClean="0"/>
-              <a:t>partitioning</a:t>
-            </a:r>
-            <a:r>
-              <a:rPr lang="de-AT" dirty="0" smtClean="0"/>
-              <a:t>(1/2)</a:t>
+              <a:t>Exercise</a:t>
+            </a:r>
+            <a:r>
+              <a:rPr lang="de-AT" dirty="0" smtClean="0"/>
+              <a:t> 5</a:t>
             </a:r>
             <a:endParaRPr lang="de-AT" dirty="0"/>
           </a:p>
@@ -10008,29 +9988,35 @@
           <a:lstStyle/>
           <a:p>
             <a:r>
+              <a:rPr lang="en-US" dirty="0" smtClean="0"/>
+              <a:t>What </a:t>
+            </a:r>
+            <a:r>
               <a:rPr lang="en-US" dirty="0"/>
-              <a:t>split class vertically </a:t>
+              <a:t>is vertical partitioning, what is horizontal partitioning? Explain it with an example of your own. </a:t>
             </a:r>
           </a:p>
           <a:p>
             <a:r>
               <a:rPr lang="en-US" dirty="0" smtClean="0"/>
-              <a:t>new </a:t>
+              <a:t>Why </a:t>
             </a:r>
             <a:r>
               <a:rPr lang="en-US" dirty="0"/>
-              <a:t>classes have different set of attributes </a:t>
+              <a:t>might partitioning be necessary? </a:t>
             </a:r>
           </a:p>
           <a:p>
             <a:r>
               <a:rPr lang="en-US" dirty="0" smtClean="0"/>
-              <a:t>needs </a:t>
+              <a:t>What </a:t>
             </a:r>
             <a:r>
               <a:rPr lang="en-US" dirty="0"/>
-              <a:t>join operation to retrieve original set of instances </a:t>
-            </a:r>
+              <a:t>do you have to consider before partitioning – how do you decide? </a:t>
+            </a:r>
+          </a:p>
+          <a:p>
             <a:endParaRPr lang="de-AT" dirty="0"/>
           </a:p>
         </p:txBody>
@@ -10038,7 +10024,7 @@
     </p:spTree>
     <p:extLst>
       <p:ext uri="{BB962C8B-B14F-4D97-AF65-F5344CB8AC3E}">
-        <p14:creationId xmlns:p14="http://schemas.microsoft.com/office/powerpoint/2010/main" val="1457252602"/>
+        <p14:creationId xmlns:p14="http://schemas.microsoft.com/office/powerpoint/2010/main" val="4170754018"/>
       </p:ext>
     </p:extLst>
   </p:cSld>
@@ -10088,12 +10074,20 @@
           <a:lstStyle/>
           <a:p>
             <a:r>
-              <a:rPr lang="de-AT" dirty="0" smtClean="0"/>
-              <a:t>Horizontal </a:t>
+              <a:rPr lang="de-AT" dirty="0" err="1" smtClean="0"/>
+              <a:t>Vertical</a:t>
+            </a:r>
+            <a:r>
+              <a:rPr lang="de-AT" dirty="0" smtClean="0"/>
+              <a:t> </a:t>
             </a:r>
             <a:r>
               <a:rPr lang="de-AT" dirty="0" err="1" smtClean="0"/>
               <a:t>partitioning</a:t>
+            </a:r>
+            <a:r>
+              <a:rPr lang="de-AT" dirty="0" smtClean="0"/>
+              <a:t>(1/2)</a:t>
             </a:r>
             <a:endParaRPr lang="de-AT" dirty="0"/>
           </a:p>
@@ -10116,9 +10110,8 @@
           <a:p>
             <a:r>
               <a:rPr lang="en-US" dirty="0"/>
-              <a:t>split class horizontally </a:t>
-            </a:r>
-            <a:endParaRPr lang="en-US" dirty="0" smtClean="0"/>
+              <a:t>split class vertically </a:t>
+            </a:r>
           </a:p>
           <a:p>
             <a:r>
@@ -10127,17 +10120,7 @@
             </a:r>
             <a:r>
               <a:rPr lang="en-US" dirty="0"/>
-              <a:t>classes have same set of attributes </a:t>
-            </a:r>
-          </a:p>
-          <a:p>
-            <a:r>
-              <a:rPr lang="en-US" dirty="0" smtClean="0"/>
-              <a:t>multiplication </a:t>
-            </a:r>
-            <a:r>
-              <a:rPr lang="en-US" dirty="0"/>
-              <a:t>of original associations required </a:t>
+              <a:t>classes have different set of attributes </a:t>
             </a:r>
           </a:p>
           <a:p>
@@ -10147,7 +10130,7 @@
             </a:r>
             <a:r>
               <a:rPr lang="en-US" dirty="0"/>
-              <a:t>union operation to retrieve original set of instances </a:t>
+              <a:t>join operation to retrieve original set of instances </a:t>
             </a:r>
             <a:endParaRPr lang="de-AT" dirty="0"/>
           </a:p>
@@ -10156,7 +10139,7 @@
     </p:spTree>
     <p:extLst>
       <p:ext uri="{BB962C8B-B14F-4D97-AF65-F5344CB8AC3E}">
-        <p14:creationId xmlns:p14="http://schemas.microsoft.com/office/powerpoint/2010/main" val="1628158091"/>
+        <p14:creationId xmlns:p14="http://schemas.microsoft.com/office/powerpoint/2010/main" val="1457252602"/>
       </p:ext>
     </p:extLst>
   </p:cSld>
@@ -10523,6 +10506,124 @@
 </file>
 
 <file path=ppt/slides/slide30.xml><?xml version="1.0" encoding="utf-8"?>
+<p:sld xmlns:a="http://schemas.openxmlformats.org/drawingml/2006/main" xmlns:r="http://schemas.openxmlformats.org/officeDocument/2006/relationships" xmlns:p="http://schemas.openxmlformats.org/presentationml/2006/main">
+  <p:cSld>
+    <p:spTree>
+      <p:nvGrpSpPr>
+        <p:cNvPr id="1" name=""/>
+        <p:cNvGrpSpPr/>
+        <p:nvPr/>
+      </p:nvGrpSpPr>
+      <p:grpSpPr>
+        <a:xfrm>
+          <a:off x="0" y="0"/>
+          <a:ext cx="0" cy="0"/>
+          <a:chOff x="0" y="0"/>
+          <a:chExt cx="0" cy="0"/>
+        </a:xfrm>
+      </p:grpSpPr>
+      <p:sp>
+        <p:nvSpPr>
+          <p:cNvPr id="2" name="Titel 1"/>
+          <p:cNvSpPr>
+            <a:spLocks noGrp="1"/>
+          </p:cNvSpPr>
+          <p:nvPr>
+            <p:ph type="title"/>
+          </p:nvPr>
+        </p:nvSpPr>
+        <p:spPr/>
+        <p:txBody>
+          <a:bodyPr/>
+          <a:lstStyle/>
+          <a:p>
+            <a:r>
+              <a:rPr lang="de-AT" dirty="0" smtClean="0"/>
+              <a:t>Horizontal </a:t>
+            </a:r>
+            <a:r>
+              <a:rPr lang="de-AT" dirty="0" err="1" smtClean="0"/>
+              <a:t>partitioning</a:t>
+            </a:r>
+            <a:endParaRPr lang="de-AT" dirty="0"/>
+          </a:p>
+        </p:txBody>
+      </p:sp>
+      <p:sp>
+        <p:nvSpPr>
+          <p:cNvPr id="3" name="Inhaltsplatzhalter 2"/>
+          <p:cNvSpPr>
+            <a:spLocks noGrp="1"/>
+          </p:cNvSpPr>
+          <p:nvPr>
+            <p:ph sz="quarter" idx="1"/>
+          </p:nvPr>
+        </p:nvSpPr>
+        <p:spPr/>
+        <p:txBody>
+          <a:bodyPr/>
+          <a:lstStyle/>
+          <a:p>
+            <a:r>
+              <a:rPr lang="en-US" dirty="0"/>
+              <a:t>split class horizontally </a:t>
+            </a:r>
+            <a:endParaRPr lang="en-US" dirty="0" smtClean="0"/>
+          </a:p>
+          <a:p>
+            <a:r>
+              <a:rPr lang="en-US" dirty="0" smtClean="0"/>
+              <a:t>new </a:t>
+            </a:r>
+            <a:r>
+              <a:rPr lang="en-US" dirty="0"/>
+              <a:t>classes have same set of attributes </a:t>
+            </a:r>
+          </a:p>
+          <a:p>
+            <a:r>
+              <a:rPr lang="en-US" dirty="0" smtClean="0"/>
+              <a:t>multiplication </a:t>
+            </a:r>
+            <a:r>
+              <a:rPr lang="en-US" dirty="0"/>
+              <a:t>of original associations required </a:t>
+            </a:r>
+          </a:p>
+          <a:p>
+            <a:r>
+              <a:rPr lang="en-US" dirty="0" smtClean="0"/>
+              <a:t>needs </a:t>
+            </a:r>
+            <a:r>
+              <a:rPr lang="en-US" dirty="0"/>
+              <a:t>union operation to retrieve original set of instances </a:t>
+            </a:r>
+            <a:endParaRPr lang="de-AT" dirty="0"/>
+          </a:p>
+        </p:txBody>
+      </p:sp>
+    </p:spTree>
+    <p:extLst>
+      <p:ext uri="{BB962C8B-B14F-4D97-AF65-F5344CB8AC3E}">
+        <p14:creationId xmlns:p14="http://schemas.microsoft.com/office/powerpoint/2010/main" val="1628158091"/>
+      </p:ext>
+    </p:extLst>
+  </p:cSld>
+  <p:clrMapOvr>
+    <a:masterClrMapping/>
+  </p:clrMapOvr>
+  <p:timing>
+    <p:tnLst>
+      <p:par>
+        <p:cTn id="1" dur="indefinite" restart="never" nodeType="tmRoot"/>
+      </p:par>
+    </p:tnLst>
+  </p:timing>
+</p:sld>
+</file>
+
+<file path=ppt/slides/slide31.xml><?xml version="1.0" encoding="utf-8"?>
 <p:sld xmlns:a="http://schemas.openxmlformats.org/drawingml/2006/main" xmlns:r="http://schemas.openxmlformats.org/officeDocument/2006/relationships" xmlns:p="http://schemas.openxmlformats.org/presentationml/2006/main">
   <p:cSld>
     <p:spTree>
@@ -10649,7 +10750,7 @@
 </p:sld>
 </file>
 
-<file path=ppt/slides/slide31.xml><?xml version="1.0" encoding="utf-8"?>
+<file path=ppt/slides/slide32.xml><?xml version="1.0" encoding="utf-8"?>
 <p:sld xmlns:a="http://schemas.openxmlformats.org/drawingml/2006/main" xmlns:r="http://schemas.openxmlformats.org/officeDocument/2006/relationships" xmlns:p="http://schemas.openxmlformats.org/presentationml/2006/main">
   <p:cSld>
     <p:spTree>
@@ -10814,7 +10915,7 @@
 </p:sld>
 </file>
 
-<file path=ppt/slides/slide32.xml><?xml version="1.0" encoding="utf-8"?>
+<file path=ppt/slides/slide33.xml><?xml version="1.0" encoding="utf-8"?>
 <p:sld xmlns:a="http://schemas.openxmlformats.org/drawingml/2006/main" xmlns:r="http://schemas.openxmlformats.org/officeDocument/2006/relationships" xmlns:p="http://schemas.openxmlformats.org/presentationml/2006/main">
   <p:cSld>
     <p:spTree>
@@ -11428,11 +11529,7 @@
             </a:r>
             <a:r>
               <a:rPr lang="de-AT" dirty="0" smtClean="0"/>
-              <a:t>: </a:t>
-            </a:r>
-            <a:r>
-              <a:rPr lang="de-AT" dirty="0" smtClean="0"/>
-              <a:t>(</a:t>
+              <a:t>: (</a:t>
             </a:r>
             <a:r>
               <a:rPr lang="de-AT" dirty="0" err="1" smtClean="0"/>
@@ -11498,6 +11595,193 @@
 </file>
 
 <file path=ppt/slides/slide7.xml><?xml version="1.0" encoding="utf-8"?>
+<p:sld xmlns:a="http://schemas.openxmlformats.org/drawingml/2006/main" xmlns:r="http://schemas.openxmlformats.org/officeDocument/2006/relationships" xmlns:p="http://schemas.openxmlformats.org/presentationml/2006/main">
+  <p:cSld>
+    <p:spTree>
+      <p:nvGrpSpPr>
+        <p:cNvPr id="1" name=""/>
+        <p:cNvGrpSpPr/>
+        <p:nvPr/>
+      </p:nvGrpSpPr>
+      <p:grpSpPr>
+        <a:xfrm>
+          <a:off x="0" y="0"/>
+          <a:ext cx="0" cy="0"/>
+          <a:chOff x="0" y="0"/>
+          <a:chExt cx="0" cy="0"/>
+        </a:xfrm>
+      </p:grpSpPr>
+      <p:sp>
+        <p:nvSpPr>
+          <p:cNvPr id="2" name="Titel 1"/>
+          <p:cNvSpPr>
+            <a:spLocks noGrp="1"/>
+          </p:cNvSpPr>
+          <p:nvPr>
+            <p:ph type="title"/>
+          </p:nvPr>
+        </p:nvSpPr>
+        <p:spPr/>
+        <p:txBody>
+          <a:bodyPr>
+            <a:normAutofit fontScale="90000"/>
+          </a:bodyPr>
+          <a:lstStyle/>
+          <a:p>
+            <a:r>
+              <a:rPr lang="de-AT" dirty="0" err="1"/>
+              <a:t>scenarios</a:t>
+            </a:r>
+            <a:r>
+              <a:rPr lang="de-AT" dirty="0"/>
+              <a:t> </a:t>
+            </a:r>
+            <a:r>
+              <a:rPr lang="de-AT" dirty="0" err="1"/>
+              <a:t>and</a:t>
+            </a:r>
+            <a:r>
+              <a:rPr lang="de-AT" dirty="0"/>
+              <a:t> </a:t>
+            </a:r>
+            <a:r>
+              <a:rPr lang="de-AT" dirty="0" err="1"/>
+              <a:t>interschema</a:t>
+            </a:r>
+            <a:r>
+              <a:rPr lang="de-AT" dirty="0"/>
+              <a:t> </a:t>
+            </a:r>
+            <a:r>
+              <a:rPr lang="de-AT" dirty="0" err="1"/>
+              <a:t>properties</a:t>
+            </a:r>
+            <a:endParaRPr lang="de-AT" dirty="0"/>
+          </a:p>
+        </p:txBody>
+      </p:sp>
+      <p:pic>
+        <p:nvPicPr>
+          <p:cNvPr id="1027" name="Picture 3"/>
+          <p:cNvPicPr>
+            <a:picLocks noChangeAspect="1" noChangeArrowheads="1"/>
+          </p:cNvPicPr>
+          <p:nvPr/>
+        </p:nvPicPr>
+        <p:blipFill>
+          <a:blip r:embed="rId2">
+            <a:extLst>
+              <a:ext uri="{28A0092B-C50C-407E-A947-70E740481C1C}">
+                <a14:useLocalDpi xmlns:a14="http://schemas.microsoft.com/office/drawing/2010/main" val="0"/>
+              </a:ext>
+            </a:extLst>
+          </a:blip>
+          <a:srcRect/>
+          <a:stretch>
+            <a:fillRect/>
+          </a:stretch>
+        </p:blipFill>
+        <p:spPr bwMode="auto">
+          <a:xfrm>
+            <a:off x="683568" y="1772816"/>
+            <a:ext cx="3156570" cy="4713135"/>
+          </a:xfrm>
+          <a:prstGeom prst="rect">
+            <a:avLst/>
+          </a:prstGeom>
+          <a:noFill/>
+          <a:ln>
+            <a:noFill/>
+          </a:ln>
+          <a:extLst>
+            <a:ext uri="{909E8E84-426E-40DD-AFC4-6F175D3DCCD1}">
+              <a14:hiddenFill xmlns:a14="http://schemas.microsoft.com/office/drawing/2010/main">
+                <a:solidFill>
+                  <a:schemeClr val="accent1"/>
+                </a:solidFill>
+              </a14:hiddenFill>
+            </a:ext>
+            <a:ext uri="{91240B29-F687-4F45-9708-019B960494DF}">
+              <a14:hiddenLine xmlns:a14="http://schemas.microsoft.com/office/drawing/2010/main" w="9525">
+                <a:solidFill>
+                  <a:schemeClr val="tx1"/>
+                </a:solidFill>
+                <a:miter lim="800000"/>
+                <a:headEnd/>
+                <a:tailEnd/>
+              </a14:hiddenLine>
+            </a:ext>
+          </a:extLst>
+        </p:spPr>
+      </p:pic>
+      <p:pic>
+        <p:nvPicPr>
+          <p:cNvPr id="1028" name="Picture 4"/>
+          <p:cNvPicPr>
+            <a:picLocks noChangeAspect="1" noChangeArrowheads="1"/>
+          </p:cNvPicPr>
+          <p:nvPr/>
+        </p:nvPicPr>
+        <p:blipFill>
+          <a:blip r:embed="rId3">
+            <a:extLst>
+              <a:ext uri="{28A0092B-C50C-407E-A947-70E740481C1C}">
+                <a14:useLocalDpi xmlns:a14="http://schemas.microsoft.com/office/drawing/2010/main" val="0"/>
+              </a:ext>
+            </a:extLst>
+          </a:blip>
+          <a:srcRect/>
+          <a:stretch>
+            <a:fillRect/>
+          </a:stretch>
+        </p:blipFill>
+        <p:spPr bwMode="auto">
+          <a:xfrm>
+            <a:off x="4355976" y="1787716"/>
+            <a:ext cx="4169295" cy="4698235"/>
+          </a:xfrm>
+          <a:prstGeom prst="rect">
+            <a:avLst/>
+          </a:prstGeom>
+          <a:noFill/>
+          <a:ln>
+            <a:noFill/>
+          </a:ln>
+          <a:extLst>
+            <a:ext uri="{909E8E84-426E-40DD-AFC4-6F175D3DCCD1}">
+              <a14:hiddenFill xmlns:a14="http://schemas.microsoft.com/office/drawing/2010/main">
+                <a:solidFill>
+                  <a:schemeClr val="accent1"/>
+                </a:solidFill>
+              </a14:hiddenFill>
+            </a:ext>
+            <a:ext uri="{91240B29-F687-4F45-9708-019B960494DF}">
+              <a14:hiddenLine xmlns:a14="http://schemas.microsoft.com/office/drawing/2010/main" w="9525">
+                <a:solidFill>
+                  <a:schemeClr val="tx1"/>
+                </a:solidFill>
+                <a:miter lim="800000"/>
+                <a:headEnd/>
+                <a:tailEnd/>
+              </a14:hiddenLine>
+            </a:ext>
+          </a:extLst>
+        </p:spPr>
+      </p:pic>
+    </p:spTree>
+    <p:extLst>
+      <p:ext uri="{BB962C8B-B14F-4D97-AF65-F5344CB8AC3E}">
+        <p14:creationId xmlns:p14="http://schemas.microsoft.com/office/powerpoint/2010/main" val="680704576"/>
+      </p:ext>
+    </p:extLst>
+  </p:cSld>
+  <p:clrMapOvr>
+    <a:masterClrMapping/>
+  </p:clrMapOvr>
+</p:sld>
+</file>
+
+<file path=ppt/slides/slide8.xml><?xml version="1.0" encoding="utf-8"?>
 <p:sld xmlns:a="http://schemas.openxmlformats.org/drawingml/2006/main" xmlns:r="http://schemas.openxmlformats.org/officeDocument/2006/relationships" xmlns:p="http://schemas.openxmlformats.org/presentationml/2006/main">
   <p:cSld>
     <p:spTree>
@@ -11611,7 +11895,7 @@
 </p:sld>
 </file>
 
-<file path=ppt/slides/slide8.xml><?xml version="1.0" encoding="utf-8"?>
+<file path=ppt/slides/slide9.xml><?xml version="1.0" encoding="utf-8"?>
 <p:sld xmlns:a="http://schemas.openxmlformats.org/drawingml/2006/main" xmlns:r="http://schemas.openxmlformats.org/officeDocument/2006/relationships" xmlns:p="http://schemas.openxmlformats.org/presentationml/2006/main">
   <p:cSld>
     <p:spTree>
@@ -11911,106 +12195,6 @@
     <p:extLst>
       <p:ext uri="{BB962C8B-B14F-4D97-AF65-F5344CB8AC3E}">
         <p14:creationId xmlns:p14="http://schemas.microsoft.com/office/powerpoint/2010/main" val="4027580963"/>
-      </p:ext>
-    </p:extLst>
-  </p:cSld>
-  <p:clrMapOvr>
-    <a:masterClrMapping/>
-  </p:clrMapOvr>
-</p:sld>
-</file>
-
-<file path=ppt/slides/slide9.xml><?xml version="1.0" encoding="utf-8"?>
-<p:sld xmlns:a="http://schemas.openxmlformats.org/drawingml/2006/main" xmlns:r="http://schemas.openxmlformats.org/officeDocument/2006/relationships" xmlns:p="http://schemas.openxmlformats.org/presentationml/2006/main">
-  <p:cSld>
-    <p:spTree>
-      <p:nvGrpSpPr>
-        <p:cNvPr id="1" name=""/>
-        <p:cNvGrpSpPr/>
-        <p:nvPr/>
-      </p:nvGrpSpPr>
-      <p:grpSpPr>
-        <a:xfrm>
-          <a:off x="0" y="0"/>
-          <a:ext cx="0" cy="0"/>
-          <a:chOff x="0" y="0"/>
-          <a:chExt cx="0" cy="0"/>
-        </a:xfrm>
-      </p:grpSpPr>
-      <p:sp>
-        <p:nvSpPr>
-          <p:cNvPr id="2" name="Titel 1"/>
-          <p:cNvSpPr>
-            <a:spLocks noGrp="1"/>
-          </p:cNvSpPr>
-          <p:nvPr>
-            <p:ph type="title"/>
-          </p:nvPr>
-        </p:nvSpPr>
-        <p:spPr/>
-        <p:txBody>
-          <a:bodyPr>
-            <a:normAutofit/>
-          </a:bodyPr>
-          <a:lstStyle/>
-          <a:p>
-            <a:r>
-              <a:rPr lang="de-AT" dirty="0" err="1" smtClean="0"/>
-              <a:t>Exercise</a:t>
-            </a:r>
-            <a:r>
-              <a:rPr lang="de-AT" dirty="0" smtClean="0"/>
-              <a:t> 2 – </a:t>
-            </a:r>
-            <a:r>
-              <a:rPr lang="de-AT" dirty="0" err="1" smtClean="0"/>
-              <a:t>Calculation</a:t>
-            </a:r>
-            <a:r>
-              <a:rPr lang="de-AT" dirty="0" smtClean="0"/>
-              <a:t> </a:t>
-            </a:r>
-            <a:r>
-              <a:rPr lang="de-AT" dirty="0" err="1" smtClean="0"/>
-              <a:t>rules</a:t>
-            </a:r>
-            <a:endParaRPr lang="de-AT" dirty="0"/>
-          </a:p>
-        </p:txBody>
-      </p:sp>
-      <p:pic>
-        <p:nvPicPr>
-          <p:cNvPr id="4" name="Inhaltsplatzhalter 3"/>
-          <p:cNvPicPr>
-            <a:picLocks noGrp="1" noChangeAspect="1"/>
-          </p:cNvPicPr>
-          <p:nvPr>
-            <p:ph sz="quarter" idx="1"/>
-          </p:nvPr>
-        </p:nvPicPr>
-        <p:blipFill>
-          <a:blip r:embed="rId2">
-            <a:extLst>
-              <a:ext uri="{28A0092B-C50C-407E-A947-70E740481C1C}">
-                <a14:useLocalDpi xmlns:a14="http://schemas.microsoft.com/office/drawing/2010/main" val="0"/>
-              </a:ext>
-            </a:extLst>
-          </a:blip>
-          <a:stretch>
-            <a:fillRect/>
-          </a:stretch>
-        </p:blipFill>
-        <p:spPr>
-          <a:xfrm>
-            <a:off x="2213340" y="1600200"/>
-            <a:ext cx="4952270" cy="4495800"/>
-          </a:xfrm>
-        </p:spPr>
-      </p:pic>
-    </p:spTree>
-    <p:extLst>
-      <p:ext uri="{BB962C8B-B14F-4D97-AF65-F5344CB8AC3E}">
-        <p14:creationId xmlns:p14="http://schemas.microsoft.com/office/powerpoint/2010/main" val="3460682268"/>
       </p:ext>
     </p:extLst>
   </p:cSld>

</xml_diff>